<commit_message>
Files For Capstone Project
Added Required Files For Capstone Project
1) Capstone_Report.pptx
2)CleanedData.csv
3)Capstone_AnushreeDiwan.ipynb
</commit_message>
<xml_diff>
--- a/Capstone_Report.pptx
+++ b/Capstone_Report.pptx
@@ -21,9 +21,11 @@
     <p:sldId id="278" r:id="rId15"/>
     <p:sldId id="257" r:id="rId16"/>
     <p:sldId id="279" r:id="rId17"/>
-    <p:sldId id="270" r:id="rId18"/>
-    <p:sldId id="271" r:id="rId19"/>
-    <p:sldId id="272" r:id="rId20"/>
+    <p:sldId id="282" r:id="rId18"/>
+    <p:sldId id="270" r:id="rId19"/>
+    <p:sldId id="271" r:id="rId20"/>
+    <p:sldId id="272" r:id="rId21"/>
+    <p:sldId id="283" r:id="rId22"/>
   </p:sldIdLst>
   <p:sldSz cx="9144000" cy="6858000" type="screen4x3"/>
   <p:notesSz cx="6858000" cy="9144000"/>
@@ -145,8 +147,728 @@
 <p1510:revInfo xmlns:a="http://schemas.openxmlformats.org/drawingml/2006/main" xmlns:r="http://schemas.openxmlformats.org/officeDocument/2006/relationships" xmlns:p1510="http://schemas.microsoft.com/office/powerpoint/2015/10/main">
   <p1510:revLst>
     <p1510:client id="{6E63E004-871F-4037-9DE0-0403D056710F}" v="205" dt="2025-11-30T13:18:45.495"/>
+    <p1510:client id="{DCD3A074-C0B5-451C-83D4-9A3A6F4B178D}" v="20" dt="2025-11-30T15:35:16.148"/>
   </p1510:revLst>
 </p1510:revInfo>
+</file>
+
+<file path=ppt/changesInfos/changesInfo1.xml><?xml version="1.0" encoding="utf-8"?>
+<pc:chgInfo xmlns:a="http://schemas.openxmlformats.org/drawingml/2006/main" xmlns:r="http://schemas.openxmlformats.org/officeDocument/2006/relationships" xmlns:ac="http://schemas.microsoft.com/office/drawing/2013/main/command" xmlns:pc="http://schemas.microsoft.com/office/powerpoint/2013/main/command">
+  <pc:docChgLst>
+    <pc:chgData name="Sudhanshu Tiwari" userId="b0de518f36dbf967" providerId="LiveId" clId="{ABA6FB30-5F49-4925-B7B7-9A38E210E107}"/>
+    <pc:docChg chg="undo custSel addSld modSld sldOrd">
+      <pc:chgData name="Sudhanshu Tiwari" userId="b0de518f36dbf967" providerId="LiveId" clId="{ABA6FB30-5F49-4925-B7B7-9A38E210E107}" dt="2025-11-30T15:37:08.562" v="348" actId="2711"/>
+      <pc:docMkLst>
+        <pc:docMk/>
+      </pc:docMkLst>
+      <pc:sldChg chg="modSp">
+        <pc:chgData name="Sudhanshu Tiwari" userId="b0de518f36dbf967" providerId="LiveId" clId="{ABA6FB30-5F49-4925-B7B7-9A38E210E107}" dt="2025-11-30T15:34:55.716" v="347" actId="2711"/>
+        <pc:sldMkLst>
+          <pc:docMk/>
+          <pc:sldMk cId="0" sldId="256"/>
+        </pc:sldMkLst>
+        <pc:spChg chg="mod">
+          <ac:chgData name="Sudhanshu Tiwari" userId="b0de518f36dbf967" providerId="LiveId" clId="{ABA6FB30-5F49-4925-B7B7-9A38E210E107}" dt="2025-11-30T15:34:55.716" v="347" actId="2711"/>
+          <ac:spMkLst>
+            <pc:docMk/>
+            <pc:sldMk cId="0" sldId="256"/>
+            <ac:spMk id="2" creationId="{00000000-0000-0000-0000-000000000000}"/>
+          </ac:spMkLst>
+        </pc:spChg>
+      </pc:sldChg>
+      <pc:sldChg chg="modSp mod">
+        <pc:chgData name="Sudhanshu Tiwari" userId="b0de518f36dbf967" providerId="LiveId" clId="{ABA6FB30-5F49-4925-B7B7-9A38E210E107}" dt="2025-11-30T15:21:31.363" v="289" actId="20577"/>
+        <pc:sldMkLst>
+          <pc:docMk/>
+          <pc:sldMk cId="0" sldId="257"/>
+        </pc:sldMkLst>
+        <pc:spChg chg="mod">
+          <ac:chgData name="Sudhanshu Tiwari" userId="b0de518f36dbf967" providerId="LiveId" clId="{ABA6FB30-5F49-4925-B7B7-9A38E210E107}" dt="2025-11-30T15:21:31.363" v="289" actId="20577"/>
+          <ac:spMkLst>
+            <pc:docMk/>
+            <pc:sldMk cId="0" sldId="257"/>
+            <ac:spMk id="6" creationId="{F75E0B95-A8D4-8355-6DF1-D3571AA3B580}"/>
+          </ac:spMkLst>
+        </pc:spChg>
+      </pc:sldChg>
+      <pc:sldChg chg="modSp mod">
+        <pc:chgData name="Sudhanshu Tiwari" userId="b0de518f36dbf967" providerId="LiveId" clId="{ABA6FB30-5F49-4925-B7B7-9A38E210E107}" dt="2025-11-30T15:37:08.562" v="348" actId="2711"/>
+        <pc:sldMkLst>
+          <pc:docMk/>
+          <pc:sldMk cId="2876987989" sldId="270"/>
+        </pc:sldMkLst>
+        <pc:spChg chg="mod">
+          <ac:chgData name="Sudhanshu Tiwari" userId="b0de518f36dbf967" providerId="LiveId" clId="{ABA6FB30-5F49-4925-B7B7-9A38E210E107}" dt="2025-11-30T15:03:51.770" v="85" actId="14100"/>
+          <ac:spMkLst>
+            <pc:docMk/>
+            <pc:sldMk cId="2876987989" sldId="270"/>
+            <ac:spMk id="2" creationId="{CDD7382A-BC46-4D21-B52F-5ED6A908552C}"/>
+          </ac:spMkLst>
+        </pc:spChg>
+        <pc:spChg chg="mod">
+          <ac:chgData name="Sudhanshu Tiwari" userId="b0de518f36dbf967" providerId="LiveId" clId="{ABA6FB30-5F49-4925-B7B7-9A38E210E107}" dt="2025-11-30T15:37:08.562" v="348" actId="2711"/>
+          <ac:spMkLst>
+            <pc:docMk/>
+            <pc:sldMk cId="2876987989" sldId="270"/>
+            <ac:spMk id="3" creationId="{BBD0319C-1FBE-FD5E-A98A-617C64453351}"/>
+          </ac:spMkLst>
+        </pc:spChg>
+      </pc:sldChg>
+      <pc:sldChg chg="modSp mod">
+        <pc:chgData name="Sudhanshu Tiwari" userId="b0de518f36dbf967" providerId="LiveId" clId="{ABA6FB30-5F49-4925-B7B7-9A38E210E107}" dt="2025-11-30T15:27:10.487" v="316" actId="2711"/>
+        <pc:sldMkLst>
+          <pc:docMk/>
+          <pc:sldMk cId="936772840" sldId="279"/>
+        </pc:sldMkLst>
+        <pc:spChg chg="mod">
+          <ac:chgData name="Sudhanshu Tiwari" userId="b0de518f36dbf967" providerId="LiveId" clId="{ABA6FB30-5F49-4925-B7B7-9A38E210E107}" dt="2025-11-30T15:27:10.487" v="316" actId="2711"/>
+          <ac:spMkLst>
+            <pc:docMk/>
+            <pc:sldMk cId="936772840" sldId="279"/>
+            <ac:spMk id="2" creationId="{A2CD0DF1-D1AF-D90B-AF11-CA5D1270A713}"/>
+          </ac:spMkLst>
+        </pc:spChg>
+        <pc:spChg chg="mod">
+          <ac:chgData name="Sudhanshu Tiwari" userId="b0de518f36dbf967" providerId="LiveId" clId="{ABA6FB30-5F49-4925-B7B7-9A38E210E107}" dt="2025-11-30T15:26:54.760" v="315" actId="2711"/>
+          <ac:spMkLst>
+            <pc:docMk/>
+            <pc:sldMk cId="936772840" sldId="279"/>
+            <ac:spMk id="11" creationId="{13234C5F-23A0-9E7F-02BE-0B82B06B8AE3}"/>
+          </ac:spMkLst>
+        </pc:spChg>
+        <pc:picChg chg="mod">
+          <ac:chgData name="Sudhanshu Tiwari" userId="b0de518f36dbf967" providerId="LiveId" clId="{ABA6FB30-5F49-4925-B7B7-9A38E210E107}" dt="2025-11-30T15:24:17.295" v="305" actId="1076"/>
+          <ac:picMkLst>
+            <pc:docMk/>
+            <pc:sldMk cId="936772840" sldId="279"/>
+            <ac:picMk id="10244" creationId="{E9797EBD-E4C2-D965-0DBA-786E2BF126AE}"/>
+          </ac:picMkLst>
+        </pc:picChg>
+      </pc:sldChg>
+      <pc:sldChg chg="addSp modSp mod">
+        <pc:chgData name="Sudhanshu Tiwari" userId="b0de518f36dbf967" providerId="LiveId" clId="{ABA6FB30-5F49-4925-B7B7-9A38E210E107}" dt="2025-11-30T15:02:20.444" v="67" actId="20577"/>
+        <pc:sldMkLst>
+          <pc:docMk/>
+          <pc:sldMk cId="2098717111" sldId="281"/>
+        </pc:sldMkLst>
+        <pc:spChg chg="mod">
+          <ac:chgData name="Sudhanshu Tiwari" userId="b0de518f36dbf967" providerId="LiveId" clId="{ABA6FB30-5F49-4925-B7B7-9A38E210E107}" dt="2025-11-30T14:58:48.451" v="11" actId="14100"/>
+          <ac:spMkLst>
+            <pc:docMk/>
+            <pc:sldMk cId="2098717111" sldId="281"/>
+            <ac:spMk id="2" creationId="{DA5E89FB-656D-5D02-8CD2-C3A525958A2E}"/>
+          </ac:spMkLst>
+        </pc:spChg>
+        <pc:spChg chg="mod">
+          <ac:chgData name="Sudhanshu Tiwari" userId="b0de518f36dbf967" providerId="LiveId" clId="{ABA6FB30-5F49-4925-B7B7-9A38E210E107}" dt="2025-11-30T15:02:20.444" v="67" actId="20577"/>
+          <ac:spMkLst>
+            <pc:docMk/>
+            <pc:sldMk cId="2098717111" sldId="281"/>
+            <ac:spMk id="3" creationId="{306D3131-41A9-8430-27F4-B762CBE200E1}"/>
+          </ac:spMkLst>
+        </pc:spChg>
+        <pc:spChg chg="add mod">
+          <ac:chgData name="Sudhanshu Tiwari" userId="b0de518f36dbf967" providerId="LiveId" clId="{ABA6FB30-5F49-4925-B7B7-9A38E210E107}" dt="2025-11-30T15:02:16.579" v="65" actId="255"/>
+          <ac:spMkLst>
+            <pc:docMk/>
+            <pc:sldMk cId="2098717111" sldId="281"/>
+            <ac:spMk id="5" creationId="{486C1276-305C-DA5B-A112-AEDF9682FFA8}"/>
+          </ac:spMkLst>
+        </pc:spChg>
+        <pc:picChg chg="mod">
+          <ac:chgData name="Sudhanshu Tiwari" userId="b0de518f36dbf967" providerId="LiveId" clId="{ABA6FB30-5F49-4925-B7B7-9A38E210E107}" dt="2025-11-30T14:59:32.634" v="25" actId="1076"/>
+          <ac:picMkLst>
+            <pc:docMk/>
+            <pc:sldMk cId="2098717111" sldId="281"/>
+            <ac:picMk id="1026" creationId="{64AB10CC-96D2-07BB-321B-9911DE6AB41F}"/>
+          </ac:picMkLst>
+        </pc:picChg>
+      </pc:sldChg>
+      <pc:sldChg chg="addSp delSp modSp new mod ord">
+        <pc:chgData name="Sudhanshu Tiwari" userId="b0de518f36dbf967" providerId="LiveId" clId="{ABA6FB30-5F49-4925-B7B7-9A38E210E107}" dt="2025-11-30T15:23:02.585" v="293"/>
+        <pc:sldMkLst>
+          <pc:docMk/>
+          <pc:sldMk cId="2688012147" sldId="282"/>
+        </pc:sldMkLst>
+        <pc:spChg chg="del mod">
+          <ac:chgData name="Sudhanshu Tiwari" userId="b0de518f36dbf967" providerId="LiveId" clId="{ABA6FB30-5F49-4925-B7B7-9A38E210E107}" dt="2025-11-30T15:05:51.881" v="103" actId="478"/>
+          <ac:spMkLst>
+            <pc:docMk/>
+            <pc:sldMk cId="2688012147" sldId="282"/>
+            <ac:spMk id="2" creationId="{CD4465BB-AF70-5802-C5DB-FA760CD34464}"/>
+          </ac:spMkLst>
+        </pc:spChg>
+        <pc:spChg chg="del">
+          <ac:chgData name="Sudhanshu Tiwari" userId="b0de518f36dbf967" providerId="LiveId" clId="{ABA6FB30-5F49-4925-B7B7-9A38E210E107}" dt="2025-11-30T15:05:46.277" v="101"/>
+          <ac:spMkLst>
+            <pc:docMk/>
+            <pc:sldMk cId="2688012147" sldId="282"/>
+            <ac:spMk id="3" creationId="{AB7D40BB-348A-F3D8-B5F2-AFBD404C5114}"/>
+          </ac:spMkLst>
+        </pc:spChg>
+        <pc:spChg chg="add del mod">
+          <ac:chgData name="Sudhanshu Tiwari" userId="b0de518f36dbf967" providerId="LiveId" clId="{ABA6FB30-5F49-4925-B7B7-9A38E210E107}" dt="2025-11-30T15:10:57.052" v="132" actId="478"/>
+          <ac:spMkLst>
+            <pc:docMk/>
+            <pc:sldMk cId="2688012147" sldId="282"/>
+            <ac:spMk id="5" creationId="{9D6DA07C-0A68-BE65-72EE-6823BD25290E}"/>
+          </ac:spMkLst>
+        </pc:spChg>
+        <pc:spChg chg="add mod">
+          <ac:chgData name="Sudhanshu Tiwari" userId="b0de518f36dbf967" providerId="LiveId" clId="{ABA6FB30-5F49-4925-B7B7-9A38E210E107}" dt="2025-11-30T15:06:43.625" v="115" actId="1076"/>
+          <ac:spMkLst>
+            <pc:docMk/>
+            <pc:sldMk cId="2688012147" sldId="282"/>
+            <ac:spMk id="7" creationId="{6DBD9449-C4CF-C387-B506-3481E7455580}"/>
+          </ac:spMkLst>
+        </pc:spChg>
+        <pc:spChg chg="add mod">
+          <ac:chgData name="Sudhanshu Tiwari" userId="b0de518f36dbf967" providerId="LiveId" clId="{ABA6FB30-5F49-4925-B7B7-9A38E210E107}" dt="2025-11-30T15:14:15.753" v="168" actId="1076"/>
+          <ac:spMkLst>
+            <pc:docMk/>
+            <pc:sldMk cId="2688012147" sldId="282"/>
+            <ac:spMk id="9" creationId="{F2D8B6F1-C428-CEE8-1BE8-5317A26AD750}"/>
+          </ac:spMkLst>
+        </pc:spChg>
+        <pc:spChg chg="add mod">
+          <ac:chgData name="Sudhanshu Tiwari" userId="b0de518f36dbf967" providerId="LiveId" clId="{ABA6FB30-5F49-4925-B7B7-9A38E210E107}" dt="2025-11-30T15:14:52.133" v="170" actId="1076"/>
+          <ac:spMkLst>
+            <pc:docMk/>
+            <pc:sldMk cId="2688012147" sldId="282"/>
+            <ac:spMk id="11" creationId="{BB809535-844F-8D50-4406-16FE34EE85AC}"/>
+          </ac:spMkLst>
+        </pc:spChg>
+        <pc:graphicFrameChg chg="add mod modGraphic">
+          <ac:chgData name="Sudhanshu Tiwari" userId="b0de518f36dbf967" providerId="LiveId" clId="{ABA6FB30-5F49-4925-B7B7-9A38E210E107}" dt="2025-11-30T15:15:45.449" v="180" actId="6549"/>
+          <ac:graphicFrameMkLst>
+            <pc:docMk/>
+            <pc:sldMk cId="2688012147" sldId="282"/>
+            <ac:graphicFrameMk id="4" creationId="{C8FEE2F2-2FCB-A83F-D181-6A656EE60145}"/>
+          </ac:graphicFrameMkLst>
+        </pc:graphicFrameChg>
+      </pc:sldChg>
+      <pc:sldChg chg="addSp delSp modSp new mod setBg addAnim delAnim setClrOvrMap">
+        <pc:chgData name="Sudhanshu Tiwari" userId="b0de518f36dbf967" providerId="LiveId" clId="{ABA6FB30-5F49-4925-B7B7-9A38E210E107}" dt="2025-11-30T15:31:28.616" v="345" actId="26606"/>
+        <pc:sldMkLst>
+          <pc:docMk/>
+          <pc:sldMk cId="2658942909" sldId="283"/>
+        </pc:sldMkLst>
+        <pc:spChg chg="mod">
+          <ac:chgData name="Sudhanshu Tiwari" userId="b0de518f36dbf967" providerId="LiveId" clId="{ABA6FB30-5F49-4925-B7B7-9A38E210E107}" dt="2025-11-30T15:31:28.616" v="345" actId="26606"/>
+          <ac:spMkLst>
+            <pc:docMk/>
+            <pc:sldMk cId="2658942909" sldId="283"/>
+            <ac:spMk id="2" creationId="{E0F89DC9-D509-3855-1AEB-257A5B974932}"/>
+          </ac:spMkLst>
+        </pc:spChg>
+        <pc:spChg chg="add del">
+          <ac:chgData name="Sudhanshu Tiwari" userId="b0de518f36dbf967" providerId="LiveId" clId="{ABA6FB30-5F49-4925-B7B7-9A38E210E107}" dt="2025-11-30T15:31:15.305" v="330" actId="26606"/>
+          <ac:spMkLst>
+            <pc:docMk/>
+            <pc:sldMk cId="2658942909" sldId="283"/>
+            <ac:spMk id="11" creationId="{4FA533C5-33E3-4611-AF9F-72811D8B26A6}"/>
+          </ac:spMkLst>
+        </pc:spChg>
+        <pc:spChg chg="add del">
+          <ac:chgData name="Sudhanshu Tiwari" userId="b0de518f36dbf967" providerId="LiveId" clId="{ABA6FB30-5F49-4925-B7B7-9A38E210E107}" dt="2025-11-30T15:31:18.648" v="333" actId="26606"/>
+          <ac:spMkLst>
+            <pc:docMk/>
+            <pc:sldMk cId="2658942909" sldId="283"/>
+            <ac:spMk id="12" creationId="{989BE678-777B-482A-A616-FEDC47B162E5}"/>
+          </ac:spMkLst>
+        </pc:spChg>
+        <pc:spChg chg="add del">
+          <ac:chgData name="Sudhanshu Tiwari" userId="b0de518f36dbf967" providerId="LiveId" clId="{ABA6FB30-5F49-4925-B7B7-9A38E210E107}" dt="2025-11-30T15:31:15.305" v="330" actId="26606"/>
+          <ac:spMkLst>
+            <pc:docMk/>
+            <pc:sldMk cId="2658942909" sldId="283"/>
+            <ac:spMk id="17" creationId="{87F0FDC4-AD8C-47D9-9131-623C98ADB0AE}"/>
+          </ac:spMkLst>
+        </pc:spChg>
+        <pc:spChg chg="add del">
+          <ac:chgData name="Sudhanshu Tiwari" userId="b0de518f36dbf967" providerId="LiveId" clId="{ABA6FB30-5F49-4925-B7B7-9A38E210E107}" dt="2025-11-30T15:31:18.648" v="333" actId="26606"/>
+          <ac:spMkLst>
+            <pc:docMk/>
+            <pc:sldMk cId="2658942909" sldId="283"/>
+            <ac:spMk id="18" creationId="{D28BE0C3-2102-4820-B88B-A448B1840D14}"/>
+          </ac:spMkLst>
+        </pc:spChg>
+        <pc:spChg chg="add del">
+          <ac:chgData name="Sudhanshu Tiwari" userId="b0de518f36dbf967" providerId="LiveId" clId="{ABA6FB30-5F49-4925-B7B7-9A38E210E107}" dt="2025-11-30T15:31:15.305" v="330" actId="26606"/>
+          <ac:spMkLst>
+            <pc:docMk/>
+            <pc:sldMk cId="2658942909" sldId="283"/>
+            <ac:spMk id="19" creationId="{E6A222EB-A81E-4238-B08D-AAB1828C8E0B}"/>
+          </ac:spMkLst>
+        </pc:spChg>
+        <pc:spChg chg="add del">
+          <ac:chgData name="Sudhanshu Tiwari" userId="b0de518f36dbf967" providerId="LiveId" clId="{ABA6FB30-5F49-4925-B7B7-9A38E210E107}" dt="2025-11-30T15:31:18.648" v="333" actId="26606"/>
+          <ac:spMkLst>
+            <pc:docMk/>
+            <pc:sldMk cId="2658942909" sldId="283"/>
+            <ac:spMk id="20" creationId="{C6A81905-F480-46A4-BC10-215D24EA1AE6}"/>
+          </ac:spMkLst>
+        </pc:spChg>
+        <pc:spChg chg="add del">
+          <ac:chgData name="Sudhanshu Tiwari" userId="b0de518f36dbf967" providerId="LiveId" clId="{ABA6FB30-5F49-4925-B7B7-9A38E210E107}" dt="2025-11-30T15:31:15.305" v="330" actId="26606"/>
+          <ac:spMkLst>
+            <pc:docMk/>
+            <pc:sldMk cId="2658942909" sldId="283"/>
+            <ac:spMk id="21" creationId="{E014676C-074B-475A-8346-9C901C86CB97}"/>
+          </ac:spMkLst>
+        </pc:spChg>
+        <pc:spChg chg="add del">
+          <ac:chgData name="Sudhanshu Tiwari" userId="b0de518f36dbf967" providerId="LiveId" clId="{ABA6FB30-5F49-4925-B7B7-9A38E210E107}" dt="2025-11-30T15:31:18.648" v="333" actId="26606"/>
+          <ac:spMkLst>
+            <pc:docMk/>
+            <pc:sldMk cId="2658942909" sldId="283"/>
+            <ac:spMk id="22" creationId="{36FD4D9D-3784-41E8-8405-A42B72F51331}"/>
+          </ac:spMkLst>
+        </pc:spChg>
+        <pc:spChg chg="add del">
+          <ac:chgData name="Sudhanshu Tiwari" userId="b0de518f36dbf967" providerId="LiveId" clId="{ABA6FB30-5F49-4925-B7B7-9A38E210E107}" dt="2025-11-30T15:31:18.648" v="333" actId="26606"/>
+          <ac:spMkLst>
+            <pc:docMk/>
+            <pc:sldMk cId="2658942909" sldId="283"/>
+            <ac:spMk id="24" creationId="{60817A52-B891-4228-A61E-0C0A57632DDA}"/>
+          </ac:spMkLst>
+        </pc:spChg>
+        <pc:spChg chg="add del">
+          <ac:chgData name="Sudhanshu Tiwari" userId="b0de518f36dbf967" providerId="LiveId" clId="{ABA6FB30-5F49-4925-B7B7-9A38E210E107}" dt="2025-11-30T15:31:21.122" v="337" actId="26606"/>
+          <ac:spMkLst>
+            <pc:docMk/>
+            <pc:sldMk cId="2658942909" sldId="283"/>
+            <ac:spMk id="25" creationId="{09811DF6-66E4-43D5-B564-3151796531ED}"/>
+          </ac:spMkLst>
+        </pc:spChg>
+        <pc:spChg chg="add del">
+          <ac:chgData name="Sudhanshu Tiwari" userId="b0de518f36dbf967" providerId="LiveId" clId="{ABA6FB30-5F49-4925-B7B7-9A38E210E107}" dt="2025-11-30T15:31:21.122" v="337" actId="26606"/>
+          <ac:spMkLst>
+            <pc:docMk/>
+            <pc:sldMk cId="2658942909" sldId="283"/>
+            <ac:spMk id="27" creationId="{60817A52-B891-4228-A61E-0C0A57632DDA}"/>
+          </ac:spMkLst>
+        </pc:spChg>
+        <pc:spChg chg="add del">
+          <ac:chgData name="Sudhanshu Tiwari" userId="b0de518f36dbf967" providerId="LiveId" clId="{ABA6FB30-5F49-4925-B7B7-9A38E210E107}" dt="2025-11-30T15:31:21.122" v="337" actId="26606"/>
+          <ac:spMkLst>
+            <pc:docMk/>
+            <pc:sldMk cId="2658942909" sldId="283"/>
+            <ac:spMk id="29" creationId="{4AC0CD9D-7610-4620-93B4-798CCD9AB581}"/>
+          </ac:spMkLst>
+        </pc:spChg>
+        <pc:spChg chg="add del">
+          <ac:chgData name="Sudhanshu Tiwari" userId="b0de518f36dbf967" providerId="LiveId" clId="{ABA6FB30-5F49-4925-B7B7-9A38E210E107}" dt="2025-11-30T15:31:21.122" v="337" actId="26606"/>
+          <ac:spMkLst>
+            <pc:docMk/>
+            <pc:sldMk cId="2658942909" sldId="283"/>
+            <ac:spMk id="32" creationId="{DE4D62F9-188E-4530-84C2-24BDEE4BEB82}"/>
+          </ac:spMkLst>
+        </pc:spChg>
+        <pc:spChg chg="add del">
+          <ac:chgData name="Sudhanshu Tiwari" userId="b0de518f36dbf967" providerId="LiveId" clId="{ABA6FB30-5F49-4925-B7B7-9A38E210E107}" dt="2025-11-30T15:31:21.122" v="337" actId="26606"/>
+          <ac:spMkLst>
+            <pc:docMk/>
+            <pc:sldMk cId="2658942909" sldId="283"/>
+            <ac:spMk id="33" creationId="{C6A81905-F480-46A4-BC10-215D24EA1AE6}"/>
+          </ac:spMkLst>
+        </pc:spChg>
+        <pc:spChg chg="add del">
+          <ac:chgData name="Sudhanshu Tiwari" userId="b0de518f36dbf967" providerId="LiveId" clId="{ABA6FB30-5F49-4925-B7B7-9A38E210E107}" dt="2025-11-30T15:31:21.122" v="337" actId="26606"/>
+          <ac:spMkLst>
+            <pc:docMk/>
+            <pc:sldMk cId="2658942909" sldId="283"/>
+            <ac:spMk id="34" creationId="{36FD4D9D-3784-41E8-8405-A42B72F51331}"/>
+          </ac:spMkLst>
+        </pc:spChg>
+        <pc:spChg chg="add del">
+          <ac:chgData name="Sudhanshu Tiwari" userId="b0de518f36dbf967" providerId="LiveId" clId="{ABA6FB30-5F49-4925-B7B7-9A38E210E107}" dt="2025-11-30T15:31:24.655" v="340" actId="26606"/>
+          <ac:spMkLst>
+            <pc:docMk/>
+            <pc:sldMk cId="2658942909" sldId="283"/>
+            <ac:spMk id="38" creationId="{989BE678-777B-482A-A616-FEDC47B162E5}"/>
+          </ac:spMkLst>
+        </pc:spChg>
+        <pc:spChg chg="add del">
+          <ac:chgData name="Sudhanshu Tiwari" userId="b0de518f36dbf967" providerId="LiveId" clId="{ABA6FB30-5F49-4925-B7B7-9A38E210E107}" dt="2025-11-30T15:31:24.655" v="340" actId="26606"/>
+          <ac:spMkLst>
+            <pc:docMk/>
+            <pc:sldMk cId="2658942909" sldId="283"/>
+            <ac:spMk id="41" creationId="{D28BE0C3-2102-4820-B88B-A448B1840D14}"/>
+          </ac:spMkLst>
+        </pc:spChg>
+        <pc:spChg chg="add del">
+          <ac:chgData name="Sudhanshu Tiwari" userId="b0de518f36dbf967" providerId="LiveId" clId="{ABA6FB30-5F49-4925-B7B7-9A38E210E107}" dt="2025-11-30T15:31:24.655" v="340" actId="26606"/>
+          <ac:spMkLst>
+            <pc:docMk/>
+            <pc:sldMk cId="2658942909" sldId="283"/>
+            <ac:spMk id="42" creationId="{C6A81905-F480-46A4-BC10-215D24EA1AE6}"/>
+          </ac:spMkLst>
+        </pc:spChg>
+        <pc:spChg chg="add del">
+          <ac:chgData name="Sudhanshu Tiwari" userId="b0de518f36dbf967" providerId="LiveId" clId="{ABA6FB30-5F49-4925-B7B7-9A38E210E107}" dt="2025-11-30T15:31:24.655" v="340" actId="26606"/>
+          <ac:spMkLst>
+            <pc:docMk/>
+            <pc:sldMk cId="2658942909" sldId="283"/>
+            <ac:spMk id="43" creationId="{36FD4D9D-3784-41E8-8405-A42B72F51331}"/>
+          </ac:spMkLst>
+        </pc:spChg>
+        <pc:spChg chg="add del">
+          <ac:chgData name="Sudhanshu Tiwari" userId="b0de518f36dbf967" providerId="LiveId" clId="{ABA6FB30-5F49-4925-B7B7-9A38E210E107}" dt="2025-11-30T15:31:24.655" v="340" actId="26606"/>
+          <ac:spMkLst>
+            <pc:docMk/>
+            <pc:sldMk cId="2658942909" sldId="283"/>
+            <ac:spMk id="45" creationId="{60817A52-B891-4228-A61E-0C0A57632DDA}"/>
+          </ac:spMkLst>
+        </pc:spChg>
+        <pc:spChg chg="add del">
+          <ac:chgData name="Sudhanshu Tiwari" userId="b0de518f36dbf967" providerId="LiveId" clId="{ABA6FB30-5F49-4925-B7B7-9A38E210E107}" dt="2025-11-30T15:31:26.761" v="342" actId="26606"/>
+          <ac:spMkLst>
+            <pc:docMk/>
+            <pc:sldMk cId="2658942909" sldId="283"/>
+            <ac:spMk id="49" creationId="{4AC0CD9D-7610-4620-93B4-798CCD9AB581}"/>
+          </ac:spMkLst>
+        </pc:spChg>
+        <pc:spChg chg="add del">
+          <ac:chgData name="Sudhanshu Tiwari" userId="b0de518f36dbf967" providerId="LiveId" clId="{ABA6FB30-5F49-4925-B7B7-9A38E210E107}" dt="2025-11-30T15:31:26.761" v="342" actId="26606"/>
+          <ac:spMkLst>
+            <pc:docMk/>
+            <pc:sldMk cId="2658942909" sldId="283"/>
+            <ac:spMk id="52" creationId="{DE4D62F9-188E-4530-84C2-24BDEE4BEB82}"/>
+          </ac:spMkLst>
+        </pc:spChg>
+        <pc:spChg chg="add del">
+          <ac:chgData name="Sudhanshu Tiwari" userId="b0de518f36dbf967" providerId="LiveId" clId="{ABA6FB30-5F49-4925-B7B7-9A38E210E107}" dt="2025-11-30T15:31:26.761" v="342" actId="26606"/>
+          <ac:spMkLst>
+            <pc:docMk/>
+            <pc:sldMk cId="2658942909" sldId="283"/>
+            <ac:spMk id="53" creationId="{C72330AA-E11E-458E-8798-12C7F77383B8}"/>
+          </ac:spMkLst>
+        </pc:spChg>
+        <pc:spChg chg="add del">
+          <ac:chgData name="Sudhanshu Tiwari" userId="b0de518f36dbf967" providerId="LiveId" clId="{ABA6FB30-5F49-4925-B7B7-9A38E210E107}" dt="2025-11-30T15:31:26.761" v="342" actId="26606"/>
+          <ac:spMkLst>
+            <pc:docMk/>
+            <pc:sldMk cId="2658942909" sldId="283"/>
+            <ac:spMk id="54" creationId="{A6BDC1B0-0C91-4230-BFEB-9C8ED19B9A3A}"/>
+          </ac:spMkLst>
+        </pc:spChg>
+        <pc:spChg chg="add del">
+          <ac:chgData name="Sudhanshu Tiwari" userId="b0de518f36dbf967" providerId="LiveId" clId="{ABA6FB30-5F49-4925-B7B7-9A38E210E107}" dt="2025-11-30T15:31:26.761" v="342" actId="26606"/>
+          <ac:spMkLst>
+            <pc:docMk/>
+            <pc:sldMk cId="2658942909" sldId="283"/>
+            <ac:spMk id="55" creationId="{68E0A26E-4EA8-4E6C-97A2-7B6C1C13F8CF}"/>
+          </ac:spMkLst>
+        </pc:spChg>
+        <pc:spChg chg="add del">
+          <ac:chgData name="Sudhanshu Tiwari" userId="b0de518f36dbf967" providerId="LiveId" clId="{ABA6FB30-5F49-4925-B7B7-9A38E210E107}" dt="2025-11-30T15:31:26.761" v="342" actId="26606"/>
+          <ac:spMkLst>
+            <pc:docMk/>
+            <pc:sldMk cId="2658942909" sldId="283"/>
+            <ac:spMk id="56" creationId="{C1841CC0-B7A9-4828-B82F-9C6B433BDCAE}"/>
+          </ac:spMkLst>
+        </pc:spChg>
+        <pc:spChg chg="add del">
+          <ac:chgData name="Sudhanshu Tiwari" userId="b0de518f36dbf967" providerId="LiveId" clId="{ABA6FB30-5F49-4925-B7B7-9A38E210E107}" dt="2025-11-30T15:31:28.572" v="344" actId="26606"/>
+          <ac:spMkLst>
+            <pc:docMk/>
+            <pc:sldMk cId="2658942909" sldId="283"/>
+            <ac:spMk id="67" creationId="{4FA533C5-33E3-4611-AF9F-72811D8B26A6}"/>
+          </ac:spMkLst>
+        </pc:spChg>
+        <pc:spChg chg="add del">
+          <ac:chgData name="Sudhanshu Tiwari" userId="b0de518f36dbf967" providerId="LiveId" clId="{ABA6FB30-5F49-4925-B7B7-9A38E210E107}" dt="2025-11-30T15:31:28.572" v="344" actId="26606"/>
+          <ac:spMkLst>
+            <pc:docMk/>
+            <pc:sldMk cId="2658942909" sldId="283"/>
+            <ac:spMk id="70" creationId="{87F0FDC4-AD8C-47D9-9131-623C98ADB0AE}"/>
+          </ac:spMkLst>
+        </pc:spChg>
+        <pc:spChg chg="add del">
+          <ac:chgData name="Sudhanshu Tiwari" userId="b0de518f36dbf967" providerId="LiveId" clId="{ABA6FB30-5F49-4925-B7B7-9A38E210E107}" dt="2025-11-30T15:31:28.572" v="344" actId="26606"/>
+          <ac:spMkLst>
+            <pc:docMk/>
+            <pc:sldMk cId="2658942909" sldId="283"/>
+            <ac:spMk id="71" creationId="{DE27238C-8EAF-4098-86E6-7723B7DAE601}"/>
+          </ac:spMkLst>
+        </pc:spChg>
+        <pc:spChg chg="add del">
+          <ac:chgData name="Sudhanshu Tiwari" userId="b0de518f36dbf967" providerId="LiveId" clId="{ABA6FB30-5F49-4925-B7B7-9A38E210E107}" dt="2025-11-30T15:31:28.572" v="344" actId="26606"/>
+          <ac:spMkLst>
+            <pc:docMk/>
+            <pc:sldMk cId="2658942909" sldId="283"/>
+            <ac:spMk id="72" creationId="{992F97B1-1891-4FCC-9E5F-BA97EDB48F89}"/>
+          </ac:spMkLst>
+        </pc:spChg>
+        <pc:spChg chg="add del">
+          <ac:chgData name="Sudhanshu Tiwari" userId="b0de518f36dbf967" providerId="LiveId" clId="{ABA6FB30-5F49-4925-B7B7-9A38E210E107}" dt="2025-11-30T15:31:28.572" v="344" actId="26606"/>
+          <ac:spMkLst>
+            <pc:docMk/>
+            <pc:sldMk cId="2658942909" sldId="283"/>
+            <ac:spMk id="73" creationId="{78C6C821-FEE1-4EB6-9590-C021440C77DE}"/>
+          </ac:spMkLst>
+        </pc:spChg>
+        <pc:spChg chg="add del">
+          <ac:chgData name="Sudhanshu Tiwari" userId="b0de518f36dbf967" providerId="LiveId" clId="{ABA6FB30-5F49-4925-B7B7-9A38E210E107}" dt="2025-11-30T15:31:28.572" v="344" actId="26606"/>
+          <ac:spMkLst>
+            <pc:docMk/>
+            <pc:sldMk cId="2658942909" sldId="283"/>
+            <ac:spMk id="74" creationId="{B61A74B3-E247-44D4-8C48-FAE8E2056401}"/>
+          </ac:spMkLst>
+        </pc:spChg>
+        <pc:spChg chg="add">
+          <ac:chgData name="Sudhanshu Tiwari" userId="b0de518f36dbf967" providerId="LiveId" clId="{ABA6FB30-5F49-4925-B7B7-9A38E210E107}" dt="2025-11-30T15:31:28.616" v="345" actId="26606"/>
+          <ac:spMkLst>
+            <pc:docMk/>
+            <pc:sldMk cId="2658942909" sldId="283"/>
+            <ac:spMk id="78" creationId="{4FA533C5-33E3-4611-AF9F-72811D8B26A6}"/>
+          </ac:spMkLst>
+        </pc:spChg>
+        <pc:spChg chg="add">
+          <ac:chgData name="Sudhanshu Tiwari" userId="b0de518f36dbf967" providerId="LiveId" clId="{ABA6FB30-5F49-4925-B7B7-9A38E210E107}" dt="2025-11-30T15:31:28.616" v="345" actId="26606"/>
+          <ac:spMkLst>
+            <pc:docMk/>
+            <pc:sldMk cId="2658942909" sldId="283"/>
+            <ac:spMk id="81" creationId="{87F0FDC4-AD8C-47D9-9131-623C98ADB0AE}"/>
+          </ac:spMkLst>
+        </pc:spChg>
+        <pc:spChg chg="add">
+          <ac:chgData name="Sudhanshu Tiwari" userId="b0de518f36dbf967" providerId="LiveId" clId="{ABA6FB30-5F49-4925-B7B7-9A38E210E107}" dt="2025-11-30T15:31:28.616" v="345" actId="26606"/>
+          <ac:spMkLst>
+            <pc:docMk/>
+            <pc:sldMk cId="2658942909" sldId="283"/>
+            <ac:spMk id="82" creationId="{E6A222EB-A81E-4238-B08D-AAB1828C8E0B}"/>
+          </ac:spMkLst>
+        </pc:spChg>
+        <pc:spChg chg="add">
+          <ac:chgData name="Sudhanshu Tiwari" userId="b0de518f36dbf967" providerId="LiveId" clId="{ABA6FB30-5F49-4925-B7B7-9A38E210E107}" dt="2025-11-30T15:31:28.616" v="345" actId="26606"/>
+          <ac:spMkLst>
+            <pc:docMk/>
+            <pc:sldMk cId="2658942909" sldId="283"/>
+            <ac:spMk id="83" creationId="{E014676C-074B-475A-8346-9C901C86CB97}"/>
+          </ac:spMkLst>
+        </pc:spChg>
+        <pc:picChg chg="add del">
+          <ac:chgData name="Sudhanshu Tiwari" userId="b0de518f36dbf967" providerId="LiveId" clId="{ABA6FB30-5F49-4925-B7B7-9A38E210E107}" dt="2025-11-30T15:31:18.648" v="333" actId="26606"/>
+          <ac:picMkLst>
+            <pc:docMk/>
+            <pc:sldMk cId="2658942909" sldId="283"/>
+            <ac:picMk id="4" creationId="{2809B102-1D38-685A-F652-BED4AAD9B372}"/>
+          </ac:picMkLst>
+        </pc:picChg>
+        <pc:picChg chg="add del">
+          <ac:chgData name="Sudhanshu Tiwari" userId="b0de518f36dbf967" providerId="LiveId" clId="{ABA6FB30-5F49-4925-B7B7-9A38E210E107}" dt="2025-11-30T15:31:15.305" v="330" actId="26606"/>
+          <ac:picMkLst>
+            <pc:docMk/>
+            <pc:sldMk cId="2658942909" sldId="283"/>
+            <ac:picMk id="7" creationId="{91B28F63-CF00-448F-B141-FE33C33B1891}"/>
+          </ac:picMkLst>
+        </pc:picChg>
+        <pc:picChg chg="add del">
+          <ac:chgData name="Sudhanshu Tiwari" userId="b0de518f36dbf967" providerId="LiveId" clId="{ABA6FB30-5F49-4925-B7B7-9A38E210E107}" dt="2025-11-30T15:31:18.648" v="333" actId="26606"/>
+          <ac:picMkLst>
+            <pc:docMk/>
+            <pc:sldMk cId="2658942909" sldId="283"/>
+            <ac:picMk id="8" creationId="{DF19BAF3-7E20-4B9D-B544-BABAEEA1FA75}"/>
+          </ac:picMkLst>
+        </pc:picChg>
+        <pc:picChg chg="add del">
+          <ac:chgData name="Sudhanshu Tiwari" userId="b0de518f36dbf967" providerId="LiveId" clId="{ABA6FB30-5F49-4925-B7B7-9A38E210E107}" dt="2025-11-30T15:31:15.305" v="330" actId="26606"/>
+          <ac:picMkLst>
+            <pc:docMk/>
+            <pc:sldMk cId="2658942909" sldId="283"/>
+            <ac:picMk id="9" creationId="{2AE609E2-8522-44E4-9077-980E5BCF3E14}"/>
+          </ac:picMkLst>
+        </pc:picChg>
+        <pc:picChg chg="add del">
+          <ac:chgData name="Sudhanshu Tiwari" userId="b0de518f36dbf967" providerId="LiveId" clId="{ABA6FB30-5F49-4925-B7B7-9A38E210E107}" dt="2025-11-30T15:31:15.305" v="330" actId="26606"/>
+          <ac:picMkLst>
+            <pc:docMk/>
+            <pc:sldMk cId="2658942909" sldId="283"/>
+            <ac:picMk id="13" creationId="{8949AD42-25FD-4C3D-9EEE-B7FEC5809988}"/>
+          </ac:picMkLst>
+        </pc:picChg>
+        <pc:picChg chg="add del">
+          <ac:chgData name="Sudhanshu Tiwari" userId="b0de518f36dbf967" providerId="LiveId" clId="{ABA6FB30-5F49-4925-B7B7-9A38E210E107}" dt="2025-11-30T15:31:18.648" v="333" actId="26606"/>
+          <ac:picMkLst>
+            <pc:docMk/>
+            <pc:sldMk cId="2658942909" sldId="283"/>
+            <ac:picMk id="14" creationId="{CF1EB4BD-9C7E-4AA3-9681-C7EB0DA6250B}"/>
+          </ac:picMkLst>
+        </pc:picChg>
+        <pc:picChg chg="add del">
+          <ac:chgData name="Sudhanshu Tiwari" userId="b0de518f36dbf967" providerId="LiveId" clId="{ABA6FB30-5F49-4925-B7B7-9A38E210E107}" dt="2025-11-30T15:31:15.305" v="330" actId="26606"/>
+          <ac:picMkLst>
+            <pc:docMk/>
+            <pc:sldMk cId="2658942909" sldId="283"/>
+            <ac:picMk id="15" creationId="{6AC7D913-60B7-4603-881B-831DA5D3A940}"/>
+          </ac:picMkLst>
+        </pc:picChg>
+        <pc:picChg chg="add del">
+          <ac:chgData name="Sudhanshu Tiwari" userId="b0de518f36dbf967" providerId="LiveId" clId="{ABA6FB30-5F49-4925-B7B7-9A38E210E107}" dt="2025-11-30T15:31:18.648" v="333" actId="26606"/>
+          <ac:picMkLst>
+            <pc:docMk/>
+            <pc:sldMk cId="2658942909" sldId="283"/>
+            <ac:picMk id="16" creationId="{94AAE3AA-3759-4D28-B0EF-575F25A5146C}"/>
+          </ac:picMkLst>
+        </pc:picChg>
+        <pc:picChg chg="add del">
+          <ac:chgData name="Sudhanshu Tiwari" userId="b0de518f36dbf967" providerId="LiveId" clId="{ABA6FB30-5F49-4925-B7B7-9A38E210E107}" dt="2025-11-30T15:31:21.122" v="337" actId="26606"/>
+          <ac:picMkLst>
+            <pc:docMk/>
+            <pc:sldMk cId="2658942909" sldId="283"/>
+            <ac:picMk id="26" creationId="{41B68C77-138E-4BF7-A276-BD0C78A4219F}"/>
+          </ac:picMkLst>
+        </pc:picChg>
+        <pc:picChg chg="add del">
+          <ac:chgData name="Sudhanshu Tiwari" userId="b0de518f36dbf967" providerId="LiveId" clId="{ABA6FB30-5F49-4925-B7B7-9A38E210E107}" dt="2025-11-30T15:31:21.122" v="337" actId="26606"/>
+          <ac:picMkLst>
+            <pc:docMk/>
+            <pc:sldMk cId="2658942909" sldId="283"/>
+            <ac:picMk id="28" creationId="{7C268552-D473-46ED-B1B8-422042C4DEF1}"/>
+          </ac:picMkLst>
+        </pc:picChg>
+        <pc:picChg chg="add del">
+          <ac:chgData name="Sudhanshu Tiwari" userId="b0de518f36dbf967" providerId="LiveId" clId="{ABA6FB30-5F49-4925-B7B7-9A38E210E107}" dt="2025-11-30T15:31:21.122" v="337" actId="26606"/>
+          <ac:picMkLst>
+            <pc:docMk/>
+            <pc:sldMk cId="2658942909" sldId="283"/>
+            <ac:picMk id="31" creationId="{69F01145-BEA3-4CBF-AA21-10077B948CA8}"/>
+          </ac:picMkLst>
+        </pc:picChg>
+        <pc:picChg chg="add del">
+          <ac:chgData name="Sudhanshu Tiwari" userId="b0de518f36dbf967" providerId="LiveId" clId="{ABA6FB30-5F49-4925-B7B7-9A38E210E107}" dt="2025-11-30T15:31:24.655" v="340" actId="26606"/>
+          <ac:picMkLst>
+            <pc:docMk/>
+            <pc:sldMk cId="2658942909" sldId="283"/>
+            <ac:picMk id="36" creationId="{DF19BAF3-7E20-4B9D-B544-BABAEEA1FA75}"/>
+          </ac:picMkLst>
+        </pc:picChg>
+        <pc:picChg chg="add del">
+          <ac:chgData name="Sudhanshu Tiwari" userId="b0de518f36dbf967" providerId="LiveId" clId="{ABA6FB30-5F49-4925-B7B7-9A38E210E107}" dt="2025-11-30T15:31:24.655" v="340" actId="26606"/>
+          <ac:picMkLst>
+            <pc:docMk/>
+            <pc:sldMk cId="2658942909" sldId="283"/>
+            <ac:picMk id="37" creationId="{950648F4-ABCD-4DF0-8641-76CFB2354721}"/>
+          </ac:picMkLst>
+        </pc:picChg>
+        <pc:picChg chg="add del">
+          <ac:chgData name="Sudhanshu Tiwari" userId="b0de518f36dbf967" providerId="LiveId" clId="{ABA6FB30-5F49-4925-B7B7-9A38E210E107}" dt="2025-11-30T15:31:24.655" v="340" actId="26606"/>
+          <ac:picMkLst>
+            <pc:docMk/>
+            <pc:sldMk cId="2658942909" sldId="283"/>
+            <ac:picMk id="39" creationId="{CF1EB4BD-9C7E-4AA3-9681-C7EB0DA6250B}"/>
+          </ac:picMkLst>
+        </pc:picChg>
+        <pc:picChg chg="add del">
+          <ac:chgData name="Sudhanshu Tiwari" userId="b0de518f36dbf967" providerId="LiveId" clId="{ABA6FB30-5F49-4925-B7B7-9A38E210E107}" dt="2025-11-30T15:31:24.655" v="340" actId="26606"/>
+          <ac:picMkLst>
+            <pc:docMk/>
+            <pc:sldMk cId="2658942909" sldId="283"/>
+            <ac:picMk id="40" creationId="{94AAE3AA-3759-4D28-B0EF-575F25A5146C}"/>
+          </ac:picMkLst>
+        </pc:picChg>
+        <pc:picChg chg="add del">
+          <ac:chgData name="Sudhanshu Tiwari" userId="b0de518f36dbf967" providerId="LiveId" clId="{ABA6FB30-5F49-4925-B7B7-9A38E210E107}" dt="2025-11-30T15:31:26.761" v="342" actId="26606"/>
+          <ac:picMkLst>
+            <pc:docMk/>
+            <pc:sldMk cId="2658942909" sldId="283"/>
+            <ac:picMk id="48" creationId="{7C268552-D473-46ED-B1B8-422042C4DEF1}"/>
+          </ac:picMkLst>
+        </pc:picChg>
+        <pc:picChg chg="add del">
+          <ac:chgData name="Sudhanshu Tiwari" userId="b0de518f36dbf967" providerId="LiveId" clId="{ABA6FB30-5F49-4925-B7B7-9A38E210E107}" dt="2025-11-30T15:31:26.761" v="342" actId="26606"/>
+          <ac:picMkLst>
+            <pc:docMk/>
+            <pc:sldMk cId="2658942909" sldId="283"/>
+            <ac:picMk id="50" creationId="{B9238B3E-24AA-439A-B527-6C5DF6D72145}"/>
+          </ac:picMkLst>
+        </pc:picChg>
+        <pc:picChg chg="add del">
+          <ac:chgData name="Sudhanshu Tiwari" userId="b0de518f36dbf967" providerId="LiveId" clId="{ABA6FB30-5F49-4925-B7B7-9A38E210E107}" dt="2025-11-30T15:31:26.761" v="342" actId="26606"/>
+          <ac:picMkLst>
+            <pc:docMk/>
+            <pc:sldMk cId="2658942909" sldId="283"/>
+            <ac:picMk id="63" creationId="{3CA83D2B-FDF1-D2D4-1288-DF83129579F9}"/>
+          </ac:picMkLst>
+        </pc:picChg>
+        <pc:picChg chg="add del">
+          <ac:chgData name="Sudhanshu Tiwari" userId="b0de518f36dbf967" providerId="LiveId" clId="{ABA6FB30-5F49-4925-B7B7-9A38E210E107}" dt="2025-11-30T15:31:28.572" v="344" actId="26606"/>
+          <ac:picMkLst>
+            <pc:docMk/>
+            <pc:sldMk cId="2658942909" sldId="283"/>
+            <ac:picMk id="66" creationId="{2AE609E2-8522-44E4-9077-980E5BCF3E14}"/>
+          </ac:picMkLst>
+        </pc:picChg>
+        <pc:picChg chg="add del">
+          <ac:chgData name="Sudhanshu Tiwari" userId="b0de518f36dbf967" providerId="LiveId" clId="{ABA6FB30-5F49-4925-B7B7-9A38E210E107}" dt="2025-11-30T15:31:28.572" v="344" actId="26606"/>
+          <ac:picMkLst>
+            <pc:docMk/>
+            <pc:sldMk cId="2658942909" sldId="283"/>
+            <ac:picMk id="68" creationId="{8949AD42-25FD-4C3D-9EEE-B7FEC5809988}"/>
+          </ac:picMkLst>
+        </pc:picChg>
+        <pc:picChg chg="add del">
+          <ac:chgData name="Sudhanshu Tiwari" userId="b0de518f36dbf967" providerId="LiveId" clId="{ABA6FB30-5F49-4925-B7B7-9A38E210E107}" dt="2025-11-30T15:31:28.572" v="344" actId="26606"/>
+          <ac:picMkLst>
+            <pc:docMk/>
+            <pc:sldMk cId="2658942909" sldId="283"/>
+            <ac:picMk id="69" creationId="{6AC7D913-60B7-4603-881B-831DA5D3A940}"/>
+          </ac:picMkLst>
+        </pc:picChg>
+        <pc:picChg chg="add">
+          <ac:chgData name="Sudhanshu Tiwari" userId="b0de518f36dbf967" providerId="LiveId" clId="{ABA6FB30-5F49-4925-B7B7-9A38E210E107}" dt="2025-11-30T15:31:28.616" v="345" actId="26606"/>
+          <ac:picMkLst>
+            <pc:docMk/>
+            <pc:sldMk cId="2658942909" sldId="283"/>
+            <ac:picMk id="76" creationId="{91B28F63-CF00-448F-B141-FE33C33B1891}"/>
+          </ac:picMkLst>
+        </pc:picChg>
+        <pc:picChg chg="add">
+          <ac:chgData name="Sudhanshu Tiwari" userId="b0de518f36dbf967" providerId="LiveId" clId="{ABA6FB30-5F49-4925-B7B7-9A38E210E107}" dt="2025-11-30T15:31:28.616" v="345" actId="26606"/>
+          <ac:picMkLst>
+            <pc:docMk/>
+            <pc:sldMk cId="2658942909" sldId="283"/>
+            <ac:picMk id="77" creationId="{2AE609E2-8522-44E4-9077-980E5BCF3E14}"/>
+          </ac:picMkLst>
+        </pc:picChg>
+        <pc:picChg chg="add">
+          <ac:chgData name="Sudhanshu Tiwari" userId="b0de518f36dbf967" providerId="LiveId" clId="{ABA6FB30-5F49-4925-B7B7-9A38E210E107}" dt="2025-11-30T15:31:28.616" v="345" actId="26606"/>
+          <ac:picMkLst>
+            <pc:docMk/>
+            <pc:sldMk cId="2658942909" sldId="283"/>
+            <ac:picMk id="79" creationId="{8949AD42-25FD-4C3D-9EEE-B7FEC5809988}"/>
+          </ac:picMkLst>
+        </pc:picChg>
+        <pc:picChg chg="add">
+          <ac:chgData name="Sudhanshu Tiwari" userId="b0de518f36dbf967" providerId="LiveId" clId="{ABA6FB30-5F49-4925-B7B7-9A38E210E107}" dt="2025-11-30T15:31:28.616" v="345" actId="26606"/>
+          <ac:picMkLst>
+            <pc:docMk/>
+            <pc:sldMk cId="2658942909" sldId="283"/>
+            <ac:picMk id="80" creationId="{6AC7D913-60B7-4603-881B-831DA5D3A940}"/>
+          </ac:picMkLst>
+        </pc:picChg>
+        <pc:cxnChg chg="add del">
+          <ac:chgData name="Sudhanshu Tiwari" userId="b0de518f36dbf967" providerId="LiveId" clId="{ABA6FB30-5F49-4925-B7B7-9A38E210E107}" dt="2025-11-30T15:31:15.305" v="330" actId="26606"/>
+          <ac:cxnSpMkLst>
+            <pc:docMk/>
+            <pc:sldMk cId="2658942909" sldId="283"/>
+            <ac:cxnSpMk id="23" creationId="{179C4C8E-197B-4679-AE96-B5147F971C90}"/>
+          </ac:cxnSpMkLst>
+        </pc:cxnChg>
+        <pc:cxnChg chg="add">
+          <ac:chgData name="Sudhanshu Tiwari" userId="b0de518f36dbf967" providerId="LiveId" clId="{ABA6FB30-5F49-4925-B7B7-9A38E210E107}" dt="2025-11-30T15:31:28.616" v="345" actId="26606"/>
+          <ac:cxnSpMkLst>
+            <pc:docMk/>
+            <pc:sldMk cId="2658942909" sldId="283"/>
+            <ac:cxnSpMk id="84" creationId="{179C4C8E-197B-4679-AE96-B5147F971C90}"/>
+          </ac:cxnSpMkLst>
+        </pc:cxnChg>
+      </pc:sldChg>
+    </pc:docChg>
+  </pc:docChgLst>
+</pc:chgInfo>
 </file>
 
 <file path=ppt/diagrams/colors1.xml><?xml version="1.0" encoding="utf-8"?>
@@ -15653,20 +16375,13 @@
               </a:lnSpc>
             </a:pPr>
             <a:r>
-              <a:rPr lang="en-US" sz="3400" b="1"/>
-              <a:t>Retail Sales Analysis &amp; Forecasting</a:t>
+              <a:rPr lang="en-US" sz="3600" dirty="0"/>
+              <a:t>Capstone Project: Sales Insights &amp; Demand Forecasting for a Retail Chain</a:t>
             </a:r>
             <a:br>
-              <a:rPr lang="en-US" sz="3400"/>
+              <a:rPr lang="en-US" sz="3400" dirty="0"/>
             </a:br>
-            <a:r>
-              <a:rPr lang="en-US" sz="3400" i="1"/>
-              <a:t>Walmart Retail Store Dataset</a:t>
-            </a:r>
-            <a:br>
-              <a:rPr lang="en-US" sz="3400"/>
-            </a:br>
-            <a:endParaRPr lang="en-US" sz="3400"/>
+            <a:endParaRPr lang="en-US" sz="3400" dirty="0"/>
           </a:p>
         </p:txBody>
       </p:sp>
@@ -15980,8 +16695,8 @@
         </p:nvSpPr>
         <p:spPr>
           <a:xfrm>
-            <a:off x="250372" y="268133"/>
-            <a:ext cx="7239000" cy="502711"/>
+            <a:off x="250372" y="194958"/>
+            <a:ext cx="5159828" cy="502711"/>
           </a:xfrm>
         </p:spPr>
         <p:txBody>
@@ -15989,10 +16704,10 @@
           <a:lstStyle/>
           <a:p>
             <a:r>
-              <a:rPr lang="en-US" sz="3200" dirty="0"/>
+              <a:rPr lang="en-US" sz="3200" b="1" dirty="0"/>
               <a:t>Effect of Holiday on Sales</a:t>
             </a:r>
-            <a:endParaRPr lang="en-IN" sz="3200" dirty="0"/>
+            <a:endParaRPr lang="en-IN" sz="3200" b="1" dirty="0"/>
           </a:p>
         </p:txBody>
       </p:sp>
@@ -16014,15 +16729,51 @@
         </p:nvSpPr>
         <p:spPr>
           <a:xfrm>
-            <a:off x="394307" y="1774372"/>
-            <a:ext cx="2653692" cy="4637314"/>
+            <a:off x="5921829" y="1361700"/>
+            <a:ext cx="2895599" cy="5170713"/>
           </a:xfrm>
         </p:spPr>
         <p:txBody>
-          <a:bodyPr/>
+          <a:bodyPr>
+            <a:noAutofit/>
+          </a:bodyPr>
           <a:lstStyle/>
           <a:p>
-            <a:endParaRPr lang="en-IN" dirty="0"/>
+            <a:r>
+              <a:rPr lang="en-US" sz="1600" b="1" dirty="0"/>
+              <a:t>Key Observations:</a:t>
+            </a:r>
+          </a:p>
+          <a:p>
+            <a:pPr marL="285750" indent="-285750">
+              <a:buFont typeface="Arial" panose="020B0604020202020204" pitchFamily="34" charset="0"/>
+              <a:buChar char="•"/>
+            </a:pPr>
+            <a:r>
+              <a:rPr lang="en-US" sz="1600" dirty="0"/>
+              <a:t>From the Visual Holiday weeks generate noticeably higher average revenue than non-holiday weeks → confirming strong demand peaks during holiday periods. </a:t>
+            </a:r>
+          </a:p>
+          <a:p>
+            <a:pPr marL="285750" indent="-285750">
+              <a:buFont typeface="Arial" panose="020B0604020202020204" pitchFamily="34" charset="0"/>
+              <a:buChar char="•"/>
+            </a:pPr>
+            <a:r>
+              <a:rPr lang="en-US" sz="1600" dirty="0"/>
+              <a:t>The uplift indicates that sales are season-sensitive, not randomly distributed across weeks.</a:t>
+            </a:r>
+          </a:p>
+          <a:p>
+            <a:pPr marL="285750" indent="-285750">
+              <a:buFont typeface="Arial" panose="020B0604020202020204" pitchFamily="34" charset="0"/>
+              <a:buChar char="•"/>
+            </a:pPr>
+            <a:r>
+              <a:rPr lang="en-US" sz="1600" dirty="0"/>
+              <a:t>Statistical Analysis- Holiday flag has a meaningful impact on revenue — unlike economic variables which show only mild influence.</a:t>
+            </a:r>
+            <a:endParaRPr lang="en-IN" sz="1600" dirty="0"/>
           </a:p>
         </p:txBody>
       </p:sp>
@@ -16055,7 +16806,7 @@
         </p:blipFill>
         <p:spPr bwMode="auto">
           <a:xfrm>
-            <a:off x="3232411" y="1774370"/>
+            <a:off x="120004" y="1895098"/>
             <a:ext cx="5720522" cy="4637315"/>
           </a:xfrm>
           <a:prstGeom prst="rect">
@@ -16073,6 +16824,41 @@
           </a:extLst>
         </p:spPr>
       </p:pic>
+      <p:sp>
+        <p:nvSpPr>
+          <p:cNvPr id="5" name="TextBox 4">
+            <a:extLst>
+              <a:ext uri="{FF2B5EF4-FFF2-40B4-BE49-F238E27FC236}">
+                <a16:creationId xmlns:a16="http://schemas.microsoft.com/office/drawing/2014/main" id="{486C1276-305C-DA5B-A112-AEDF9682FFA8}"/>
+              </a:ext>
+            </a:extLst>
+          </p:cNvPr>
+          <p:cNvSpPr txBox="1"/>
+          <p:nvPr/>
+        </p:nvSpPr>
+        <p:spPr>
+          <a:xfrm>
+            <a:off x="38700" y="1102397"/>
+            <a:ext cx="5801825" cy="584775"/>
+          </a:xfrm>
+          <a:prstGeom prst="rect">
+            <a:avLst/>
+          </a:prstGeom>
+          <a:noFill/>
+        </p:spPr>
+        <p:txBody>
+          <a:bodyPr wrap="square">
+            <a:spAutoFit/>
+          </a:bodyPr>
+          <a:lstStyle/>
+          <a:p>
+            <a:r>
+              <a:rPr lang="en-US" sz="1600" dirty="0"/>
+              <a:t>This chart compares average store revenue between Holiday weeks and Non-Holiday weeks.</a:t>
+            </a:r>
+          </a:p>
+        </p:txBody>
+      </p:sp>
     </p:spTree>
     <p:extLst>
       <p:ext uri="{BB962C8B-B14F-4D97-AF65-F5344CB8AC3E}">
@@ -17160,8 +17946,8 @@
         </p:nvSpPr>
         <p:spPr>
           <a:xfrm>
-            <a:off x="655863" y="3124200"/>
-            <a:ext cx="6343651" cy="1754326"/>
+            <a:off x="655863" y="3328920"/>
+            <a:ext cx="6343651" cy="2031325"/>
           </a:xfrm>
           <a:prstGeom prst="rect">
             <a:avLst/>
@@ -17203,7 +17989,7 @@
             </a:r>
             <a:r>
               <a:rPr lang="en-US" dirty="0"/>
-              <a:t> because economic and promotional features used earlier do not show strong influence on weekly revenue in this dataset.</a:t>
+              <a:t> because economic and promotional features used earlier do not show strong influence on weekly revenue in this dataset. Therefore, analysis on another model is further conducted.</a:t>
             </a:r>
           </a:p>
         </p:txBody>
@@ -17251,8 +18037,8 @@
         </p:nvSpPr>
         <p:spPr>
           <a:xfrm>
-            <a:off x="691972" y="167088"/>
-            <a:ext cx="6620968" cy="609600"/>
+            <a:off x="136006" y="161843"/>
+            <a:ext cx="7424057" cy="451762"/>
           </a:xfrm>
         </p:spPr>
         <p:txBody>
@@ -17260,13 +18046,17 @@
           <a:lstStyle/>
           <a:p>
             <a:r>
-              <a:rPr lang="en-US" sz="3600" b="1" dirty="0"/>
+              <a:rPr lang="en-US" altLang="en-US" sz="2400" b="1" dirty="0"/>
+              <a:t>Time-Series forecasting: </a:t>
+            </a:r>
+            <a:r>
+              <a:rPr lang="en-US" sz="2400" b="1" dirty="0"/>
               <a:t>Forecast – Next 4 Weeks</a:t>
             </a:r>
             <a:br>
-              <a:rPr lang="en-US" sz="3600" b="1" dirty="0"/>
+              <a:rPr lang="en-US" sz="2400" b="1" dirty="0"/>
             </a:br>
-            <a:endParaRPr lang="en-IN" sz="3600" dirty="0"/>
+            <a:endParaRPr lang="en-IN" sz="2400" dirty="0"/>
           </a:p>
         </p:txBody>
       </p:sp>
@@ -17285,7 +18075,7 @@
         <p:spPr>
           <a:xfrm>
             <a:off x="136006" y="4354787"/>
-            <a:ext cx="8768508" cy="2031325"/>
+            <a:ext cx="8768508" cy="2246769"/>
           </a:xfrm>
           <a:prstGeom prst="rect">
             <a:avLst/>
@@ -17325,7 +18115,20 @@
                 <a:effectLst/>
                 <a:latin typeface="Arial" panose="020B0604020202020204" pitchFamily="34" charset="0"/>
               </a:rPr>
-              <a:t> Forecast is built only on </a:t>
+              <a:t> </a:t>
+            </a:r>
+            <a:r>
+              <a:rPr kumimoji="0" lang="en-US" altLang="en-US" sz="1400" b="0" i="0" u="none" strike="noStrike" cap="none" normalizeH="0" baseline="0" dirty="0">
+                <a:ln>
+                  <a:noFill/>
+                </a:ln>
+                <a:solidFill>
+                  <a:schemeClr val="tx1"/>
+                </a:solidFill>
+                <a:effectLst/>
+                <a:latin typeface="+mj-lt"/>
+              </a:rPr>
+              <a:t>Forecast is built only on </a:t>
             </a:r>
             <a:r>
               <a:rPr kumimoji="0" lang="en-US" altLang="en-US" sz="1400" b="1" i="0" u="none" strike="noStrike" cap="none" normalizeH="0" baseline="0" dirty="0">
@@ -17336,7 +18139,7 @@
                   <a:schemeClr val="tx1"/>
                 </a:solidFill>
                 <a:effectLst/>
-                <a:latin typeface="Arial" panose="020B0604020202020204" pitchFamily="34" charset="0"/>
+                <a:latin typeface="+mj-lt"/>
               </a:rPr>
               <a:t>historical sales trend</a:t>
             </a:r>
@@ -17349,7 +18152,7 @@
                   <a:schemeClr val="tx1"/>
                 </a:solidFill>
                 <a:effectLst/>
-                <a:latin typeface="Arial" panose="020B0604020202020204" pitchFamily="34" charset="0"/>
+                <a:latin typeface="+mj-lt"/>
               </a:rPr>
               <a:t>, not external features.</a:t>
             </a:r>
@@ -17379,7 +18182,7 @@
                 <a:schemeClr val="tx1"/>
               </a:solidFill>
               <a:effectLst/>
-              <a:latin typeface="Arial" panose="020B0604020202020204" pitchFamily="34" charset="0"/>
+              <a:latin typeface="+mj-lt"/>
             </a:endParaRPr>
           </a:p>
           <a:p>
@@ -17408,7 +18211,7 @@
                   <a:schemeClr val="tx1"/>
                 </a:solidFill>
                 <a:effectLst/>
-                <a:latin typeface="Arial" panose="020B0604020202020204" pitchFamily="34" charset="0"/>
+                <a:latin typeface="+mj-lt"/>
               </a:rPr>
               <a:t> It captures </a:t>
             </a:r>
@@ -17421,7 +18224,7 @@
                   <a:schemeClr val="tx1"/>
                 </a:solidFill>
                 <a:effectLst/>
-                <a:latin typeface="Arial" panose="020B0604020202020204" pitchFamily="34" charset="0"/>
+                <a:latin typeface="+mj-lt"/>
               </a:rPr>
               <a:t>seasonal spikes and repeating patterns</a:t>
             </a:r>
@@ -17434,7 +18237,7 @@
                   <a:schemeClr val="tx1"/>
                 </a:solidFill>
                 <a:effectLst/>
-                <a:latin typeface="Arial" panose="020B0604020202020204" pitchFamily="34" charset="0"/>
+                <a:latin typeface="+mj-lt"/>
               </a:rPr>
               <a:t>, which are strong in weekly Walmart    sales data.</a:t>
             </a:r>
@@ -17464,7 +18267,7 @@
                 <a:schemeClr val="tx1"/>
               </a:solidFill>
               <a:effectLst/>
-              <a:latin typeface="Arial" panose="020B0604020202020204" pitchFamily="34" charset="0"/>
+              <a:latin typeface="+mj-lt"/>
             </a:endParaRPr>
           </a:p>
           <a:p>
@@ -17493,7 +18296,7 @@
                   <a:schemeClr val="tx1"/>
                 </a:solidFill>
                 <a:effectLst/>
-                <a:latin typeface="Arial" panose="020B0604020202020204" pitchFamily="34" charset="0"/>
+                <a:latin typeface="+mj-lt"/>
               </a:rPr>
               <a:t> Forecast gives a </a:t>
             </a:r>
@@ -17506,7 +18309,7 @@
                   <a:schemeClr val="tx1"/>
                 </a:solidFill>
                 <a:effectLst/>
-                <a:latin typeface="Arial" panose="020B0604020202020204" pitchFamily="34" charset="0"/>
+                <a:latin typeface="+mj-lt"/>
               </a:rPr>
               <a:t>directional trend estimate for 4 weeks</a:t>
             </a:r>
@@ -17519,7 +18322,7 @@
                   <a:schemeClr val="tx1"/>
                 </a:solidFill>
                 <a:effectLst/>
-                <a:latin typeface="Arial" panose="020B0604020202020204" pitchFamily="34" charset="0"/>
+                <a:latin typeface="+mj-lt"/>
               </a:rPr>
               <a:t>, helpful for short-term demand planning.</a:t>
             </a:r>
@@ -17547,7 +18350,7 @@
                 <a:schemeClr val="tx1"/>
               </a:solidFill>
               <a:effectLst/>
-              <a:latin typeface="Arial" panose="020B0604020202020204" pitchFamily="34" charset="0"/>
+              <a:latin typeface="+mj-lt"/>
             </a:endParaRPr>
           </a:p>
           <a:p>
@@ -17577,7 +18380,7 @@
                   </a:schemeClr>
                 </a:solidFill>
                 <a:effectLst/>
-                <a:latin typeface="Arial" panose="020B0604020202020204" pitchFamily="34" charset="0"/>
+                <a:latin typeface="+mj-lt"/>
               </a:rPr>
               <a:t>Key Benefit:</a:t>
             </a:r>
@@ -17592,7 +18395,7 @@
                 </a:schemeClr>
               </a:solidFill>
               <a:effectLst/>
-              <a:latin typeface="Arial" panose="020B0604020202020204" pitchFamily="34" charset="0"/>
+              <a:latin typeface="+mj-lt"/>
             </a:endParaRPr>
           </a:p>
           <a:p>
@@ -17621,7 +18424,7 @@
                   <a:schemeClr val="tx1"/>
                 </a:solidFill>
                 <a:effectLst/>
-                <a:latin typeface="Arial" panose="020B0604020202020204" pitchFamily="34" charset="0"/>
+                <a:latin typeface="+mj-lt"/>
               </a:rPr>
               <a:t>Unlike regression, ARIMA focuses on </a:t>
             </a:r>
@@ -17634,7 +18437,7 @@
                   <a:schemeClr val="tx1"/>
                 </a:solidFill>
                 <a:effectLst/>
-                <a:latin typeface="Arial" panose="020B0604020202020204" pitchFamily="34" charset="0"/>
+                <a:latin typeface="+mj-lt"/>
               </a:rPr>
               <a:t>time-based momentum</a:t>
             </a:r>
@@ -17647,7 +18450,7 @@
                   <a:schemeClr val="tx1"/>
                 </a:solidFill>
                 <a:effectLst/>
-                <a:latin typeface="Arial" panose="020B0604020202020204" pitchFamily="34" charset="0"/>
+                <a:latin typeface="+mj-lt"/>
               </a:rPr>
               <a:t>, so it adapts better to weekly seasonality and holiday peaks.</a:t>
             </a:r>
@@ -17683,7 +18486,7 @@
         </p:blipFill>
         <p:spPr bwMode="auto">
           <a:xfrm>
-            <a:off x="790737" y="1060122"/>
+            <a:off x="279108" y="992353"/>
             <a:ext cx="6709519" cy="3021720"/>
           </a:xfrm>
           <a:prstGeom prst="rect">
@@ -17715,6 +18518,543 @@
 </file>
 
 <file path=ppt/slides/slide17.xml><?xml version="1.0" encoding="utf-8"?>
+<p:sld xmlns:a="http://schemas.openxmlformats.org/drawingml/2006/main" xmlns:r="http://schemas.openxmlformats.org/officeDocument/2006/relationships" xmlns:p="http://schemas.openxmlformats.org/presentationml/2006/main">
+  <p:cSld>
+    <p:spTree>
+      <p:nvGrpSpPr>
+        <p:cNvPr id="1" name=""/>
+        <p:cNvGrpSpPr/>
+        <p:nvPr/>
+      </p:nvGrpSpPr>
+      <p:grpSpPr>
+        <a:xfrm>
+          <a:off x="0" y="0"/>
+          <a:ext cx="0" cy="0"/>
+          <a:chOff x="0" y="0"/>
+          <a:chExt cx="0" cy="0"/>
+        </a:xfrm>
+      </p:grpSpPr>
+      <p:graphicFrame>
+        <p:nvGraphicFramePr>
+          <p:cNvPr id="4" name="Table 3">
+            <a:extLst>
+              <a:ext uri="{FF2B5EF4-FFF2-40B4-BE49-F238E27FC236}">
+                <a16:creationId xmlns:a16="http://schemas.microsoft.com/office/drawing/2014/main" id="{C8FEE2F2-2FCB-A83F-D181-6A656EE60145}"/>
+              </a:ext>
+            </a:extLst>
+          </p:cNvPr>
+          <p:cNvGraphicFramePr>
+            <a:graphicFrameLocks noGrp="1"/>
+          </p:cNvGraphicFramePr>
+          <p:nvPr>
+            <p:extLst>
+              <p:ext uri="{D42A27DB-BD31-4B8C-83A1-F6EECF244321}">
+                <p14:modId xmlns:p14="http://schemas.microsoft.com/office/powerpoint/2010/main" val="430626108"/>
+              </p:ext>
+            </p:extLst>
+          </p:nvPr>
+        </p:nvGraphicFramePr>
+        <p:xfrm>
+          <a:off x="511629" y="1217963"/>
+          <a:ext cx="8490856" cy="2625663"/>
+        </p:xfrm>
+        <a:graphic>
+          <a:graphicData uri="http://schemas.openxmlformats.org/drawingml/2006/table">
+            <a:tbl>
+              <a:tblPr>
+                <a:tableStyleId>{69C7853C-536D-4A76-A0AE-DD22124D55A5}</a:tableStyleId>
+              </a:tblPr>
+              <a:tblGrid>
+                <a:gridCol w="1926771">
+                  <a:extLst>
+                    <a:ext uri="{9D8B030D-6E8A-4147-A177-3AD203B41FA5}">
+                      <a16:colId xmlns:a16="http://schemas.microsoft.com/office/drawing/2014/main" val="626667506"/>
+                    </a:ext>
+                  </a:extLst>
+                </a:gridCol>
+                <a:gridCol w="2013857">
+                  <a:extLst>
+                    <a:ext uri="{9D8B030D-6E8A-4147-A177-3AD203B41FA5}">
+                      <a16:colId xmlns:a16="http://schemas.microsoft.com/office/drawing/2014/main" val="4268205875"/>
+                    </a:ext>
+                  </a:extLst>
+                </a:gridCol>
+                <a:gridCol w="2427514">
+                  <a:extLst>
+                    <a:ext uri="{9D8B030D-6E8A-4147-A177-3AD203B41FA5}">
+                      <a16:colId xmlns:a16="http://schemas.microsoft.com/office/drawing/2014/main" val="3421456515"/>
+                    </a:ext>
+                  </a:extLst>
+                </a:gridCol>
+                <a:gridCol w="2122714">
+                  <a:extLst>
+                    <a:ext uri="{9D8B030D-6E8A-4147-A177-3AD203B41FA5}">
+                      <a16:colId xmlns:a16="http://schemas.microsoft.com/office/drawing/2014/main" val="1548648927"/>
+                    </a:ext>
+                  </a:extLst>
+                </a:gridCol>
+              </a:tblGrid>
+              <a:tr h="510915">
+                <a:tc>
+                  <a:txBody>
+                    <a:bodyPr/>
+                    <a:lstStyle/>
+                    <a:p>
+                      <a:pPr>
+                        <a:buNone/>
+                      </a:pPr>
+                      <a:r>
+                        <a:rPr lang="en-IN" sz="1400" b="1" dirty="0"/>
+                        <a:t>Model</a:t>
+                      </a:r>
+                    </a:p>
+                  </a:txBody>
+                  <a:tcPr marL="82270" marR="82270" marT="41135" marB="41135" anchor="ctr"/>
+                </a:tc>
+                <a:tc>
+                  <a:txBody>
+                    <a:bodyPr/>
+                    <a:lstStyle/>
+                    <a:p>
+                      <a:pPr>
+                        <a:buNone/>
+                      </a:pPr>
+                      <a:r>
+                        <a:rPr lang="en-IN" sz="1400" b="1" dirty="0"/>
+                        <a:t>Accuracy</a:t>
+                      </a:r>
+                    </a:p>
+                  </a:txBody>
+                  <a:tcPr marL="82270" marR="82270" marT="41135" marB="41135" anchor="ctr"/>
+                </a:tc>
+                <a:tc>
+                  <a:txBody>
+                    <a:bodyPr/>
+                    <a:lstStyle/>
+                    <a:p>
+                      <a:pPr>
+                        <a:buNone/>
+                      </a:pPr>
+                      <a:r>
+                        <a:rPr lang="en-IN" sz="1400" b="1" dirty="0"/>
+                        <a:t>Suitable for Forecasting?</a:t>
+                      </a:r>
+                    </a:p>
+                  </a:txBody>
+                  <a:tcPr marL="82270" marR="82270" marT="41135" marB="41135" anchor="ctr"/>
+                </a:tc>
+                <a:tc>
+                  <a:txBody>
+                    <a:bodyPr/>
+                    <a:lstStyle/>
+                    <a:p>
+                      <a:pPr>
+                        <a:buNone/>
+                      </a:pPr>
+                      <a:r>
+                        <a:rPr lang="en-IN" sz="1400" b="1" dirty="0"/>
+                        <a:t>Key Interpretation</a:t>
+                      </a:r>
+                    </a:p>
+                  </a:txBody>
+                  <a:tcPr marL="82270" marR="82270" marT="41135" marB="41135" anchor="ctr"/>
+                </a:tc>
+                <a:extLst>
+                  <a:ext uri="{0D108BD9-81ED-4DB2-BD59-A6C34878D82A}">
+                    <a16:rowId xmlns:a16="http://schemas.microsoft.com/office/drawing/2014/main" val="4219772409"/>
+                  </a:ext>
+                </a:extLst>
+              </a:tr>
+              <a:tr h="948082">
+                <a:tc>
+                  <a:txBody>
+                    <a:bodyPr/>
+                    <a:lstStyle/>
+                    <a:p>
+                      <a:pPr>
+                        <a:buNone/>
+                      </a:pPr>
+                      <a:r>
+                        <a:rPr lang="en-IN" sz="1400"/>
+                        <a:t>Linear Regression</a:t>
+                      </a:r>
+                    </a:p>
+                  </a:txBody>
+                  <a:tcPr marL="82270" marR="82270" marT="41135" marB="41135" anchor="ctr"/>
+                </a:tc>
+                <a:tc>
+                  <a:txBody>
+                    <a:bodyPr/>
+                    <a:lstStyle/>
+                    <a:p>
+                      <a:pPr>
+                        <a:buNone/>
+                      </a:pPr>
+                      <a:r>
+                        <a:rPr lang="en-IN" sz="1400" dirty="0"/>
+                        <a:t>Poor (RMSE 22,723.04, R² 0.01)</a:t>
+                      </a:r>
+                    </a:p>
+                  </a:txBody>
+                  <a:tcPr marL="82270" marR="82270" marT="41135" marB="41135" anchor="ctr"/>
+                </a:tc>
+                <a:tc>
+                  <a:txBody>
+                    <a:bodyPr/>
+                    <a:lstStyle/>
+                    <a:p>
+                      <a:pPr>
+                        <a:buNone/>
+                      </a:pPr>
+                      <a:r>
+                        <a:rPr lang="en-IN" sz="1400" dirty="0"/>
+                        <a:t> Not reliable</a:t>
+                      </a:r>
+                    </a:p>
+                  </a:txBody>
+                  <a:tcPr marL="82270" marR="82270" marT="41135" marB="41135" anchor="ctr"/>
+                </a:tc>
+                <a:tc>
+                  <a:txBody>
+                    <a:bodyPr/>
+                    <a:lstStyle/>
+                    <a:p>
+                      <a:pPr>
+                        <a:buNone/>
+                      </a:pPr>
+                      <a:r>
+                        <a:rPr lang="en-US" sz="1400"/>
+                        <a:t>Fails to explain sales drivers due to weak linear feature relationship</a:t>
+                      </a:r>
+                    </a:p>
+                  </a:txBody>
+                  <a:tcPr marL="82270" marR="82270" marT="41135" marB="41135" anchor="ctr"/>
+                </a:tc>
+                <a:extLst>
+                  <a:ext uri="{0D108BD9-81ED-4DB2-BD59-A6C34878D82A}">
+                    <a16:rowId xmlns:a16="http://schemas.microsoft.com/office/drawing/2014/main" val="311868561"/>
+                  </a:ext>
+                </a:extLst>
+              </a:tr>
+              <a:tr h="1166666">
+                <a:tc>
+                  <a:txBody>
+                    <a:bodyPr/>
+                    <a:lstStyle/>
+                    <a:p>
+                      <a:pPr>
+                        <a:buNone/>
+                      </a:pPr>
+                      <a:r>
+                        <a:rPr lang="en-IN" sz="1400" dirty="0"/>
+                        <a:t>ARIMA (Time-Series)</a:t>
+                      </a:r>
+                    </a:p>
+                  </a:txBody>
+                  <a:tcPr marL="82270" marR="82270" marT="41135" marB="41135" anchor="ctr"/>
+                </a:tc>
+                <a:tc>
+                  <a:txBody>
+                    <a:bodyPr/>
+                    <a:lstStyle/>
+                    <a:p>
+                      <a:pPr>
+                        <a:buNone/>
+                      </a:pPr>
+                      <a:r>
+                        <a:rPr lang="en-IN" sz="1400" dirty="0"/>
+                        <a:t>Better for trend capture</a:t>
+                      </a:r>
+                    </a:p>
+                  </a:txBody>
+                  <a:tcPr marL="82270" marR="82270" marT="41135" marB="41135" anchor="ctr"/>
+                </a:tc>
+                <a:tc>
+                  <a:txBody>
+                    <a:bodyPr/>
+                    <a:lstStyle/>
+                    <a:p>
+                      <a:pPr>
+                        <a:buNone/>
+                      </a:pPr>
+                      <a:r>
+                        <a:rPr lang="en-IN" sz="1400" dirty="0"/>
+                        <a:t>Recommended for short-term</a:t>
+                      </a:r>
+                    </a:p>
+                  </a:txBody>
+                  <a:tcPr marL="82270" marR="82270" marT="41135" marB="41135" anchor="ctr"/>
+                </a:tc>
+                <a:tc>
+                  <a:txBody>
+                    <a:bodyPr/>
+                    <a:lstStyle/>
+                    <a:p>
+                      <a:pPr>
+                        <a:buNone/>
+                      </a:pPr>
+                      <a:r>
+                        <a:rPr lang="en-US" sz="1400" dirty="0"/>
+                        <a:t>Captures seasonal &amp; weekly momentum for 4-week demand planning</a:t>
+                      </a:r>
+                    </a:p>
+                  </a:txBody>
+                  <a:tcPr marL="82270" marR="82270" marT="41135" marB="41135" anchor="ctr"/>
+                </a:tc>
+                <a:extLst>
+                  <a:ext uri="{0D108BD9-81ED-4DB2-BD59-A6C34878D82A}">
+                    <a16:rowId xmlns:a16="http://schemas.microsoft.com/office/drawing/2014/main" val="3062425103"/>
+                  </a:ext>
+                </a:extLst>
+              </a:tr>
+            </a:tbl>
+          </a:graphicData>
+        </a:graphic>
+      </p:graphicFrame>
+      <p:sp>
+        <p:nvSpPr>
+          <p:cNvPr id="7" name="TextBox 6">
+            <a:extLst>
+              <a:ext uri="{FF2B5EF4-FFF2-40B4-BE49-F238E27FC236}">
+                <a16:creationId xmlns:a16="http://schemas.microsoft.com/office/drawing/2014/main" id="{6DBD9449-C4CF-C387-B506-3481E7455580}"/>
+              </a:ext>
+            </a:extLst>
+          </p:cNvPr>
+          <p:cNvSpPr txBox="1"/>
+          <p:nvPr/>
+        </p:nvSpPr>
+        <p:spPr>
+          <a:xfrm>
+            <a:off x="185058" y="120020"/>
+            <a:ext cx="6672942" cy="584775"/>
+          </a:xfrm>
+          <a:prstGeom prst="rect">
+            <a:avLst/>
+          </a:prstGeom>
+          <a:noFill/>
+        </p:spPr>
+        <p:txBody>
+          <a:bodyPr wrap="square">
+            <a:spAutoFit/>
+          </a:bodyPr>
+          <a:lstStyle/>
+          <a:p>
+            <a:pPr marL="0" marR="0" lvl="0" indent="0" algn="l" defTabSz="914400" rtl="0" eaLnBrk="0" fontAlgn="base" latinLnBrk="0" hangingPunct="0">
+              <a:lnSpc>
+                <a:spcPct val="100000"/>
+              </a:lnSpc>
+              <a:spcBef>
+                <a:spcPct val="0"/>
+              </a:spcBef>
+              <a:spcAft>
+                <a:spcPct val="0"/>
+              </a:spcAft>
+              <a:buClrTx/>
+              <a:buSzTx/>
+              <a:buFontTx/>
+              <a:buNone/>
+              <a:tabLst/>
+            </a:pPr>
+            <a:r>
+              <a:rPr kumimoji="0" lang="en-US" altLang="en-US" sz="3200" b="1" i="0" u="none" strike="noStrike" cap="none" normalizeH="0" baseline="0" dirty="0">
+                <a:ln>
+                  <a:noFill/>
+                </a:ln>
+                <a:solidFill>
+                  <a:schemeClr val="tx1"/>
+                </a:solidFill>
+                <a:effectLst/>
+                <a:latin typeface="Arial" panose="020B0604020202020204" pitchFamily="34" charset="0"/>
+              </a:rPr>
+              <a:t>Predictive Model Comparison</a:t>
+            </a:r>
+          </a:p>
+        </p:txBody>
+      </p:sp>
+      <p:sp>
+        <p:nvSpPr>
+          <p:cNvPr id="9" name="TextBox 8">
+            <a:extLst>
+              <a:ext uri="{FF2B5EF4-FFF2-40B4-BE49-F238E27FC236}">
+                <a16:creationId xmlns:a16="http://schemas.microsoft.com/office/drawing/2014/main" id="{F2D8B6F1-C428-CEE8-1BE8-5317A26AD750}"/>
+              </a:ext>
+            </a:extLst>
+          </p:cNvPr>
+          <p:cNvSpPr txBox="1"/>
+          <p:nvPr/>
+        </p:nvSpPr>
+        <p:spPr>
+          <a:xfrm>
+            <a:off x="325446" y="4500000"/>
+            <a:ext cx="8110983" cy="584775"/>
+          </a:xfrm>
+          <a:prstGeom prst="rect">
+            <a:avLst/>
+          </a:prstGeom>
+          <a:noFill/>
+        </p:spPr>
+        <p:txBody>
+          <a:bodyPr wrap="square">
+            <a:spAutoFit/>
+          </a:bodyPr>
+          <a:lstStyle/>
+          <a:p>
+            <a:pPr marL="285750" lvl="0" indent="-285750" defTabSz="914400" eaLnBrk="0" fontAlgn="base" hangingPunct="0">
+              <a:spcBef>
+                <a:spcPct val="0"/>
+              </a:spcBef>
+              <a:spcAft>
+                <a:spcPct val="0"/>
+              </a:spcAft>
+              <a:buFont typeface="Arial" panose="020B0604020202020204" pitchFamily="34" charset="0"/>
+              <a:buChar char="•"/>
+            </a:pPr>
+            <a:r>
+              <a:rPr lang="en-IN" sz="1600" dirty="0"/>
+              <a:t>Regression model explains </a:t>
+            </a:r>
+            <a:r>
+              <a:rPr lang="en-US" altLang="en-US" sz="1600" b="1" dirty="0">
+                <a:latin typeface="Arial" panose="020B0604020202020204" pitchFamily="34" charset="0"/>
+              </a:rPr>
+              <a:t>only 1% variance (R² = 0.01)</a:t>
+            </a:r>
+            <a:r>
+              <a:rPr lang="en-US" altLang="en-US" sz="1600" dirty="0">
+                <a:latin typeface="Arial" panose="020B0604020202020204" pitchFamily="34" charset="0"/>
+              </a:rPr>
+              <a:t> → </a:t>
+            </a:r>
+            <a:r>
+              <a:rPr lang="en-US" altLang="en-US" sz="1600" b="1" dirty="0">
+                <a:latin typeface="Arial" panose="020B0604020202020204" pitchFamily="34" charset="0"/>
+              </a:rPr>
+              <a:t>very low reliability</a:t>
+            </a:r>
+            <a:endParaRPr lang="en-US" altLang="en-US" sz="1600" dirty="0">
+              <a:latin typeface="Arial" panose="020B0604020202020204" pitchFamily="34" charset="0"/>
+            </a:endParaRPr>
+          </a:p>
+          <a:p>
+            <a:pPr marL="285750" lvl="0" indent="-285750" defTabSz="914400" eaLnBrk="0" fontAlgn="base" hangingPunct="0">
+              <a:spcBef>
+                <a:spcPct val="0"/>
+              </a:spcBef>
+              <a:spcAft>
+                <a:spcPct val="0"/>
+              </a:spcAft>
+              <a:buFont typeface="Arial" panose="020B0604020202020204" pitchFamily="34" charset="0"/>
+              <a:buChar char="•"/>
+            </a:pPr>
+            <a:r>
+              <a:rPr lang="en-US" altLang="en-US" sz="1600" dirty="0">
+                <a:latin typeface="Arial" panose="020B0604020202020204" pitchFamily="34" charset="0"/>
+              </a:rPr>
+              <a:t>ARIMA focuses on </a:t>
+            </a:r>
+            <a:r>
+              <a:rPr lang="en-US" altLang="en-US" sz="1600" b="1" dirty="0">
+                <a:latin typeface="Arial" panose="020B0604020202020204" pitchFamily="34" charset="0"/>
+              </a:rPr>
+              <a:t>historical trend only</a:t>
+            </a:r>
+            <a:r>
+              <a:rPr lang="en-US" altLang="en-US" sz="1600" dirty="0">
+                <a:latin typeface="Arial" panose="020B0604020202020204" pitchFamily="34" charset="0"/>
+              </a:rPr>
+              <a:t> and adapts better to </a:t>
+            </a:r>
+            <a:r>
+              <a:rPr lang="en-US" altLang="en-US" sz="1600" b="1" dirty="0">
+                <a:latin typeface="Arial" panose="020B0604020202020204" pitchFamily="34" charset="0"/>
+              </a:rPr>
+              <a:t>weekly seasonality</a:t>
+            </a:r>
+            <a:endParaRPr lang="en-US" altLang="en-US" sz="1600" dirty="0">
+              <a:latin typeface="Arial" panose="020B0604020202020204" pitchFamily="34" charset="0"/>
+            </a:endParaRPr>
+          </a:p>
+        </p:txBody>
+      </p:sp>
+      <p:sp>
+        <p:nvSpPr>
+          <p:cNvPr id="11" name="TextBox 10">
+            <a:extLst>
+              <a:ext uri="{FF2B5EF4-FFF2-40B4-BE49-F238E27FC236}">
+                <a16:creationId xmlns:a16="http://schemas.microsoft.com/office/drawing/2014/main" id="{BB809535-844F-8D50-4406-16FE34EE85AC}"/>
+              </a:ext>
+            </a:extLst>
+          </p:cNvPr>
+          <p:cNvSpPr txBox="1"/>
+          <p:nvPr/>
+        </p:nvSpPr>
+        <p:spPr>
+          <a:xfrm>
+            <a:off x="870856" y="5621436"/>
+            <a:ext cx="7402286" cy="369332"/>
+          </a:xfrm>
+          <a:prstGeom prst="rect">
+            <a:avLst/>
+          </a:prstGeom>
+        </p:spPr>
+        <p:style>
+          <a:lnRef idx="1">
+            <a:schemeClr val="accent2"/>
+          </a:lnRef>
+          <a:fillRef idx="3">
+            <a:schemeClr val="accent2"/>
+          </a:fillRef>
+          <a:effectRef idx="2">
+            <a:schemeClr val="accent2"/>
+          </a:effectRef>
+          <a:fontRef idx="minor">
+            <a:schemeClr val="lt1"/>
+          </a:fontRef>
+        </p:style>
+        <p:txBody>
+          <a:bodyPr wrap="square">
+            <a:spAutoFit/>
+          </a:bodyPr>
+          <a:lstStyle/>
+          <a:p>
+            <a:pPr lvl="0" defTabSz="914400" eaLnBrk="0" fontAlgn="base" hangingPunct="0">
+              <a:spcBef>
+                <a:spcPct val="0"/>
+              </a:spcBef>
+              <a:spcAft>
+                <a:spcPct val="0"/>
+              </a:spcAft>
+            </a:pPr>
+            <a:r>
+              <a:rPr lang="en-US" altLang="en-US" sz="1800" dirty="0">
+                <a:latin typeface="Arial" panose="020B0604020202020204" pitchFamily="34" charset="0"/>
+              </a:rPr>
+              <a:t>Best choice here: </a:t>
+            </a:r>
+            <a:r>
+              <a:rPr lang="en-US" altLang="en-US" sz="1800" b="1" dirty="0">
+                <a:latin typeface="Arial" panose="020B0604020202020204" pitchFamily="34" charset="0"/>
+              </a:rPr>
+              <a:t>Time-Series forecasting for short-term planning</a:t>
+            </a:r>
+            <a:endParaRPr lang="en-IN" sz="1800" dirty="0"/>
+          </a:p>
+        </p:txBody>
+      </p:sp>
+    </p:spTree>
+    <p:extLst>
+      <p:ext uri="{BB962C8B-B14F-4D97-AF65-F5344CB8AC3E}">
+        <p14:creationId xmlns:p14="http://schemas.microsoft.com/office/powerpoint/2010/main" val="2688012147"/>
+      </p:ext>
+    </p:extLst>
+  </p:cSld>
+  <p:clrMapOvr>
+    <a:masterClrMapping/>
+  </p:clrMapOvr>
+</p:sld>
+</file>
+
+<file path=ppt/slides/slide18.xml><?xml version="1.0" encoding="utf-8"?>
 <p:sld xmlns:a="http://schemas.openxmlformats.org/drawingml/2006/main" xmlns:r="http://schemas.openxmlformats.org/officeDocument/2006/relationships" xmlns:p="http://schemas.openxmlformats.org/presentationml/2006/main">
   <p:cSld>
     <p:bg>
@@ -18156,8 +19496,8 @@
         </p:nvSpPr>
         <p:spPr>
           <a:xfrm>
-            <a:off x="390370" y="241279"/>
-            <a:ext cx="4553636" cy="1141207"/>
+            <a:off x="215338" y="121537"/>
+            <a:ext cx="4982929" cy="947948"/>
           </a:xfrm>
         </p:spPr>
         <p:txBody>
@@ -18212,13 +19552,13 @@
         </p:nvSpPr>
         <p:spPr>
           <a:xfrm>
-            <a:off x="486697" y="2182363"/>
-            <a:ext cx="4641142" cy="3785419"/>
+            <a:off x="310419" y="1242765"/>
+            <a:ext cx="4641142" cy="5234235"/>
           </a:xfrm>
         </p:spPr>
         <p:txBody>
           <a:bodyPr vert="horz" lIns="91440" tIns="45720" rIns="91440" bIns="45720" rtlCol="0">
-            <a:normAutofit/>
+            <a:normAutofit lnSpcReduction="10000"/>
           </a:bodyPr>
           <a:lstStyle/>
           <a:p>
@@ -18234,8 +19574,9 @@
                 <a:solidFill>
                   <a:srgbClr val="FFFFFF"/>
                 </a:solidFill>
+                <a:latin typeface="+mn-lt"/>
               </a:rPr>
-              <a:t>To optimize sales &amp; inventory:</a:t>
+              <a:t>Increase inventory 1–2 weeks before holiday spikes</a:t>
             </a:r>
           </a:p>
           <a:p>
@@ -18251,8 +19592,9 @@
                 <a:solidFill>
                   <a:srgbClr val="FFFFFF"/>
                 </a:solidFill>
+                <a:latin typeface="+mn-lt"/>
               </a:rPr>
-              <a:t>Increase inventory 1–2 weeks before holiday spikes</a:t>
+              <a:t>Deploy targeted markdown promotions during low-season months</a:t>
             </a:r>
           </a:p>
           <a:p>
@@ -18268,8 +19610,60 @@
                 <a:solidFill>
                   <a:srgbClr val="FFFFFF"/>
                 </a:solidFill>
+                <a:latin typeface="+mn-lt"/>
               </a:rPr>
-              <a:t>Deploy targeted markdown promotions during low-season months</a:t>
+              <a:t>Allocate stock using:</a:t>
+            </a:r>
+            <a:br>
+              <a:rPr lang="en-US" dirty="0">
+                <a:solidFill>
+                  <a:srgbClr val="FFFFFF"/>
+                </a:solidFill>
+                <a:latin typeface="+mn-lt"/>
+              </a:rPr>
+            </a:br>
+            <a:r>
+              <a:rPr lang="en-US" dirty="0">
+                <a:solidFill>
+                  <a:srgbClr val="FFFFFF"/>
+                </a:solidFill>
+                <a:latin typeface="+mn-lt"/>
+              </a:rPr>
+              <a:t>-Store revenue contribution</a:t>
+            </a:r>
+            <a:br>
+              <a:rPr lang="en-US" dirty="0">
+                <a:solidFill>
+                  <a:srgbClr val="FFFFFF"/>
+                </a:solidFill>
+                <a:latin typeface="+mn-lt"/>
+              </a:rPr>
+            </a:br>
+            <a:r>
+              <a:rPr lang="en-US" dirty="0">
+                <a:solidFill>
+                  <a:srgbClr val="FFFFFF"/>
+                </a:solidFill>
+                <a:latin typeface="+mn-lt"/>
+              </a:rPr>
+              <a:t>-Units movement trends</a:t>
+            </a:r>
+            <a:br>
+              <a:rPr lang="en-US" dirty="0">
+                <a:solidFill>
+                  <a:srgbClr val="FFFFFF"/>
+                </a:solidFill>
+                <a:latin typeface="+mn-lt"/>
+              </a:rPr>
+            </a:br>
+            <a:r>
+              <a:rPr lang="en-US" dirty="0">
+                <a:solidFill>
+                  <a:srgbClr val="FFFFFF"/>
+                </a:solidFill>
+                <a:latin typeface="+mn-lt"/>
+              </a:rPr>
+              <a:t>-Forecasted demand</a:t>
             </a:r>
           </a:p>
           <a:p>
@@ -18285,53 +19679,9 @@
                 <a:solidFill>
                   <a:srgbClr val="FFFFFF"/>
                 </a:solidFill>
+                <a:latin typeface="+mn-lt"/>
               </a:rPr>
-              <a:t>Allocate stock using:</a:t>
-            </a:r>
-            <a:br>
-              <a:rPr lang="en-US" dirty="0">
-                <a:solidFill>
-                  <a:srgbClr val="FFFFFF"/>
-                </a:solidFill>
-              </a:rPr>
-            </a:br>
-            <a:r>
-              <a:rPr lang="en-US" dirty="0">
-                <a:solidFill>
-                  <a:srgbClr val="FFFFFF"/>
-                </a:solidFill>
-              </a:rPr>
-              <a:t>-Store revenue contribution</a:t>
-            </a:r>
-            <a:br>
-              <a:rPr lang="en-US" dirty="0">
-                <a:solidFill>
-                  <a:srgbClr val="FFFFFF"/>
-                </a:solidFill>
-              </a:rPr>
-            </a:br>
-            <a:r>
-              <a:rPr lang="en-US" dirty="0">
-                <a:solidFill>
-                  <a:srgbClr val="FFFFFF"/>
-                </a:solidFill>
-              </a:rPr>
-              <a:t>-Units movement trends</a:t>
-            </a:r>
-            <a:br>
-              <a:rPr lang="en-US" dirty="0">
-                <a:solidFill>
-                  <a:srgbClr val="FFFFFF"/>
-                </a:solidFill>
-              </a:rPr>
-            </a:br>
-            <a:r>
-              <a:rPr lang="en-US" dirty="0">
-                <a:solidFill>
-                  <a:srgbClr val="FFFFFF"/>
-                </a:solidFill>
-              </a:rPr>
-              <a:t>-Forecasted demand</a:t>
+              <a:t>Align manpower and logistics planning with predicted demand.</a:t>
             </a:r>
           </a:p>
           <a:p>
@@ -18344,12 +19694,16 @@
             </a:pPr>
             <a:r>
               <a:rPr lang="en-US" dirty="0">
-                <a:solidFill>
-                  <a:srgbClr val="FFFFFF"/>
-                </a:solidFill>
+                <a:latin typeface="+mn-lt"/>
               </a:rPr>
-              <a:t>Align manpower and logistics planning with predicted demand</a:t>
+              <a:t>Retail revenue at Walmart is more driven by seasonality and promotions, especially holidays, than by external economic factors. Inventory and discount campaigns must be planned ahead of holiday spikes to maximize sales and prevent stockouts.</a:t>
             </a:r>
+            <a:endParaRPr lang="en-US" dirty="0">
+              <a:solidFill>
+                <a:srgbClr val="FFFFFF"/>
+              </a:solidFill>
+              <a:latin typeface="+mn-lt"/>
+            </a:endParaRPr>
           </a:p>
           <a:p>
             <a:pPr defTabSz="457200">
@@ -18928,704 +20282,6 @@
 </p:sld>
 </file>
 
-<file path=ppt/slides/slide18.xml><?xml version="1.0" encoding="utf-8"?>
-<p:sld xmlns:a="http://schemas.openxmlformats.org/drawingml/2006/main" xmlns:r="http://schemas.openxmlformats.org/officeDocument/2006/relationships" xmlns:p="http://schemas.openxmlformats.org/presentationml/2006/main">
-  <p:cSld>
-    <p:bg>
-      <p:bgPr>
-        <a:solidFill>
-          <a:schemeClr val="bg1"/>
-        </a:solidFill>
-        <a:effectLst/>
-      </p:bgPr>
-    </p:bg>
-    <p:spTree>
-      <p:nvGrpSpPr>
-        <p:cNvPr id="1" name=""/>
-        <p:cNvGrpSpPr/>
-        <p:nvPr/>
-      </p:nvGrpSpPr>
-      <p:grpSpPr>
-        <a:xfrm>
-          <a:off x="0" y="0"/>
-          <a:ext cx="0" cy="0"/>
-          <a:chOff x="0" y="0"/>
-          <a:chExt cx="0" cy="0"/>
-        </a:xfrm>
-      </p:grpSpPr>
-      <p:pic>
-        <p:nvPicPr>
-          <p:cNvPr id="9" name="Picture 8">
-            <a:extLst>
-              <a:ext uri="{FF2B5EF4-FFF2-40B4-BE49-F238E27FC236}">
-                <a16:creationId xmlns:a16="http://schemas.microsoft.com/office/drawing/2014/main" id="{F1B8F9CB-890B-4CB8-B503-188A763E2FC1}"/>
-              </a:ext>
-              <a:ext uri="{C183D7F6-B498-43B3-948B-1728B52AA6E4}">
-                <adec:decorative xmlns:adec="http://schemas.microsoft.com/office/drawing/2017/decorative" val="1"/>
-              </a:ext>
-            </a:extLst>
-          </p:cNvPr>
-          <p:cNvPicPr>
-            <a:picLocks noGrp="1" noRot="1" noChangeAspect="1" noMove="1" noResize="1" noEditPoints="1" noAdjustHandles="1" noChangeArrowheads="1" noChangeShapeType="1" noCrop="1"/>
-          </p:cNvPicPr>
-          <p:nvPr>
-            <p:extLst>
-              <p:ext uri="{386F3935-93C4-4BCD-93E2-E3B085C9AB24}">
-                <p16:designElem xmlns:p16="http://schemas.microsoft.com/office/powerpoint/2015/main" val="1"/>
-              </p:ext>
-            </p:extLst>
-          </p:nvPr>
-        </p:nvPicPr>
-        <p:blipFill rotWithShape="1">
-          <a:blip r:embed="rId2">
-            <a:extLst>
-              <a:ext uri="{28A0092B-C50C-407E-A947-70E740481C1C}">
-                <a14:useLocalDpi xmlns:a14="http://schemas.microsoft.com/office/drawing/2010/main" val="0"/>
-              </a:ext>
-            </a:extLst>
-          </a:blip>
-          <a:srcRect l="3613"/>
-          <a:stretch/>
-        </p:blipFill>
-        <p:spPr>
-          <a:xfrm>
-            <a:off x="0" y="2669685"/>
-            <a:ext cx="3027759" cy="4188315"/>
-          </a:xfrm>
-          <a:prstGeom prst="rect">
-            <a:avLst/>
-          </a:prstGeom>
-        </p:spPr>
-      </p:pic>
-      <p:pic>
-        <p:nvPicPr>
-          <p:cNvPr id="11" name="Picture 10">
-            <a:extLst>
-              <a:ext uri="{FF2B5EF4-FFF2-40B4-BE49-F238E27FC236}">
-                <a16:creationId xmlns:a16="http://schemas.microsoft.com/office/drawing/2014/main" id="{AA632AB4-3837-4FD0-8B62-0A18B573F46D}"/>
-              </a:ext>
-              <a:ext uri="{C183D7F6-B498-43B3-948B-1728B52AA6E4}">
-                <adec:decorative xmlns:adec="http://schemas.microsoft.com/office/drawing/2017/decorative" val="1"/>
-              </a:ext>
-            </a:extLst>
-          </p:cNvPr>
-          <p:cNvPicPr>
-            <a:picLocks noGrp="1" noRot="1" noChangeAspect="1" noMove="1" noResize="1" noEditPoints="1" noAdjustHandles="1" noChangeArrowheads="1" noChangeShapeType="1" noCrop="1"/>
-          </p:cNvPicPr>
-          <p:nvPr>
-            <p:extLst>
-              <p:ext uri="{386F3935-93C4-4BCD-93E2-E3B085C9AB24}">
-                <p16:designElem xmlns:p16="http://schemas.microsoft.com/office/powerpoint/2015/main" val="1"/>
-              </p:ext>
-            </p:extLst>
-          </p:nvPr>
-        </p:nvPicPr>
-        <p:blipFill rotWithShape="1">
-          <a:blip r:embed="rId3">
-            <a:extLst>
-              <a:ext uri="{28A0092B-C50C-407E-A947-70E740481C1C}">
-                <a14:useLocalDpi xmlns:a14="http://schemas.microsoft.com/office/drawing/2010/main" val="0"/>
-              </a:ext>
-            </a:extLst>
-          </a:blip>
-          <a:srcRect l="35640"/>
-          <a:stretch/>
-        </p:blipFill>
-        <p:spPr>
-          <a:xfrm>
-            <a:off x="0" y="2892347"/>
-            <a:ext cx="1141809" cy="2365453"/>
-          </a:xfrm>
-          <a:prstGeom prst="rect">
-            <a:avLst/>
-          </a:prstGeom>
-        </p:spPr>
-      </p:pic>
-      <p:sp>
-        <p:nvSpPr>
-          <p:cNvPr id="13" name="Oval 12">
-            <a:extLst>
-              <a:ext uri="{FF2B5EF4-FFF2-40B4-BE49-F238E27FC236}">
-                <a16:creationId xmlns:a16="http://schemas.microsoft.com/office/drawing/2014/main" id="{C393B4A7-6ABF-423D-A762-3CDB4897A833}"/>
-              </a:ext>
-              <a:ext uri="{C183D7F6-B498-43B3-948B-1728B52AA6E4}">
-                <adec:decorative xmlns:adec="http://schemas.microsoft.com/office/drawing/2017/decorative" val="1"/>
-              </a:ext>
-            </a:extLst>
-          </p:cNvPr>
-          <p:cNvSpPr>
-            <a:spLocks noGrp="1" noRot="1" noChangeAspect="1" noMove="1" noResize="1" noEditPoints="1" noAdjustHandles="1" noChangeArrowheads="1" noChangeShapeType="1" noTextEdit="1"/>
-          </p:cNvSpPr>
-          <p:nvPr>
-            <p:extLst>
-              <p:ext uri="{386F3935-93C4-4BCD-93E2-E3B085C9AB24}">
-                <p16:designElem xmlns:p16="http://schemas.microsoft.com/office/powerpoint/2015/main" val="1"/>
-              </p:ext>
-            </p:extLst>
-          </p:nvPr>
-        </p:nvSpPr>
-        <p:spPr>
-          <a:xfrm>
-            <a:off x="6456759" y="1676400"/>
-            <a:ext cx="2114550" cy="2819400"/>
-          </a:xfrm>
-          <a:prstGeom prst="ellipse">
-            <a:avLst/>
-          </a:prstGeom>
-          <a:gradFill flip="none" rotWithShape="1">
-            <a:gsLst>
-              <a:gs pos="0">
-                <a:schemeClr val="bg2">
-                  <a:lumMod val="60000"/>
-                  <a:lumOff val="40000"/>
-                  <a:alpha val="7000"/>
-                </a:schemeClr>
-              </a:gs>
-              <a:gs pos="69000">
-                <a:schemeClr val="bg2">
-                  <a:lumMod val="60000"/>
-                  <a:lumOff val="40000"/>
-                  <a:alpha val="0"/>
-                </a:schemeClr>
-              </a:gs>
-              <a:gs pos="36000">
-                <a:schemeClr val="bg2">
-                  <a:lumMod val="60000"/>
-                  <a:lumOff val="40000"/>
-                  <a:alpha val="6000"/>
-                </a:schemeClr>
-              </a:gs>
-            </a:gsLst>
-            <a:path path="circle">
-              <a:fillToRect l="50000" t="50000" r="50000" b="50000"/>
-            </a:path>
-            <a:tileRect/>
-          </a:gradFill>
-          <a:ln>
-            <a:noFill/>
-          </a:ln>
-          <a:effectLst/>
-        </p:spPr>
-        <p:style>
-          <a:lnRef idx="1">
-            <a:schemeClr val="accent1"/>
-          </a:lnRef>
-          <a:fillRef idx="3">
-            <a:schemeClr val="accent1"/>
-          </a:fillRef>
-          <a:effectRef idx="2">
-            <a:schemeClr val="accent1"/>
-          </a:effectRef>
-          <a:fontRef idx="minor">
-            <a:schemeClr val="lt1"/>
-          </a:fontRef>
-        </p:style>
-        <p:txBody>
-          <a:bodyPr/>
-          <a:lstStyle/>
-          <a:p>
-            <a:endParaRPr lang="en-IN"/>
-          </a:p>
-        </p:txBody>
-      </p:sp>
-      <p:pic>
-        <p:nvPicPr>
-          <p:cNvPr id="15" name="Picture 14">
-            <a:extLst>
-              <a:ext uri="{FF2B5EF4-FFF2-40B4-BE49-F238E27FC236}">
-                <a16:creationId xmlns:a16="http://schemas.microsoft.com/office/drawing/2014/main" id="{9CD2319A-6FA9-4EFB-9EDF-7304467425E8}"/>
-              </a:ext>
-              <a:ext uri="{C183D7F6-B498-43B3-948B-1728B52AA6E4}">
-                <adec:decorative xmlns:adec="http://schemas.microsoft.com/office/drawing/2017/decorative" val="1"/>
-              </a:ext>
-            </a:extLst>
-          </p:cNvPr>
-          <p:cNvPicPr>
-            <a:picLocks noGrp="1" noRot="1" noChangeAspect="1" noMove="1" noResize="1" noEditPoints="1" noAdjustHandles="1" noChangeArrowheads="1" noChangeShapeType="1" noCrop="1"/>
-          </p:cNvPicPr>
-          <p:nvPr>
-            <p:extLst>
-              <p:ext uri="{386F3935-93C4-4BCD-93E2-E3B085C9AB24}">
-                <p16:designElem xmlns:p16="http://schemas.microsoft.com/office/powerpoint/2015/main" val="1"/>
-              </p:ext>
-            </p:extLst>
-          </p:nvPr>
-        </p:nvPicPr>
-        <p:blipFill rotWithShape="1">
-          <a:blip r:embed="rId4">
-            <a:extLst>
-              <a:ext uri="{28A0092B-C50C-407E-A947-70E740481C1C}">
-                <a14:useLocalDpi xmlns:a14="http://schemas.microsoft.com/office/drawing/2010/main" val="0"/>
-              </a:ext>
-            </a:extLst>
-          </a:blip>
-          <a:srcRect t="28813"/>
-          <a:stretch/>
-        </p:blipFill>
-        <p:spPr>
-          <a:xfrm>
-            <a:off x="5999559" y="0"/>
-            <a:ext cx="1202540" cy="1141407"/>
-          </a:xfrm>
-          <a:prstGeom prst="rect">
-            <a:avLst/>
-          </a:prstGeom>
-        </p:spPr>
-      </p:pic>
-      <p:pic>
-        <p:nvPicPr>
-          <p:cNvPr id="17" name="Picture 16">
-            <a:extLst>
-              <a:ext uri="{FF2B5EF4-FFF2-40B4-BE49-F238E27FC236}">
-                <a16:creationId xmlns:a16="http://schemas.microsoft.com/office/drawing/2014/main" id="{D1692A93-3514-4486-8B67-CCA4E0259BCB}"/>
-              </a:ext>
-              <a:ext uri="{C183D7F6-B498-43B3-948B-1728B52AA6E4}">
-                <adec:decorative xmlns:adec="http://schemas.microsoft.com/office/drawing/2017/decorative" val="1"/>
-              </a:ext>
-            </a:extLst>
-          </p:cNvPr>
-          <p:cNvPicPr>
-            <a:picLocks noGrp="1" noRot="1" noChangeAspect="1" noMove="1" noResize="1" noEditPoints="1" noAdjustHandles="1" noChangeArrowheads="1" noChangeShapeType="1" noCrop="1"/>
-          </p:cNvPicPr>
-          <p:nvPr>
-            <p:extLst>
-              <p:ext uri="{386F3935-93C4-4BCD-93E2-E3B085C9AB24}">
-                <p16:designElem xmlns:p16="http://schemas.microsoft.com/office/powerpoint/2015/main" val="1"/>
-              </p:ext>
-            </p:extLst>
-          </p:nvPr>
-        </p:nvPicPr>
-        <p:blipFill rotWithShape="1">
-          <a:blip r:embed="rId5">
-            <a:extLst>
-              <a:ext uri="{28A0092B-C50C-407E-A947-70E740481C1C}">
-                <a14:useLocalDpi xmlns:a14="http://schemas.microsoft.com/office/drawing/2010/main" val="0"/>
-              </a:ext>
-            </a:extLst>
-          </a:blip>
-          <a:srcRect b="23320"/>
-          <a:stretch/>
-        </p:blipFill>
-        <p:spPr>
-          <a:xfrm>
-            <a:off x="6454408" y="6096000"/>
-            <a:ext cx="745301" cy="762000"/>
-          </a:xfrm>
-          <a:prstGeom prst="rect">
-            <a:avLst/>
-          </a:prstGeom>
-        </p:spPr>
-      </p:pic>
-      <p:sp>
-        <p:nvSpPr>
-          <p:cNvPr id="19" name="Rectangle 18">
-            <a:extLst>
-              <a:ext uri="{FF2B5EF4-FFF2-40B4-BE49-F238E27FC236}">
-                <a16:creationId xmlns:a16="http://schemas.microsoft.com/office/drawing/2014/main" id="{01AD250C-F2EA-449F-9B14-DF5BB674C500}"/>
-              </a:ext>
-              <a:ext uri="{C183D7F6-B498-43B3-948B-1728B52AA6E4}">
-                <adec:decorative xmlns:adec="http://schemas.microsoft.com/office/drawing/2017/decorative" val="1"/>
-              </a:ext>
-            </a:extLst>
-          </p:cNvPr>
-          <p:cNvSpPr>
-            <a:spLocks noGrp="1" noRot="1" noChangeAspect="1" noMove="1" noResize="1" noEditPoints="1" noAdjustHandles="1" noChangeArrowheads="1" noChangeShapeType="1" noTextEdit="1"/>
-          </p:cNvSpPr>
-          <p:nvPr>
-            <p:extLst>
-              <p:ext uri="{386F3935-93C4-4BCD-93E2-E3B085C9AB24}">
-                <p16:designElem xmlns:p16="http://schemas.microsoft.com/office/powerpoint/2015/main" val="1"/>
-              </p:ext>
-            </p:extLst>
-          </p:nvPr>
-        </p:nvSpPr>
-        <p:spPr>
-          <a:xfrm>
-            <a:off x="7828359" y="0"/>
-            <a:ext cx="514350" cy="1143000"/>
-          </a:xfrm>
-          <a:prstGeom prst="rect">
-            <a:avLst/>
-          </a:prstGeom>
-          <a:solidFill>
-            <a:schemeClr val="accent1"/>
-          </a:solidFill>
-          <a:ln>
-            <a:noFill/>
-          </a:ln>
-        </p:spPr>
-        <p:style>
-          <a:lnRef idx="1">
-            <a:schemeClr val="accent1"/>
-          </a:lnRef>
-          <a:fillRef idx="3">
-            <a:schemeClr val="accent1"/>
-          </a:fillRef>
-          <a:effectRef idx="2">
-            <a:schemeClr val="accent1"/>
-          </a:effectRef>
-          <a:fontRef idx="minor">
-            <a:schemeClr val="lt1"/>
-          </a:fontRef>
-        </p:style>
-        <p:txBody>
-          <a:bodyPr/>
-          <a:lstStyle/>
-          <a:p>
-            <a:endParaRPr lang="en-IN"/>
-          </a:p>
-        </p:txBody>
-      </p:sp>
-      <p:sp>
-        <p:nvSpPr>
-          <p:cNvPr id="21" name="Rectangle 20">
-            <a:extLst>
-              <a:ext uri="{FF2B5EF4-FFF2-40B4-BE49-F238E27FC236}">
-                <a16:creationId xmlns:a16="http://schemas.microsoft.com/office/drawing/2014/main" id="{ABE6F9A3-300E-47F5-B41C-C8C5E758DE7C}"/>
-              </a:ext>
-              <a:ext uri="{C183D7F6-B498-43B3-948B-1728B52AA6E4}">
-                <adec:decorative xmlns:adec="http://schemas.microsoft.com/office/drawing/2017/decorative" val="1"/>
-              </a:ext>
-            </a:extLst>
-          </p:cNvPr>
-          <p:cNvSpPr>
-            <a:spLocks noGrp="1" noRot="1" noChangeAspect="1" noMove="1" noResize="1" noEditPoints="1" noAdjustHandles="1" noChangeArrowheads="1" noChangeShapeType="1" noTextEdit="1"/>
-          </p:cNvSpPr>
-          <p:nvPr>
-            <p:extLst>
-              <p:ext uri="{386F3935-93C4-4BCD-93E2-E3B085C9AB24}">
-                <p16:designElem xmlns:p16="http://schemas.microsoft.com/office/powerpoint/2015/main" val="1"/>
-              </p:ext>
-            </p:extLst>
-          </p:nvPr>
-        </p:nvSpPr>
-        <p:spPr>
-          <a:xfrm>
-            <a:off x="0" y="0"/>
-            <a:ext cx="9143999" cy="6858000"/>
-          </a:xfrm>
-          <a:prstGeom prst="rect">
-            <a:avLst/>
-          </a:prstGeom>
-          <a:ln>
-            <a:noFill/>
-          </a:ln>
-        </p:spPr>
-        <p:style>
-          <a:lnRef idx="2">
-            <a:schemeClr val="accent1">
-              <a:shade val="50000"/>
-            </a:schemeClr>
-          </a:lnRef>
-          <a:fillRef idx="1003">
-            <a:schemeClr val="dk2"/>
-          </a:fillRef>
-          <a:effectRef idx="0">
-            <a:schemeClr val="accent1"/>
-          </a:effectRef>
-          <a:fontRef idx="minor">
-            <a:schemeClr val="lt1"/>
-          </a:fontRef>
-        </p:style>
-        <p:txBody>
-          <a:bodyPr rtlCol="0" anchor="ctr"/>
-          <a:lstStyle/>
-          <a:p>
-            <a:pPr algn="ctr"/>
-            <a:endParaRPr lang="en-US"/>
-          </a:p>
-        </p:txBody>
-      </p:sp>
-      <p:sp>
-        <p:nvSpPr>
-          <p:cNvPr id="2" name="Title 1">
-            <a:extLst>
-              <a:ext uri="{FF2B5EF4-FFF2-40B4-BE49-F238E27FC236}">
-                <a16:creationId xmlns:a16="http://schemas.microsoft.com/office/drawing/2014/main" id="{72F77F67-BE3C-0CB1-A445-4904E33B92A0}"/>
-              </a:ext>
-            </a:extLst>
-          </p:cNvPr>
-          <p:cNvSpPr>
-            <a:spLocks noGrp="1"/>
-          </p:cNvSpPr>
-          <p:nvPr>
-            <p:ph type="title"/>
-          </p:nvPr>
-        </p:nvSpPr>
-        <p:spPr>
-          <a:xfrm>
-            <a:off x="486696" y="1063417"/>
-            <a:ext cx="2629122" cy="4675396"/>
-          </a:xfrm>
-        </p:spPr>
-        <p:txBody>
-          <a:bodyPr vert="horz" lIns="91440" tIns="45720" rIns="91440" bIns="45720" rtlCol="0" anchor="ctr">
-            <a:normAutofit/>
-          </a:bodyPr>
-          <a:lstStyle/>
-          <a:p>
-            <a:pPr defTabSz="457200"/>
-            <a:r>
-              <a:rPr lang="en-US" sz="3300">
-                <a:solidFill>
-                  <a:srgbClr val="F2F2F2"/>
-                </a:solidFill>
-              </a:rPr>
-              <a:t>Conclusion</a:t>
-            </a:r>
-            <a:br>
-              <a:rPr lang="en-US" sz="3300">
-                <a:solidFill>
-                  <a:srgbClr val="F2F2F2"/>
-                </a:solidFill>
-              </a:rPr>
-            </a:br>
-            <a:endParaRPr lang="en-US" sz="3300">
-              <a:solidFill>
-                <a:srgbClr val="F2F2F2"/>
-              </a:solidFill>
-            </a:endParaRPr>
-          </a:p>
-        </p:txBody>
-      </p:sp>
-      <p:sp>
-        <p:nvSpPr>
-          <p:cNvPr id="23" name="Rectangle 22">
-            <a:extLst>
-              <a:ext uri="{FF2B5EF4-FFF2-40B4-BE49-F238E27FC236}">
-                <a16:creationId xmlns:a16="http://schemas.microsoft.com/office/drawing/2014/main" id="{61B4701B-39FE-43B8-86AA-D6B8789C2207}"/>
-              </a:ext>
-              <a:ext uri="{C183D7F6-B498-43B3-948B-1728B52AA6E4}">
-                <adec:decorative xmlns:adec="http://schemas.microsoft.com/office/drawing/2017/decorative" val="1"/>
-              </a:ext>
-            </a:extLst>
-          </p:cNvPr>
-          <p:cNvSpPr>
-            <a:spLocks noGrp="1" noRot="1" noChangeAspect="1" noMove="1" noResize="1" noEditPoints="1" noAdjustHandles="1" noChangeArrowheads="1" noChangeShapeType="1" noTextEdit="1"/>
-          </p:cNvSpPr>
-          <p:nvPr>
-            <p:extLst>
-              <p:ext uri="{386F3935-93C4-4BCD-93E2-E3B085C9AB24}">
-                <p16:designElem xmlns:p16="http://schemas.microsoft.com/office/powerpoint/2015/main" val="1"/>
-              </p:ext>
-            </p:extLst>
-          </p:nvPr>
-        </p:nvSpPr>
-        <p:spPr>
-          <a:xfrm>
-            <a:off x="3479292" y="0"/>
-            <a:ext cx="5664708" cy="6858000"/>
-          </a:xfrm>
-          <a:prstGeom prst="rect">
-            <a:avLst/>
-          </a:prstGeom>
-          <a:solidFill>
-            <a:srgbClr val="FFFFFF"/>
-          </a:solidFill>
-          <a:ln>
-            <a:noFill/>
-          </a:ln>
-        </p:spPr>
-        <p:style>
-          <a:lnRef idx="2">
-            <a:schemeClr val="accent1">
-              <a:shade val="50000"/>
-            </a:schemeClr>
-          </a:lnRef>
-          <a:fillRef idx="1">
-            <a:schemeClr val="accent1"/>
-          </a:fillRef>
-          <a:effectRef idx="0">
-            <a:schemeClr val="accent1"/>
-          </a:effectRef>
-          <a:fontRef idx="minor">
-            <a:schemeClr val="lt1"/>
-          </a:fontRef>
-        </p:style>
-        <p:txBody>
-          <a:bodyPr rtlCol="0" anchor="ctr"/>
-          <a:lstStyle/>
-          <a:p>
-            <a:pPr algn="ctr"/>
-            <a:endParaRPr lang="en-US"/>
-          </a:p>
-        </p:txBody>
-      </p:sp>
-      <p:sp useBgFill="1">
-        <p:nvSpPr>
-          <p:cNvPr id="25" name="Rounded Rectangle 9">
-            <a:extLst>
-              <a:ext uri="{FF2B5EF4-FFF2-40B4-BE49-F238E27FC236}">
-                <a16:creationId xmlns:a16="http://schemas.microsoft.com/office/drawing/2014/main" id="{E9A7EF13-49FA-4355-971A-34B065F35022}"/>
-              </a:ext>
-              <a:ext uri="{C183D7F6-B498-43B3-948B-1728B52AA6E4}">
-                <adec:decorative xmlns:adec="http://schemas.microsoft.com/office/drawing/2017/decorative" val="1"/>
-              </a:ext>
-            </a:extLst>
-          </p:cNvPr>
-          <p:cNvSpPr>
-            <a:spLocks noGrp="1" noRot="1" noChangeAspect="1" noMove="1" noResize="1" noEditPoints="1" noAdjustHandles="1" noChangeArrowheads="1" noChangeShapeType="1" noTextEdit="1"/>
-          </p:cNvSpPr>
-          <p:nvPr>
-            <p:extLst>
-              <p:ext uri="{386F3935-93C4-4BCD-93E2-E3B085C9AB24}">
-                <p16:designElem xmlns:p16="http://schemas.microsoft.com/office/powerpoint/2015/main" val="1"/>
-              </p:ext>
-            </p:extLst>
-          </p:nvPr>
-        </p:nvSpPr>
-        <p:spPr>
-          <a:xfrm>
-            <a:off x="3842766" y="484632"/>
-            <a:ext cx="4938073" cy="5739187"/>
-          </a:xfrm>
-          <a:prstGeom prst="roundRect">
-            <a:avLst>
-              <a:gd name="adj" fmla="val 0"/>
-            </a:avLst>
-          </a:prstGeom>
-          <a:ln w="12700" cap="sq">
-            <a:solidFill>
-              <a:schemeClr val="bg1">
-                <a:lumMod val="75000"/>
-              </a:schemeClr>
-            </a:solidFill>
-            <a:miter lim="800000"/>
-          </a:ln>
-          <a:effectLst>
-            <a:outerShdw blurRad="63500" dist="25400" dir="5400000" algn="tl" rotWithShape="0">
-              <a:srgbClr val="000000">
-                <a:alpha val="39000"/>
-              </a:srgbClr>
-            </a:outerShdw>
-          </a:effectLst>
-        </p:spPr>
-        <p:style>
-          <a:lnRef idx="2">
-            <a:schemeClr val="accent1">
-              <a:shade val="50000"/>
-            </a:schemeClr>
-          </a:lnRef>
-          <a:fillRef idx="1">
-            <a:schemeClr val="accent1"/>
-          </a:fillRef>
-          <a:effectRef idx="0">
-            <a:schemeClr val="accent1"/>
-          </a:effectRef>
-          <a:fontRef idx="minor">
-            <a:schemeClr val="lt1"/>
-          </a:fontRef>
-        </p:style>
-        <p:txBody>
-          <a:bodyPr rtlCol="0" anchor="ctr"/>
-          <a:lstStyle/>
-          <a:p>
-            <a:pPr algn="ctr"/>
-            <a:endParaRPr lang="en-US"/>
-          </a:p>
-        </p:txBody>
-      </p:sp>
-      <p:sp>
-        <p:nvSpPr>
-          <p:cNvPr id="27" name="Rectangle 26">
-            <a:extLst>
-              <a:ext uri="{FF2B5EF4-FFF2-40B4-BE49-F238E27FC236}">
-                <a16:creationId xmlns:a16="http://schemas.microsoft.com/office/drawing/2014/main" id="{92CF3C3E-0F7B-4F0C-8EBD-BDD38E9C66F5}"/>
-              </a:ext>
-              <a:ext uri="{C183D7F6-B498-43B3-948B-1728B52AA6E4}">
-                <adec:decorative xmlns:adec="http://schemas.microsoft.com/office/drawing/2017/decorative" val="1"/>
-              </a:ext>
-            </a:extLst>
-          </p:cNvPr>
-          <p:cNvSpPr>
-            <a:spLocks noGrp="1" noRot="1" noChangeAspect="1" noMove="1" noResize="1" noEditPoints="1" noAdjustHandles="1" noChangeArrowheads="1" noChangeShapeType="1" noTextEdit="1"/>
-          </p:cNvSpPr>
-          <p:nvPr>
-            <p:extLst>
-              <p:ext uri="{386F3935-93C4-4BCD-93E2-E3B085C9AB24}">
-                <p16:designElem xmlns:p16="http://schemas.microsoft.com/office/powerpoint/2015/main" val="1"/>
-              </p:ext>
-            </p:extLst>
-          </p:nvPr>
-        </p:nvSpPr>
-        <p:spPr>
-          <a:xfrm>
-            <a:off x="7831836" y="0"/>
-            <a:ext cx="514350" cy="1143000"/>
-          </a:xfrm>
-          <a:prstGeom prst="rect">
-            <a:avLst/>
-          </a:prstGeom>
-          <a:solidFill>
-            <a:schemeClr val="accent1"/>
-          </a:solidFill>
-          <a:ln>
-            <a:noFill/>
-          </a:ln>
-        </p:spPr>
-        <p:style>
-          <a:lnRef idx="1">
-            <a:schemeClr val="accent1"/>
-          </a:lnRef>
-          <a:fillRef idx="3">
-            <a:schemeClr val="accent1"/>
-          </a:fillRef>
-          <a:effectRef idx="2">
-            <a:schemeClr val="accent1"/>
-          </a:effectRef>
-          <a:fontRef idx="minor">
-            <a:schemeClr val="lt1"/>
-          </a:fontRef>
-        </p:style>
-        <p:txBody>
-          <a:bodyPr/>
-          <a:lstStyle/>
-          <a:p>
-            <a:endParaRPr lang="en-IN"/>
-          </a:p>
-        </p:txBody>
-      </p:sp>
-      <p:graphicFrame>
-        <p:nvGraphicFramePr>
-          <p:cNvPr id="5" name="Text Placeholder 2">
-            <a:extLst>
-              <a:ext uri="{FF2B5EF4-FFF2-40B4-BE49-F238E27FC236}">
-                <a16:creationId xmlns:a16="http://schemas.microsoft.com/office/drawing/2014/main" id="{A61BF3F7-8877-F996-8D05-AFB38396FB87}"/>
-              </a:ext>
-            </a:extLst>
-          </p:cNvPr>
-          <p:cNvGraphicFramePr/>
-          <p:nvPr>
-            <p:extLst>
-              <p:ext uri="{D42A27DB-BD31-4B8C-83A1-F6EECF244321}">
-                <p14:modId xmlns:p14="http://schemas.microsoft.com/office/powerpoint/2010/main" val="894824548"/>
-              </p:ext>
-            </p:extLst>
-          </p:nvPr>
-        </p:nvGraphicFramePr>
-        <p:xfrm>
-          <a:off x="4206478" y="965200"/>
-          <a:ext cx="4211240" cy="4773613"/>
-        </p:xfrm>
-        <a:graphic>
-          <a:graphicData uri="http://schemas.openxmlformats.org/drawingml/2006/diagram">
-            <dgm:relIds xmlns:dgm="http://schemas.openxmlformats.org/drawingml/2006/diagram" xmlns:r="http://schemas.openxmlformats.org/officeDocument/2006/relationships" r:dm="rId6" r:lo="rId7" r:qs="rId8" r:cs="rId9"/>
-          </a:graphicData>
-        </a:graphic>
-      </p:graphicFrame>
-    </p:spTree>
-    <p:extLst>
-      <p:ext uri="{BB962C8B-B14F-4D97-AF65-F5344CB8AC3E}">
-        <p14:creationId xmlns:p14="http://schemas.microsoft.com/office/powerpoint/2010/main" val="2585878474"/>
-      </p:ext>
-    </p:extLst>
-  </p:cSld>
-  <p:clrMapOvr>
-    <a:overrideClrMapping bg1="lt1" tx1="dk1" bg2="lt2" tx2="dk2" accent1="accent1" accent2="accent2" accent3="accent3" accent4="accent4" accent5="accent5" accent6="accent6" hlink="hlink" folHlink="folHlink"/>
-  </p:clrMapOvr>
-</p:sld>
-</file>
-
 <file path=ppt/slides/slide19.xml><?xml version="1.0" encoding="utf-8"?>
 <p:sld xmlns:a="http://schemas.openxmlformats.org/drawingml/2006/main" xmlns:r="http://schemas.openxmlformats.org/officeDocument/2006/relationships" xmlns:p="http://schemas.openxmlformats.org/presentationml/2006/main">
   <p:cSld>
@@ -19979,6 +20635,1419 @@
           <p:cNvPr id="21" name="Rectangle 20">
             <a:extLst>
               <a:ext uri="{FF2B5EF4-FFF2-40B4-BE49-F238E27FC236}">
+                <a16:creationId xmlns:a16="http://schemas.microsoft.com/office/drawing/2014/main" id="{ABE6F9A3-300E-47F5-B41C-C8C5E758DE7C}"/>
+              </a:ext>
+              <a:ext uri="{C183D7F6-B498-43B3-948B-1728B52AA6E4}">
+                <adec:decorative xmlns:adec="http://schemas.microsoft.com/office/drawing/2017/decorative" val="1"/>
+              </a:ext>
+            </a:extLst>
+          </p:cNvPr>
+          <p:cNvSpPr>
+            <a:spLocks noGrp="1" noRot="1" noChangeAspect="1" noMove="1" noResize="1" noEditPoints="1" noAdjustHandles="1" noChangeArrowheads="1" noChangeShapeType="1" noTextEdit="1"/>
+          </p:cNvSpPr>
+          <p:nvPr>
+            <p:extLst>
+              <p:ext uri="{386F3935-93C4-4BCD-93E2-E3B085C9AB24}">
+                <p16:designElem xmlns:p16="http://schemas.microsoft.com/office/powerpoint/2015/main" val="1"/>
+              </p:ext>
+            </p:extLst>
+          </p:nvPr>
+        </p:nvSpPr>
+        <p:spPr>
+          <a:xfrm>
+            <a:off x="0" y="0"/>
+            <a:ext cx="9143999" cy="6858000"/>
+          </a:xfrm>
+          <a:prstGeom prst="rect">
+            <a:avLst/>
+          </a:prstGeom>
+          <a:ln>
+            <a:noFill/>
+          </a:ln>
+        </p:spPr>
+        <p:style>
+          <a:lnRef idx="2">
+            <a:schemeClr val="accent1">
+              <a:shade val="50000"/>
+            </a:schemeClr>
+          </a:lnRef>
+          <a:fillRef idx="1003">
+            <a:schemeClr val="dk2"/>
+          </a:fillRef>
+          <a:effectRef idx="0">
+            <a:schemeClr val="accent1"/>
+          </a:effectRef>
+          <a:fontRef idx="minor">
+            <a:schemeClr val="lt1"/>
+          </a:fontRef>
+        </p:style>
+        <p:txBody>
+          <a:bodyPr rtlCol="0" anchor="ctr"/>
+          <a:lstStyle/>
+          <a:p>
+            <a:pPr algn="ctr"/>
+            <a:endParaRPr lang="en-US"/>
+          </a:p>
+        </p:txBody>
+      </p:sp>
+      <p:sp>
+        <p:nvSpPr>
+          <p:cNvPr id="2" name="Title 1">
+            <a:extLst>
+              <a:ext uri="{FF2B5EF4-FFF2-40B4-BE49-F238E27FC236}">
+                <a16:creationId xmlns:a16="http://schemas.microsoft.com/office/drawing/2014/main" id="{72F77F67-BE3C-0CB1-A445-4904E33B92A0}"/>
+              </a:ext>
+            </a:extLst>
+          </p:cNvPr>
+          <p:cNvSpPr>
+            <a:spLocks noGrp="1"/>
+          </p:cNvSpPr>
+          <p:nvPr>
+            <p:ph type="title"/>
+          </p:nvPr>
+        </p:nvSpPr>
+        <p:spPr>
+          <a:xfrm>
+            <a:off x="486696" y="1063417"/>
+            <a:ext cx="2629122" cy="4675396"/>
+          </a:xfrm>
+        </p:spPr>
+        <p:txBody>
+          <a:bodyPr vert="horz" lIns="91440" tIns="45720" rIns="91440" bIns="45720" rtlCol="0" anchor="ctr">
+            <a:normAutofit/>
+          </a:bodyPr>
+          <a:lstStyle/>
+          <a:p>
+            <a:pPr defTabSz="457200"/>
+            <a:r>
+              <a:rPr lang="en-US" sz="3300">
+                <a:solidFill>
+                  <a:srgbClr val="F2F2F2"/>
+                </a:solidFill>
+              </a:rPr>
+              <a:t>Conclusion</a:t>
+            </a:r>
+            <a:br>
+              <a:rPr lang="en-US" sz="3300">
+                <a:solidFill>
+                  <a:srgbClr val="F2F2F2"/>
+                </a:solidFill>
+              </a:rPr>
+            </a:br>
+            <a:endParaRPr lang="en-US" sz="3300">
+              <a:solidFill>
+                <a:srgbClr val="F2F2F2"/>
+              </a:solidFill>
+            </a:endParaRPr>
+          </a:p>
+        </p:txBody>
+      </p:sp>
+      <p:sp>
+        <p:nvSpPr>
+          <p:cNvPr id="23" name="Rectangle 22">
+            <a:extLst>
+              <a:ext uri="{FF2B5EF4-FFF2-40B4-BE49-F238E27FC236}">
+                <a16:creationId xmlns:a16="http://schemas.microsoft.com/office/drawing/2014/main" id="{61B4701B-39FE-43B8-86AA-D6B8789C2207}"/>
+              </a:ext>
+              <a:ext uri="{C183D7F6-B498-43B3-948B-1728B52AA6E4}">
+                <adec:decorative xmlns:adec="http://schemas.microsoft.com/office/drawing/2017/decorative" val="1"/>
+              </a:ext>
+            </a:extLst>
+          </p:cNvPr>
+          <p:cNvSpPr>
+            <a:spLocks noGrp="1" noRot="1" noChangeAspect="1" noMove="1" noResize="1" noEditPoints="1" noAdjustHandles="1" noChangeArrowheads="1" noChangeShapeType="1" noTextEdit="1"/>
+          </p:cNvSpPr>
+          <p:nvPr>
+            <p:extLst>
+              <p:ext uri="{386F3935-93C4-4BCD-93E2-E3B085C9AB24}">
+                <p16:designElem xmlns:p16="http://schemas.microsoft.com/office/powerpoint/2015/main" val="1"/>
+              </p:ext>
+            </p:extLst>
+          </p:nvPr>
+        </p:nvSpPr>
+        <p:spPr>
+          <a:xfrm>
+            <a:off x="3479292" y="0"/>
+            <a:ext cx="5664708" cy="6858000"/>
+          </a:xfrm>
+          <a:prstGeom prst="rect">
+            <a:avLst/>
+          </a:prstGeom>
+          <a:solidFill>
+            <a:srgbClr val="FFFFFF"/>
+          </a:solidFill>
+          <a:ln>
+            <a:noFill/>
+          </a:ln>
+        </p:spPr>
+        <p:style>
+          <a:lnRef idx="2">
+            <a:schemeClr val="accent1">
+              <a:shade val="50000"/>
+            </a:schemeClr>
+          </a:lnRef>
+          <a:fillRef idx="1">
+            <a:schemeClr val="accent1"/>
+          </a:fillRef>
+          <a:effectRef idx="0">
+            <a:schemeClr val="accent1"/>
+          </a:effectRef>
+          <a:fontRef idx="minor">
+            <a:schemeClr val="lt1"/>
+          </a:fontRef>
+        </p:style>
+        <p:txBody>
+          <a:bodyPr rtlCol="0" anchor="ctr"/>
+          <a:lstStyle/>
+          <a:p>
+            <a:pPr algn="ctr"/>
+            <a:endParaRPr lang="en-US"/>
+          </a:p>
+        </p:txBody>
+      </p:sp>
+      <p:sp useBgFill="1">
+        <p:nvSpPr>
+          <p:cNvPr id="25" name="Rounded Rectangle 9">
+            <a:extLst>
+              <a:ext uri="{FF2B5EF4-FFF2-40B4-BE49-F238E27FC236}">
+                <a16:creationId xmlns:a16="http://schemas.microsoft.com/office/drawing/2014/main" id="{E9A7EF13-49FA-4355-971A-34B065F35022}"/>
+              </a:ext>
+              <a:ext uri="{C183D7F6-B498-43B3-948B-1728B52AA6E4}">
+                <adec:decorative xmlns:adec="http://schemas.microsoft.com/office/drawing/2017/decorative" val="1"/>
+              </a:ext>
+            </a:extLst>
+          </p:cNvPr>
+          <p:cNvSpPr>
+            <a:spLocks noGrp="1" noRot="1" noChangeAspect="1" noMove="1" noResize="1" noEditPoints="1" noAdjustHandles="1" noChangeArrowheads="1" noChangeShapeType="1" noTextEdit="1"/>
+          </p:cNvSpPr>
+          <p:nvPr>
+            <p:extLst>
+              <p:ext uri="{386F3935-93C4-4BCD-93E2-E3B085C9AB24}">
+                <p16:designElem xmlns:p16="http://schemas.microsoft.com/office/powerpoint/2015/main" val="1"/>
+              </p:ext>
+            </p:extLst>
+          </p:nvPr>
+        </p:nvSpPr>
+        <p:spPr>
+          <a:xfrm>
+            <a:off x="3842766" y="484632"/>
+            <a:ext cx="4938073" cy="5739187"/>
+          </a:xfrm>
+          <a:prstGeom prst="roundRect">
+            <a:avLst>
+              <a:gd name="adj" fmla="val 0"/>
+            </a:avLst>
+          </a:prstGeom>
+          <a:ln w="12700" cap="sq">
+            <a:solidFill>
+              <a:schemeClr val="bg1">
+                <a:lumMod val="75000"/>
+              </a:schemeClr>
+            </a:solidFill>
+            <a:miter lim="800000"/>
+          </a:ln>
+          <a:effectLst>
+            <a:outerShdw blurRad="63500" dist="25400" dir="5400000" algn="tl" rotWithShape="0">
+              <a:srgbClr val="000000">
+                <a:alpha val="39000"/>
+              </a:srgbClr>
+            </a:outerShdw>
+          </a:effectLst>
+        </p:spPr>
+        <p:style>
+          <a:lnRef idx="2">
+            <a:schemeClr val="accent1">
+              <a:shade val="50000"/>
+            </a:schemeClr>
+          </a:lnRef>
+          <a:fillRef idx="1">
+            <a:schemeClr val="accent1"/>
+          </a:fillRef>
+          <a:effectRef idx="0">
+            <a:schemeClr val="accent1"/>
+          </a:effectRef>
+          <a:fontRef idx="minor">
+            <a:schemeClr val="lt1"/>
+          </a:fontRef>
+        </p:style>
+        <p:txBody>
+          <a:bodyPr rtlCol="0" anchor="ctr"/>
+          <a:lstStyle/>
+          <a:p>
+            <a:pPr algn="ctr"/>
+            <a:endParaRPr lang="en-US"/>
+          </a:p>
+        </p:txBody>
+      </p:sp>
+      <p:sp>
+        <p:nvSpPr>
+          <p:cNvPr id="27" name="Rectangle 26">
+            <a:extLst>
+              <a:ext uri="{FF2B5EF4-FFF2-40B4-BE49-F238E27FC236}">
+                <a16:creationId xmlns:a16="http://schemas.microsoft.com/office/drawing/2014/main" id="{92CF3C3E-0F7B-4F0C-8EBD-BDD38E9C66F5}"/>
+              </a:ext>
+              <a:ext uri="{C183D7F6-B498-43B3-948B-1728B52AA6E4}">
+                <adec:decorative xmlns:adec="http://schemas.microsoft.com/office/drawing/2017/decorative" val="1"/>
+              </a:ext>
+            </a:extLst>
+          </p:cNvPr>
+          <p:cNvSpPr>
+            <a:spLocks noGrp="1" noRot="1" noChangeAspect="1" noMove="1" noResize="1" noEditPoints="1" noAdjustHandles="1" noChangeArrowheads="1" noChangeShapeType="1" noTextEdit="1"/>
+          </p:cNvSpPr>
+          <p:nvPr>
+            <p:extLst>
+              <p:ext uri="{386F3935-93C4-4BCD-93E2-E3B085C9AB24}">
+                <p16:designElem xmlns:p16="http://schemas.microsoft.com/office/powerpoint/2015/main" val="1"/>
+              </p:ext>
+            </p:extLst>
+          </p:nvPr>
+        </p:nvSpPr>
+        <p:spPr>
+          <a:xfrm>
+            <a:off x="7831836" y="0"/>
+            <a:ext cx="514350" cy="1143000"/>
+          </a:xfrm>
+          <a:prstGeom prst="rect">
+            <a:avLst/>
+          </a:prstGeom>
+          <a:solidFill>
+            <a:schemeClr val="accent1"/>
+          </a:solidFill>
+          <a:ln>
+            <a:noFill/>
+          </a:ln>
+        </p:spPr>
+        <p:style>
+          <a:lnRef idx="1">
+            <a:schemeClr val="accent1"/>
+          </a:lnRef>
+          <a:fillRef idx="3">
+            <a:schemeClr val="accent1"/>
+          </a:fillRef>
+          <a:effectRef idx="2">
+            <a:schemeClr val="accent1"/>
+          </a:effectRef>
+          <a:fontRef idx="minor">
+            <a:schemeClr val="lt1"/>
+          </a:fontRef>
+        </p:style>
+        <p:txBody>
+          <a:bodyPr/>
+          <a:lstStyle/>
+          <a:p>
+            <a:endParaRPr lang="en-IN"/>
+          </a:p>
+        </p:txBody>
+      </p:sp>
+      <p:graphicFrame>
+        <p:nvGraphicFramePr>
+          <p:cNvPr id="5" name="Text Placeholder 2">
+            <a:extLst>
+              <a:ext uri="{FF2B5EF4-FFF2-40B4-BE49-F238E27FC236}">
+                <a16:creationId xmlns:a16="http://schemas.microsoft.com/office/drawing/2014/main" id="{A61BF3F7-8877-F996-8D05-AFB38396FB87}"/>
+              </a:ext>
+            </a:extLst>
+          </p:cNvPr>
+          <p:cNvGraphicFramePr/>
+          <p:nvPr>
+            <p:extLst>
+              <p:ext uri="{D42A27DB-BD31-4B8C-83A1-F6EECF244321}">
+                <p14:modId xmlns:p14="http://schemas.microsoft.com/office/powerpoint/2010/main" val="894824548"/>
+              </p:ext>
+            </p:extLst>
+          </p:nvPr>
+        </p:nvGraphicFramePr>
+        <p:xfrm>
+          <a:off x="4206478" y="965200"/>
+          <a:ext cx="4211240" cy="4773613"/>
+        </p:xfrm>
+        <a:graphic>
+          <a:graphicData uri="http://schemas.openxmlformats.org/drawingml/2006/diagram">
+            <dgm:relIds xmlns:dgm="http://schemas.openxmlformats.org/drawingml/2006/diagram" xmlns:r="http://schemas.openxmlformats.org/officeDocument/2006/relationships" r:dm="rId6" r:lo="rId7" r:qs="rId8" r:cs="rId9"/>
+          </a:graphicData>
+        </a:graphic>
+      </p:graphicFrame>
+    </p:spTree>
+    <p:extLst>
+      <p:ext uri="{BB962C8B-B14F-4D97-AF65-F5344CB8AC3E}">
+        <p14:creationId xmlns:p14="http://schemas.microsoft.com/office/powerpoint/2010/main" val="2585878474"/>
+      </p:ext>
+    </p:extLst>
+  </p:cSld>
+  <p:clrMapOvr>
+    <a:overrideClrMapping bg1="lt1" tx1="dk1" bg2="lt2" tx2="dk2" accent1="accent1" accent2="accent2" accent3="accent3" accent4="accent4" accent5="accent5" accent6="accent6" hlink="hlink" folHlink="folHlink"/>
+  </p:clrMapOvr>
+</p:sld>
+</file>
+
+<file path=ppt/slides/slide2.xml><?xml version="1.0" encoding="utf-8"?>
+<p:sld xmlns:a="http://schemas.openxmlformats.org/drawingml/2006/main" xmlns:r="http://schemas.openxmlformats.org/officeDocument/2006/relationships" xmlns:p="http://schemas.openxmlformats.org/presentationml/2006/main">
+  <p:cSld>
+    <p:bg>
+      <p:bgPr>
+        <a:blipFill rotWithShape="1">
+          <a:blip r:embed="rId2">
+            <a:duotone>
+              <a:schemeClr val="bg2">
+                <a:shade val="69000"/>
+                <a:hueMod val="108000"/>
+                <a:satMod val="164000"/>
+                <a:lumMod val="74000"/>
+              </a:schemeClr>
+              <a:schemeClr val="bg2">
+                <a:tint val="96000"/>
+                <a:hueMod val="88000"/>
+                <a:satMod val="140000"/>
+                <a:lumMod val="132000"/>
+              </a:schemeClr>
+            </a:duotone>
+          </a:blip>
+          <a:stretch/>
+        </a:blipFill>
+        <a:effectLst/>
+      </p:bgPr>
+    </p:bg>
+    <p:spTree>
+      <p:nvGrpSpPr>
+        <p:cNvPr id="1" name=""/>
+        <p:cNvGrpSpPr/>
+        <p:nvPr/>
+      </p:nvGrpSpPr>
+      <p:grpSpPr>
+        <a:xfrm>
+          <a:off x="0" y="0"/>
+          <a:ext cx="0" cy="0"/>
+          <a:chOff x="0" y="0"/>
+          <a:chExt cx="0" cy="0"/>
+        </a:xfrm>
+      </p:grpSpPr>
+      <p:pic>
+        <p:nvPicPr>
+          <p:cNvPr id="68" name="Picture 67">
+            <a:extLst>
+              <a:ext uri="{FF2B5EF4-FFF2-40B4-BE49-F238E27FC236}">
+                <a16:creationId xmlns:a16="http://schemas.microsoft.com/office/drawing/2014/main" id="{91B28F63-CF00-448F-B141-FE33C33B1891}"/>
+              </a:ext>
+              <a:ext uri="{C183D7F6-B498-43B3-948B-1728B52AA6E4}">
+                <adec:decorative xmlns:adec="http://schemas.microsoft.com/office/drawing/2017/decorative" val="1"/>
+              </a:ext>
+            </a:extLst>
+          </p:cNvPr>
+          <p:cNvPicPr>
+            <a:picLocks noGrp="1" noRot="1" noChangeAspect="1" noMove="1" noResize="1" noEditPoints="1" noAdjustHandles="1" noChangeArrowheads="1" noChangeShapeType="1" noCrop="1"/>
+          </p:cNvPicPr>
+          <p:nvPr>
+            <p:extLst>
+              <p:ext uri="{386F3935-93C4-4BCD-93E2-E3B085C9AB24}">
+                <p16:designElem xmlns:p16="http://schemas.microsoft.com/office/powerpoint/2015/main" val="1"/>
+              </p:ext>
+            </p:extLst>
+          </p:nvPr>
+        </p:nvPicPr>
+        <p:blipFill rotWithShape="1">
+          <a:blip r:embed="rId3">
+            <a:extLst>
+              <a:ext uri="{28A0092B-C50C-407E-A947-70E740481C1C}">
+                <a14:useLocalDpi xmlns:a14="http://schemas.microsoft.com/office/drawing/2010/main" val="0"/>
+              </a:ext>
+            </a:extLst>
+          </a:blip>
+          <a:srcRect l="3613"/>
+          <a:stretch/>
+        </p:blipFill>
+        <p:spPr>
+          <a:xfrm>
+            <a:off x="0" y="2669685"/>
+            <a:ext cx="3027759" cy="4188315"/>
+          </a:xfrm>
+          <a:prstGeom prst="rect">
+            <a:avLst/>
+          </a:prstGeom>
+        </p:spPr>
+      </p:pic>
+      <p:pic>
+        <p:nvPicPr>
+          <p:cNvPr id="70" name="Picture 69">
+            <a:extLst>
+              <a:ext uri="{FF2B5EF4-FFF2-40B4-BE49-F238E27FC236}">
+                <a16:creationId xmlns:a16="http://schemas.microsoft.com/office/drawing/2014/main" id="{2AE609E2-8522-44E4-9077-980E5BCF3E14}"/>
+              </a:ext>
+              <a:ext uri="{C183D7F6-B498-43B3-948B-1728B52AA6E4}">
+                <adec:decorative xmlns:adec="http://schemas.microsoft.com/office/drawing/2017/decorative" val="1"/>
+              </a:ext>
+            </a:extLst>
+          </p:cNvPr>
+          <p:cNvPicPr>
+            <a:picLocks noGrp="1" noRot="1" noChangeAspect="1" noMove="1" noResize="1" noEditPoints="1" noAdjustHandles="1" noChangeArrowheads="1" noChangeShapeType="1" noCrop="1"/>
+          </p:cNvPicPr>
+          <p:nvPr>
+            <p:extLst>
+              <p:ext uri="{386F3935-93C4-4BCD-93E2-E3B085C9AB24}">
+                <p16:designElem xmlns:p16="http://schemas.microsoft.com/office/powerpoint/2015/main" val="1"/>
+              </p:ext>
+            </p:extLst>
+          </p:nvPr>
+        </p:nvPicPr>
+        <p:blipFill rotWithShape="1">
+          <a:blip r:embed="rId4">
+            <a:extLst>
+              <a:ext uri="{28A0092B-C50C-407E-A947-70E740481C1C}">
+                <a14:useLocalDpi xmlns:a14="http://schemas.microsoft.com/office/drawing/2010/main" val="0"/>
+              </a:ext>
+            </a:extLst>
+          </a:blip>
+          <a:srcRect l="35640"/>
+          <a:stretch/>
+        </p:blipFill>
+        <p:spPr>
+          <a:xfrm>
+            <a:off x="0" y="2892347"/>
+            <a:ext cx="1141809" cy="2365453"/>
+          </a:xfrm>
+          <a:prstGeom prst="rect">
+            <a:avLst/>
+          </a:prstGeom>
+        </p:spPr>
+      </p:pic>
+      <p:sp>
+        <p:nvSpPr>
+          <p:cNvPr id="72" name="Oval 71">
+            <a:extLst>
+              <a:ext uri="{FF2B5EF4-FFF2-40B4-BE49-F238E27FC236}">
+                <a16:creationId xmlns:a16="http://schemas.microsoft.com/office/drawing/2014/main" id="{4FA533C5-33E3-4611-AF9F-72811D8B26A6}"/>
+              </a:ext>
+              <a:ext uri="{C183D7F6-B498-43B3-948B-1728B52AA6E4}">
+                <adec:decorative xmlns:adec="http://schemas.microsoft.com/office/drawing/2017/decorative" val="1"/>
+              </a:ext>
+            </a:extLst>
+          </p:cNvPr>
+          <p:cNvSpPr>
+            <a:spLocks noGrp="1" noRot="1" noChangeAspect="1" noMove="1" noResize="1" noEditPoints="1" noAdjustHandles="1" noChangeArrowheads="1" noChangeShapeType="1" noTextEdit="1"/>
+          </p:cNvSpPr>
+          <p:nvPr>
+            <p:extLst>
+              <p:ext uri="{386F3935-93C4-4BCD-93E2-E3B085C9AB24}">
+                <p16:designElem xmlns:p16="http://schemas.microsoft.com/office/powerpoint/2015/main" val="1"/>
+              </p:ext>
+            </p:extLst>
+          </p:nvPr>
+        </p:nvSpPr>
+        <p:spPr>
+          <a:xfrm>
+            <a:off x="6456759" y="1676400"/>
+            <a:ext cx="2114550" cy="2819400"/>
+          </a:xfrm>
+          <a:prstGeom prst="ellipse">
+            <a:avLst/>
+          </a:prstGeom>
+          <a:gradFill flip="none" rotWithShape="1">
+            <a:gsLst>
+              <a:gs pos="0">
+                <a:schemeClr val="bg2">
+                  <a:lumMod val="60000"/>
+                  <a:lumOff val="40000"/>
+                  <a:alpha val="7000"/>
+                </a:schemeClr>
+              </a:gs>
+              <a:gs pos="69000">
+                <a:schemeClr val="bg2">
+                  <a:lumMod val="60000"/>
+                  <a:lumOff val="40000"/>
+                  <a:alpha val="0"/>
+                </a:schemeClr>
+              </a:gs>
+              <a:gs pos="36000">
+                <a:schemeClr val="bg2">
+                  <a:lumMod val="60000"/>
+                  <a:lumOff val="40000"/>
+                  <a:alpha val="6000"/>
+                </a:schemeClr>
+              </a:gs>
+            </a:gsLst>
+            <a:path path="circle">
+              <a:fillToRect l="50000" t="50000" r="50000" b="50000"/>
+            </a:path>
+            <a:tileRect/>
+          </a:gradFill>
+          <a:ln>
+            <a:noFill/>
+          </a:ln>
+          <a:effectLst/>
+        </p:spPr>
+        <p:style>
+          <a:lnRef idx="1">
+            <a:schemeClr val="accent1"/>
+          </a:lnRef>
+          <a:fillRef idx="3">
+            <a:schemeClr val="accent1"/>
+          </a:fillRef>
+          <a:effectRef idx="2">
+            <a:schemeClr val="accent1"/>
+          </a:effectRef>
+          <a:fontRef idx="minor">
+            <a:schemeClr val="lt1"/>
+          </a:fontRef>
+        </p:style>
+        <p:txBody>
+          <a:bodyPr/>
+          <a:lstStyle/>
+          <a:p>
+            <a:endParaRPr lang="en-IN"/>
+          </a:p>
+        </p:txBody>
+      </p:sp>
+      <p:pic>
+        <p:nvPicPr>
+          <p:cNvPr id="74" name="Picture 73">
+            <a:extLst>
+              <a:ext uri="{FF2B5EF4-FFF2-40B4-BE49-F238E27FC236}">
+                <a16:creationId xmlns:a16="http://schemas.microsoft.com/office/drawing/2014/main" id="{8949AD42-25FD-4C3D-9EEE-B7FEC5809988}"/>
+              </a:ext>
+              <a:ext uri="{C183D7F6-B498-43B3-948B-1728B52AA6E4}">
+                <adec:decorative xmlns:adec="http://schemas.microsoft.com/office/drawing/2017/decorative" val="1"/>
+              </a:ext>
+            </a:extLst>
+          </p:cNvPr>
+          <p:cNvPicPr>
+            <a:picLocks noGrp="1" noRot="1" noChangeAspect="1" noMove="1" noResize="1" noEditPoints="1" noAdjustHandles="1" noChangeArrowheads="1" noChangeShapeType="1" noCrop="1"/>
+          </p:cNvPicPr>
+          <p:nvPr>
+            <p:extLst>
+              <p:ext uri="{386F3935-93C4-4BCD-93E2-E3B085C9AB24}">
+                <p16:designElem xmlns:p16="http://schemas.microsoft.com/office/powerpoint/2015/main" val="1"/>
+              </p:ext>
+            </p:extLst>
+          </p:nvPr>
+        </p:nvPicPr>
+        <p:blipFill rotWithShape="1">
+          <a:blip r:embed="rId5">
+            <a:extLst>
+              <a:ext uri="{28A0092B-C50C-407E-A947-70E740481C1C}">
+                <a14:useLocalDpi xmlns:a14="http://schemas.microsoft.com/office/drawing/2010/main" val="0"/>
+              </a:ext>
+            </a:extLst>
+          </a:blip>
+          <a:srcRect t="28813"/>
+          <a:stretch/>
+        </p:blipFill>
+        <p:spPr>
+          <a:xfrm>
+            <a:off x="5999559" y="0"/>
+            <a:ext cx="1202540" cy="1141407"/>
+          </a:xfrm>
+          <a:prstGeom prst="rect">
+            <a:avLst/>
+          </a:prstGeom>
+        </p:spPr>
+      </p:pic>
+      <p:pic>
+        <p:nvPicPr>
+          <p:cNvPr id="76" name="Picture 75">
+            <a:extLst>
+              <a:ext uri="{FF2B5EF4-FFF2-40B4-BE49-F238E27FC236}">
+                <a16:creationId xmlns:a16="http://schemas.microsoft.com/office/drawing/2014/main" id="{6AC7D913-60B7-4603-881B-831DA5D3A940}"/>
+              </a:ext>
+              <a:ext uri="{C183D7F6-B498-43B3-948B-1728B52AA6E4}">
+                <adec:decorative xmlns:adec="http://schemas.microsoft.com/office/drawing/2017/decorative" val="1"/>
+              </a:ext>
+            </a:extLst>
+          </p:cNvPr>
+          <p:cNvPicPr>
+            <a:picLocks noGrp="1" noRot="1" noChangeAspect="1" noMove="1" noResize="1" noEditPoints="1" noAdjustHandles="1" noChangeArrowheads="1" noChangeShapeType="1" noCrop="1"/>
+          </p:cNvPicPr>
+          <p:nvPr>
+            <p:extLst>
+              <p:ext uri="{386F3935-93C4-4BCD-93E2-E3B085C9AB24}">
+                <p16:designElem xmlns:p16="http://schemas.microsoft.com/office/powerpoint/2015/main" val="1"/>
+              </p:ext>
+            </p:extLst>
+          </p:nvPr>
+        </p:nvPicPr>
+        <p:blipFill rotWithShape="1">
+          <a:blip r:embed="rId6">
+            <a:extLst>
+              <a:ext uri="{28A0092B-C50C-407E-A947-70E740481C1C}">
+                <a14:useLocalDpi xmlns:a14="http://schemas.microsoft.com/office/drawing/2010/main" val="0"/>
+              </a:ext>
+            </a:extLst>
+          </a:blip>
+          <a:srcRect b="23320"/>
+          <a:stretch/>
+        </p:blipFill>
+        <p:spPr>
+          <a:xfrm>
+            <a:off x="6454408" y="6096000"/>
+            <a:ext cx="745301" cy="762000"/>
+          </a:xfrm>
+          <a:prstGeom prst="rect">
+            <a:avLst/>
+          </a:prstGeom>
+        </p:spPr>
+      </p:pic>
+      <p:sp>
+        <p:nvSpPr>
+          <p:cNvPr id="78" name="Rectangle 77">
+            <a:extLst>
+              <a:ext uri="{FF2B5EF4-FFF2-40B4-BE49-F238E27FC236}">
+                <a16:creationId xmlns:a16="http://schemas.microsoft.com/office/drawing/2014/main" id="{87F0FDC4-AD8C-47D9-9131-623C98ADB0AE}"/>
+              </a:ext>
+              <a:ext uri="{C183D7F6-B498-43B3-948B-1728B52AA6E4}">
+                <adec:decorative xmlns:adec="http://schemas.microsoft.com/office/drawing/2017/decorative" val="1"/>
+              </a:ext>
+            </a:extLst>
+          </p:cNvPr>
+          <p:cNvSpPr>
+            <a:spLocks noGrp="1" noRot="1" noChangeAspect="1" noMove="1" noResize="1" noEditPoints="1" noAdjustHandles="1" noChangeArrowheads="1" noChangeShapeType="1" noTextEdit="1"/>
+          </p:cNvSpPr>
+          <p:nvPr>
+            <p:extLst>
+              <p:ext uri="{386F3935-93C4-4BCD-93E2-E3B085C9AB24}">
+                <p16:designElem xmlns:p16="http://schemas.microsoft.com/office/powerpoint/2015/main" val="1"/>
+              </p:ext>
+            </p:extLst>
+          </p:nvPr>
+        </p:nvSpPr>
+        <p:spPr>
+          <a:xfrm>
+            <a:off x="7828359" y="0"/>
+            <a:ext cx="514350" cy="1143000"/>
+          </a:xfrm>
+          <a:prstGeom prst="rect">
+            <a:avLst/>
+          </a:prstGeom>
+          <a:solidFill>
+            <a:schemeClr val="accent1"/>
+          </a:solidFill>
+          <a:ln>
+            <a:noFill/>
+          </a:ln>
+        </p:spPr>
+        <p:style>
+          <a:lnRef idx="1">
+            <a:schemeClr val="accent1"/>
+          </a:lnRef>
+          <a:fillRef idx="3">
+            <a:schemeClr val="accent1"/>
+          </a:fillRef>
+          <a:effectRef idx="2">
+            <a:schemeClr val="accent1"/>
+          </a:effectRef>
+          <a:fontRef idx="minor">
+            <a:schemeClr val="lt1"/>
+          </a:fontRef>
+        </p:style>
+        <p:txBody>
+          <a:bodyPr/>
+          <a:lstStyle/>
+          <a:p>
+            <a:endParaRPr lang="en-IN"/>
+          </a:p>
+        </p:txBody>
+      </p:sp>
+      <p:sp useBgFill="1">
+        <p:nvSpPr>
+          <p:cNvPr id="80" name="Rectangle 79">
+            <a:extLst>
+              <a:ext uri="{FF2B5EF4-FFF2-40B4-BE49-F238E27FC236}">
+                <a16:creationId xmlns:a16="http://schemas.microsoft.com/office/drawing/2014/main" id="{DDBA86CC-34C3-43C1-B328-62490FE69046}"/>
+              </a:ext>
+              <a:ext uri="{C183D7F6-B498-43B3-948B-1728B52AA6E4}">
+                <adec:decorative xmlns:adec="http://schemas.microsoft.com/office/drawing/2017/decorative" val="1"/>
+              </a:ext>
+            </a:extLst>
+          </p:cNvPr>
+          <p:cNvSpPr>
+            <a:spLocks noGrp="1" noRot="1" noChangeAspect="1" noMove="1" noResize="1" noEditPoints="1" noAdjustHandles="1" noChangeArrowheads="1" noChangeShapeType="1" noTextEdit="1"/>
+          </p:cNvSpPr>
+          <p:nvPr>
+            <p:extLst>
+              <p:ext uri="{386F3935-93C4-4BCD-93E2-E3B085C9AB24}">
+                <p16:designElem xmlns:p16="http://schemas.microsoft.com/office/powerpoint/2015/main" val="1"/>
+              </p:ext>
+            </p:extLst>
+          </p:nvPr>
+        </p:nvSpPr>
+        <p:spPr>
+          <a:xfrm>
+            <a:off x="0" y="0"/>
+            <a:ext cx="9144000" cy="6858000"/>
+          </a:xfrm>
+          <a:prstGeom prst="rect">
+            <a:avLst/>
+          </a:prstGeom>
+          <a:ln>
+            <a:noFill/>
+          </a:ln>
+        </p:spPr>
+        <p:style>
+          <a:lnRef idx="2">
+            <a:schemeClr val="accent1">
+              <a:shade val="50000"/>
+            </a:schemeClr>
+          </a:lnRef>
+          <a:fillRef idx="1003">
+            <a:schemeClr val="dk2"/>
+          </a:fillRef>
+          <a:effectRef idx="0">
+            <a:schemeClr val="accent1"/>
+          </a:effectRef>
+          <a:fontRef idx="minor">
+            <a:schemeClr val="lt1"/>
+          </a:fontRef>
+        </p:style>
+        <p:txBody>
+          <a:bodyPr rtlCol="0" anchor="ctr"/>
+          <a:lstStyle/>
+          <a:p>
+            <a:pPr algn="ctr"/>
+            <a:endParaRPr lang="en-US"/>
+          </a:p>
+        </p:txBody>
+      </p:sp>
+      <p:sp>
+        <p:nvSpPr>
+          <p:cNvPr id="2" name="Title 1">
+            <a:extLst>
+              <a:ext uri="{FF2B5EF4-FFF2-40B4-BE49-F238E27FC236}">
+                <a16:creationId xmlns:a16="http://schemas.microsoft.com/office/drawing/2014/main" id="{6DB394B9-4B4A-1347-068A-8026514372ED}"/>
+              </a:ext>
+            </a:extLst>
+          </p:cNvPr>
+          <p:cNvSpPr>
+            <a:spLocks noGrp="1"/>
+          </p:cNvSpPr>
+          <p:nvPr>
+            <p:ph type="ctrTitle"/>
+          </p:nvPr>
+        </p:nvSpPr>
+        <p:spPr>
+          <a:xfrm>
+            <a:off x="489857" y="1645920"/>
+            <a:ext cx="2642159" cy="4470821"/>
+          </a:xfrm>
+        </p:spPr>
+        <p:txBody>
+          <a:bodyPr vert="horz" lIns="91440" tIns="45720" rIns="91440" bIns="45720" rtlCol="0" anchor="t">
+            <a:normAutofit/>
+          </a:bodyPr>
+          <a:lstStyle/>
+          <a:p>
+            <a:pPr algn="r" defTabSz="457200">
+              <a:lnSpc>
+                <a:spcPct val="90000"/>
+              </a:lnSpc>
+            </a:pPr>
+            <a:r>
+              <a:rPr lang="en-US" sz="3600" b="0" i="0" kern="1200" dirty="0">
+                <a:solidFill>
+                  <a:schemeClr val="tx1"/>
+                </a:solidFill>
+                <a:latin typeface="+mj-lt"/>
+                <a:ea typeface="+mj-ea"/>
+                <a:cs typeface="+mj-cs"/>
+              </a:rPr>
+              <a:t>EXECUTIVE OVERVIEW</a:t>
+            </a:r>
+            <a:br>
+              <a:rPr lang="en-US" sz="3600" b="0" i="0" kern="1200" dirty="0">
+                <a:solidFill>
+                  <a:schemeClr val="tx1"/>
+                </a:solidFill>
+                <a:latin typeface="+mj-lt"/>
+                <a:ea typeface="+mj-ea"/>
+                <a:cs typeface="+mj-cs"/>
+              </a:rPr>
+            </a:br>
+            <a:r>
+              <a:rPr lang="en-US" sz="3600" b="0" i="0" kern="1200" dirty="0">
+                <a:solidFill>
+                  <a:schemeClr val="tx1"/>
+                </a:solidFill>
+                <a:latin typeface="+mj-lt"/>
+                <a:ea typeface="+mj-ea"/>
+                <a:cs typeface="+mj-cs"/>
+              </a:rPr>
+              <a:t>🎯 </a:t>
+            </a:r>
+            <a:r>
+              <a:rPr lang="en-US" sz="3600" dirty="0">
+                <a:solidFill>
+                  <a:schemeClr val="tx1"/>
+                </a:solidFill>
+              </a:rPr>
+              <a:t>Business Objective</a:t>
+            </a:r>
+            <a:br>
+              <a:rPr lang="en-US" sz="3600" dirty="0">
+                <a:solidFill>
+                  <a:schemeClr val="tx1"/>
+                </a:solidFill>
+              </a:rPr>
+            </a:br>
+            <a:endParaRPr lang="en-US" sz="3600" b="0" i="0" kern="1200" dirty="0">
+              <a:solidFill>
+                <a:schemeClr val="tx1"/>
+              </a:solidFill>
+              <a:latin typeface="+mj-lt"/>
+              <a:ea typeface="+mj-ea"/>
+              <a:cs typeface="+mj-cs"/>
+            </a:endParaRPr>
+          </a:p>
+        </p:txBody>
+      </p:sp>
+      <p:sp>
+        <p:nvSpPr>
+          <p:cNvPr id="82" name="Rectangle 81">
+            <a:extLst>
+              <a:ext uri="{FF2B5EF4-FFF2-40B4-BE49-F238E27FC236}">
+                <a16:creationId xmlns:a16="http://schemas.microsoft.com/office/drawing/2014/main" id="{9CF4C9D6-90BC-48A0-91E8-0F0373CA11B5}"/>
+              </a:ext>
+              <a:ext uri="{C183D7F6-B498-43B3-948B-1728B52AA6E4}">
+                <adec:decorative xmlns:adec="http://schemas.microsoft.com/office/drawing/2017/decorative" val="1"/>
+              </a:ext>
+            </a:extLst>
+          </p:cNvPr>
+          <p:cNvSpPr>
+            <a:spLocks noGrp="1" noRot="1" noChangeAspect="1" noMove="1" noResize="1" noEditPoints="1" noAdjustHandles="1" noChangeArrowheads="1" noChangeShapeType="1" noTextEdit="1"/>
+          </p:cNvSpPr>
+          <p:nvPr>
+            <p:extLst>
+              <p:ext uri="{386F3935-93C4-4BCD-93E2-E3B085C9AB24}">
+                <p16:designElem xmlns:p16="http://schemas.microsoft.com/office/powerpoint/2015/main" val="1"/>
+              </p:ext>
+            </p:extLst>
+          </p:nvPr>
+        </p:nvSpPr>
+        <p:spPr>
+          <a:xfrm>
+            <a:off x="7828359" y="0"/>
+            <a:ext cx="514350" cy="1143000"/>
+          </a:xfrm>
+          <a:prstGeom prst="rect">
+            <a:avLst/>
+          </a:prstGeom>
+          <a:solidFill>
+            <a:schemeClr val="accent1"/>
+          </a:solidFill>
+          <a:ln>
+            <a:noFill/>
+          </a:ln>
+        </p:spPr>
+        <p:style>
+          <a:lnRef idx="1">
+            <a:schemeClr val="accent1"/>
+          </a:lnRef>
+          <a:fillRef idx="3">
+            <a:schemeClr val="accent1"/>
+          </a:fillRef>
+          <a:effectRef idx="2">
+            <a:schemeClr val="accent1"/>
+          </a:effectRef>
+          <a:fontRef idx="minor">
+            <a:schemeClr val="lt1"/>
+          </a:fontRef>
+        </p:style>
+        <p:txBody>
+          <a:bodyPr/>
+          <a:lstStyle/>
+          <a:p>
+            <a:endParaRPr lang="en-IN"/>
+          </a:p>
+        </p:txBody>
+      </p:sp>
+      <p:sp>
+        <p:nvSpPr>
+          <p:cNvPr id="4" name="Rectangle 1">
+            <a:extLst>
+              <a:ext uri="{FF2B5EF4-FFF2-40B4-BE49-F238E27FC236}">
+                <a16:creationId xmlns:a16="http://schemas.microsoft.com/office/drawing/2014/main" id="{5A4626C8-5C6C-E874-0911-9BF3B4A72619}"/>
+              </a:ext>
+            </a:extLst>
+          </p:cNvPr>
+          <p:cNvSpPr>
+            <a:spLocks noGrp="1" noChangeArrowheads="1"/>
+          </p:cNvSpPr>
+          <p:nvPr>
+            <p:ph type="subTitle" idx="1"/>
+          </p:nvPr>
+        </p:nvSpPr>
+        <p:spPr bwMode="auto">
+          <a:xfrm>
+            <a:off x="3621873" y="1645920"/>
+            <a:ext cx="4720836" cy="4470821"/>
+          </a:xfrm>
+          <a:prstGeom prst="rect">
+            <a:avLst/>
+          </a:prstGeom>
+          <a:extLst>
+            <a:ext uri="{909E8E84-426E-40DD-AFC4-6F175D3DCCD1}">
+              <a14:hiddenFill xmlns:a14="http://schemas.microsoft.com/office/drawing/2010/main">
+                <a:solidFill>
+                  <a:schemeClr val="accent1"/>
+                </a:solidFill>
+              </a14:hiddenFill>
+            </a:ext>
+            <a:ext uri="{91240B29-F687-4F45-9708-019B960494DF}">
+              <a14:hiddenLine xmlns:a14="http://schemas.microsoft.com/office/drawing/2010/main" w="9525">
+                <a:solidFill>
+                  <a:schemeClr val="tx1"/>
+                </a:solidFill>
+                <a:miter lim="800000"/>
+                <a:headEnd/>
+                <a:tailEnd/>
+              </a14:hiddenLine>
+            </a:ext>
+            <a:ext uri="{AF507438-7753-43E0-B8FC-AC1667EBCBE1}">
+              <a14:hiddenEffects xmlns:a14="http://schemas.microsoft.com/office/drawing/2010/main">
+                <a:effectLst>
+                  <a:outerShdw dist="35921" dir="2700000" algn="ctr" rotWithShape="0">
+                    <a:schemeClr val="bg2"/>
+                  </a:outerShdw>
+                </a:effectLst>
+              </a14:hiddenEffects>
+            </a:ext>
+          </a:extLst>
+        </p:spPr>
+        <p:txBody>
+          <a:bodyPr vert="horz" lIns="91440" tIns="45720" rIns="91440" bIns="45720" numCol="1" rtlCol="0" anchorCtr="0" compatLnSpc="1">
+            <a:prstTxWarp prst="textNoShape">
+              <a:avLst/>
+            </a:prstTxWarp>
+            <a:normAutofit/>
+          </a:bodyPr>
+          <a:lstStyle/>
+          <a:p>
+            <a:pPr defTabSz="457200">
+              <a:buFont typeface="Wingdings 3" charset="2"/>
+              <a:buChar char=""/>
+            </a:pPr>
+            <a:r>
+              <a:rPr lang="en-US" dirty="0">
+                <a:solidFill>
+                  <a:schemeClr val="tx1"/>
+                </a:solidFill>
+              </a:rPr>
+              <a:t>Understand how sales vary across regions, product categories, and time</a:t>
+            </a:r>
+          </a:p>
+          <a:p>
+            <a:pPr defTabSz="457200">
+              <a:buFont typeface="Wingdings 3" charset="2"/>
+              <a:buChar char=""/>
+            </a:pPr>
+            <a:endParaRPr lang="en-US" dirty="0">
+              <a:solidFill>
+                <a:schemeClr val="tx1"/>
+              </a:solidFill>
+            </a:endParaRPr>
+          </a:p>
+          <a:p>
+            <a:pPr defTabSz="457200">
+              <a:buFont typeface="Wingdings 3" charset="2"/>
+              <a:buChar char=""/>
+            </a:pPr>
+            <a:r>
+              <a:rPr lang="en-US" dirty="0">
+                <a:solidFill>
+                  <a:schemeClr val="tx1"/>
+                </a:solidFill>
+              </a:rPr>
+              <a:t>Identify key revenue drivers (discounts, holidays, store contribution)</a:t>
+            </a:r>
+          </a:p>
+          <a:p>
+            <a:pPr defTabSz="457200">
+              <a:buFont typeface="Wingdings 3" charset="2"/>
+              <a:buChar char=""/>
+            </a:pPr>
+            <a:endParaRPr lang="en-US" dirty="0">
+              <a:solidFill>
+                <a:schemeClr val="tx1"/>
+              </a:solidFill>
+            </a:endParaRPr>
+          </a:p>
+          <a:p>
+            <a:pPr defTabSz="457200">
+              <a:buFont typeface="Wingdings 3" charset="2"/>
+              <a:buChar char=""/>
+            </a:pPr>
+            <a:r>
+              <a:rPr lang="en-US" dirty="0">
+                <a:solidFill>
+                  <a:schemeClr val="tx1"/>
+                </a:solidFill>
+              </a:rPr>
+              <a:t>Forecast future sales for next month/next quarter</a:t>
+            </a:r>
+          </a:p>
+        </p:txBody>
+      </p:sp>
+    </p:spTree>
+    <p:extLst>
+      <p:ext uri="{BB962C8B-B14F-4D97-AF65-F5344CB8AC3E}">
+        <p14:creationId xmlns:p14="http://schemas.microsoft.com/office/powerpoint/2010/main" val="2125243213"/>
+      </p:ext>
+    </p:extLst>
+  </p:cSld>
+  <p:clrMapOvr>
+    <a:masterClrMapping/>
+  </p:clrMapOvr>
+</p:sld>
+</file>
+
+<file path=ppt/slides/slide20.xml><?xml version="1.0" encoding="utf-8"?>
+<p:sld xmlns:a="http://schemas.openxmlformats.org/drawingml/2006/main" xmlns:r="http://schemas.openxmlformats.org/officeDocument/2006/relationships" xmlns:p="http://schemas.openxmlformats.org/presentationml/2006/main">
+  <p:cSld>
+    <p:bg>
+      <p:bgPr>
+        <a:solidFill>
+          <a:schemeClr val="bg1"/>
+        </a:solidFill>
+        <a:effectLst/>
+      </p:bgPr>
+    </p:bg>
+    <p:spTree>
+      <p:nvGrpSpPr>
+        <p:cNvPr id="1" name=""/>
+        <p:cNvGrpSpPr/>
+        <p:nvPr/>
+      </p:nvGrpSpPr>
+      <p:grpSpPr>
+        <a:xfrm>
+          <a:off x="0" y="0"/>
+          <a:ext cx="0" cy="0"/>
+          <a:chOff x="0" y="0"/>
+          <a:chExt cx="0" cy="0"/>
+        </a:xfrm>
+      </p:grpSpPr>
+      <p:pic>
+        <p:nvPicPr>
+          <p:cNvPr id="9" name="Picture 8">
+            <a:extLst>
+              <a:ext uri="{FF2B5EF4-FFF2-40B4-BE49-F238E27FC236}">
+                <a16:creationId xmlns:a16="http://schemas.microsoft.com/office/drawing/2014/main" id="{F1B8F9CB-890B-4CB8-B503-188A763E2FC1}"/>
+              </a:ext>
+              <a:ext uri="{C183D7F6-B498-43B3-948B-1728B52AA6E4}">
+                <adec:decorative xmlns:adec="http://schemas.microsoft.com/office/drawing/2017/decorative" val="1"/>
+              </a:ext>
+            </a:extLst>
+          </p:cNvPr>
+          <p:cNvPicPr>
+            <a:picLocks noGrp="1" noRot="1" noChangeAspect="1" noMove="1" noResize="1" noEditPoints="1" noAdjustHandles="1" noChangeArrowheads="1" noChangeShapeType="1" noCrop="1"/>
+          </p:cNvPicPr>
+          <p:nvPr>
+            <p:extLst>
+              <p:ext uri="{386F3935-93C4-4BCD-93E2-E3B085C9AB24}">
+                <p16:designElem xmlns:p16="http://schemas.microsoft.com/office/powerpoint/2015/main" val="1"/>
+              </p:ext>
+            </p:extLst>
+          </p:nvPr>
+        </p:nvPicPr>
+        <p:blipFill rotWithShape="1">
+          <a:blip r:embed="rId2">
+            <a:extLst>
+              <a:ext uri="{28A0092B-C50C-407E-A947-70E740481C1C}">
+                <a14:useLocalDpi xmlns:a14="http://schemas.microsoft.com/office/drawing/2010/main" val="0"/>
+              </a:ext>
+            </a:extLst>
+          </a:blip>
+          <a:srcRect l="3613"/>
+          <a:stretch/>
+        </p:blipFill>
+        <p:spPr>
+          <a:xfrm>
+            <a:off x="0" y="2669685"/>
+            <a:ext cx="3027759" cy="4188315"/>
+          </a:xfrm>
+          <a:prstGeom prst="rect">
+            <a:avLst/>
+          </a:prstGeom>
+        </p:spPr>
+      </p:pic>
+      <p:pic>
+        <p:nvPicPr>
+          <p:cNvPr id="11" name="Picture 10">
+            <a:extLst>
+              <a:ext uri="{FF2B5EF4-FFF2-40B4-BE49-F238E27FC236}">
+                <a16:creationId xmlns:a16="http://schemas.microsoft.com/office/drawing/2014/main" id="{AA632AB4-3837-4FD0-8B62-0A18B573F46D}"/>
+              </a:ext>
+              <a:ext uri="{C183D7F6-B498-43B3-948B-1728B52AA6E4}">
+                <adec:decorative xmlns:adec="http://schemas.microsoft.com/office/drawing/2017/decorative" val="1"/>
+              </a:ext>
+            </a:extLst>
+          </p:cNvPr>
+          <p:cNvPicPr>
+            <a:picLocks noGrp="1" noRot="1" noChangeAspect="1" noMove="1" noResize="1" noEditPoints="1" noAdjustHandles="1" noChangeArrowheads="1" noChangeShapeType="1" noCrop="1"/>
+          </p:cNvPicPr>
+          <p:nvPr>
+            <p:extLst>
+              <p:ext uri="{386F3935-93C4-4BCD-93E2-E3B085C9AB24}">
+                <p16:designElem xmlns:p16="http://schemas.microsoft.com/office/powerpoint/2015/main" val="1"/>
+              </p:ext>
+            </p:extLst>
+          </p:nvPr>
+        </p:nvPicPr>
+        <p:blipFill rotWithShape="1">
+          <a:blip r:embed="rId3">
+            <a:extLst>
+              <a:ext uri="{28A0092B-C50C-407E-A947-70E740481C1C}">
+                <a14:useLocalDpi xmlns:a14="http://schemas.microsoft.com/office/drawing/2010/main" val="0"/>
+              </a:ext>
+            </a:extLst>
+          </a:blip>
+          <a:srcRect l="35640"/>
+          <a:stretch/>
+        </p:blipFill>
+        <p:spPr>
+          <a:xfrm>
+            <a:off x="0" y="2892347"/>
+            <a:ext cx="1141809" cy="2365453"/>
+          </a:xfrm>
+          <a:prstGeom prst="rect">
+            <a:avLst/>
+          </a:prstGeom>
+        </p:spPr>
+      </p:pic>
+      <p:sp>
+        <p:nvSpPr>
+          <p:cNvPr id="13" name="Oval 12">
+            <a:extLst>
+              <a:ext uri="{FF2B5EF4-FFF2-40B4-BE49-F238E27FC236}">
+                <a16:creationId xmlns:a16="http://schemas.microsoft.com/office/drawing/2014/main" id="{C393B4A7-6ABF-423D-A762-3CDB4897A833}"/>
+              </a:ext>
+              <a:ext uri="{C183D7F6-B498-43B3-948B-1728B52AA6E4}">
+                <adec:decorative xmlns:adec="http://schemas.microsoft.com/office/drawing/2017/decorative" val="1"/>
+              </a:ext>
+            </a:extLst>
+          </p:cNvPr>
+          <p:cNvSpPr>
+            <a:spLocks noGrp="1" noRot="1" noChangeAspect="1" noMove="1" noResize="1" noEditPoints="1" noAdjustHandles="1" noChangeArrowheads="1" noChangeShapeType="1" noTextEdit="1"/>
+          </p:cNvSpPr>
+          <p:nvPr>
+            <p:extLst>
+              <p:ext uri="{386F3935-93C4-4BCD-93E2-E3B085C9AB24}">
+                <p16:designElem xmlns:p16="http://schemas.microsoft.com/office/powerpoint/2015/main" val="1"/>
+              </p:ext>
+            </p:extLst>
+          </p:nvPr>
+        </p:nvSpPr>
+        <p:spPr>
+          <a:xfrm>
+            <a:off x="6456759" y="1676400"/>
+            <a:ext cx="2114550" cy="2819400"/>
+          </a:xfrm>
+          <a:prstGeom prst="ellipse">
+            <a:avLst/>
+          </a:prstGeom>
+          <a:gradFill flip="none" rotWithShape="1">
+            <a:gsLst>
+              <a:gs pos="0">
+                <a:schemeClr val="bg2">
+                  <a:lumMod val="60000"/>
+                  <a:lumOff val="40000"/>
+                  <a:alpha val="7000"/>
+                </a:schemeClr>
+              </a:gs>
+              <a:gs pos="69000">
+                <a:schemeClr val="bg2">
+                  <a:lumMod val="60000"/>
+                  <a:lumOff val="40000"/>
+                  <a:alpha val="0"/>
+                </a:schemeClr>
+              </a:gs>
+              <a:gs pos="36000">
+                <a:schemeClr val="bg2">
+                  <a:lumMod val="60000"/>
+                  <a:lumOff val="40000"/>
+                  <a:alpha val="6000"/>
+                </a:schemeClr>
+              </a:gs>
+            </a:gsLst>
+            <a:path path="circle">
+              <a:fillToRect l="50000" t="50000" r="50000" b="50000"/>
+            </a:path>
+            <a:tileRect/>
+          </a:gradFill>
+          <a:ln>
+            <a:noFill/>
+          </a:ln>
+          <a:effectLst/>
+        </p:spPr>
+        <p:style>
+          <a:lnRef idx="1">
+            <a:schemeClr val="accent1"/>
+          </a:lnRef>
+          <a:fillRef idx="3">
+            <a:schemeClr val="accent1"/>
+          </a:fillRef>
+          <a:effectRef idx="2">
+            <a:schemeClr val="accent1"/>
+          </a:effectRef>
+          <a:fontRef idx="minor">
+            <a:schemeClr val="lt1"/>
+          </a:fontRef>
+        </p:style>
+        <p:txBody>
+          <a:bodyPr/>
+          <a:lstStyle/>
+          <a:p>
+            <a:endParaRPr lang="en-IN"/>
+          </a:p>
+        </p:txBody>
+      </p:sp>
+      <p:pic>
+        <p:nvPicPr>
+          <p:cNvPr id="15" name="Picture 14">
+            <a:extLst>
+              <a:ext uri="{FF2B5EF4-FFF2-40B4-BE49-F238E27FC236}">
+                <a16:creationId xmlns:a16="http://schemas.microsoft.com/office/drawing/2014/main" id="{9CD2319A-6FA9-4EFB-9EDF-7304467425E8}"/>
+              </a:ext>
+              <a:ext uri="{C183D7F6-B498-43B3-948B-1728B52AA6E4}">
+                <adec:decorative xmlns:adec="http://schemas.microsoft.com/office/drawing/2017/decorative" val="1"/>
+              </a:ext>
+            </a:extLst>
+          </p:cNvPr>
+          <p:cNvPicPr>
+            <a:picLocks noGrp="1" noRot="1" noChangeAspect="1" noMove="1" noResize="1" noEditPoints="1" noAdjustHandles="1" noChangeArrowheads="1" noChangeShapeType="1" noCrop="1"/>
+          </p:cNvPicPr>
+          <p:nvPr>
+            <p:extLst>
+              <p:ext uri="{386F3935-93C4-4BCD-93E2-E3B085C9AB24}">
+                <p16:designElem xmlns:p16="http://schemas.microsoft.com/office/powerpoint/2015/main" val="1"/>
+              </p:ext>
+            </p:extLst>
+          </p:nvPr>
+        </p:nvPicPr>
+        <p:blipFill rotWithShape="1">
+          <a:blip r:embed="rId4">
+            <a:extLst>
+              <a:ext uri="{28A0092B-C50C-407E-A947-70E740481C1C}">
+                <a14:useLocalDpi xmlns:a14="http://schemas.microsoft.com/office/drawing/2010/main" val="0"/>
+              </a:ext>
+            </a:extLst>
+          </a:blip>
+          <a:srcRect t="28813"/>
+          <a:stretch/>
+        </p:blipFill>
+        <p:spPr>
+          <a:xfrm>
+            <a:off x="5999559" y="0"/>
+            <a:ext cx="1202540" cy="1141407"/>
+          </a:xfrm>
+          <a:prstGeom prst="rect">
+            <a:avLst/>
+          </a:prstGeom>
+        </p:spPr>
+      </p:pic>
+      <p:pic>
+        <p:nvPicPr>
+          <p:cNvPr id="17" name="Picture 16">
+            <a:extLst>
+              <a:ext uri="{FF2B5EF4-FFF2-40B4-BE49-F238E27FC236}">
+                <a16:creationId xmlns:a16="http://schemas.microsoft.com/office/drawing/2014/main" id="{D1692A93-3514-4486-8B67-CCA4E0259BCB}"/>
+              </a:ext>
+              <a:ext uri="{C183D7F6-B498-43B3-948B-1728B52AA6E4}">
+                <adec:decorative xmlns:adec="http://schemas.microsoft.com/office/drawing/2017/decorative" val="1"/>
+              </a:ext>
+            </a:extLst>
+          </p:cNvPr>
+          <p:cNvPicPr>
+            <a:picLocks noGrp="1" noRot="1" noChangeAspect="1" noMove="1" noResize="1" noEditPoints="1" noAdjustHandles="1" noChangeArrowheads="1" noChangeShapeType="1" noCrop="1"/>
+          </p:cNvPicPr>
+          <p:nvPr>
+            <p:extLst>
+              <p:ext uri="{386F3935-93C4-4BCD-93E2-E3B085C9AB24}">
+                <p16:designElem xmlns:p16="http://schemas.microsoft.com/office/powerpoint/2015/main" val="1"/>
+              </p:ext>
+            </p:extLst>
+          </p:nvPr>
+        </p:nvPicPr>
+        <p:blipFill rotWithShape="1">
+          <a:blip r:embed="rId5">
+            <a:extLst>
+              <a:ext uri="{28A0092B-C50C-407E-A947-70E740481C1C}">
+                <a14:useLocalDpi xmlns:a14="http://schemas.microsoft.com/office/drawing/2010/main" val="0"/>
+              </a:ext>
+            </a:extLst>
+          </a:blip>
+          <a:srcRect b="23320"/>
+          <a:stretch/>
+        </p:blipFill>
+        <p:spPr>
+          <a:xfrm>
+            <a:off x="6454408" y="6096000"/>
+            <a:ext cx="745301" cy="762000"/>
+          </a:xfrm>
+          <a:prstGeom prst="rect">
+            <a:avLst/>
+          </a:prstGeom>
+        </p:spPr>
+      </p:pic>
+      <p:sp>
+        <p:nvSpPr>
+          <p:cNvPr id="19" name="Rectangle 18">
+            <a:extLst>
+              <a:ext uri="{FF2B5EF4-FFF2-40B4-BE49-F238E27FC236}">
+                <a16:creationId xmlns:a16="http://schemas.microsoft.com/office/drawing/2014/main" id="{01AD250C-F2EA-449F-9B14-DF5BB674C500}"/>
+              </a:ext>
+              <a:ext uri="{C183D7F6-B498-43B3-948B-1728B52AA6E4}">
+                <adec:decorative xmlns:adec="http://schemas.microsoft.com/office/drawing/2017/decorative" val="1"/>
+              </a:ext>
+            </a:extLst>
+          </p:cNvPr>
+          <p:cNvSpPr>
+            <a:spLocks noGrp="1" noRot="1" noChangeAspect="1" noMove="1" noResize="1" noEditPoints="1" noAdjustHandles="1" noChangeArrowheads="1" noChangeShapeType="1" noTextEdit="1"/>
+          </p:cNvSpPr>
+          <p:nvPr>
+            <p:extLst>
+              <p:ext uri="{386F3935-93C4-4BCD-93E2-E3B085C9AB24}">
+                <p16:designElem xmlns:p16="http://schemas.microsoft.com/office/powerpoint/2015/main" val="1"/>
+              </p:ext>
+            </p:extLst>
+          </p:nvPr>
+        </p:nvSpPr>
+        <p:spPr>
+          <a:xfrm>
+            <a:off x="7828359" y="0"/>
+            <a:ext cx="514350" cy="1143000"/>
+          </a:xfrm>
+          <a:prstGeom prst="rect">
+            <a:avLst/>
+          </a:prstGeom>
+          <a:solidFill>
+            <a:schemeClr val="accent1"/>
+          </a:solidFill>
+          <a:ln>
+            <a:noFill/>
+          </a:ln>
+        </p:spPr>
+        <p:style>
+          <a:lnRef idx="1">
+            <a:schemeClr val="accent1"/>
+          </a:lnRef>
+          <a:fillRef idx="3">
+            <a:schemeClr val="accent1"/>
+          </a:fillRef>
+          <a:effectRef idx="2">
+            <a:schemeClr val="accent1"/>
+          </a:effectRef>
+          <a:fontRef idx="minor">
+            <a:schemeClr val="lt1"/>
+          </a:fontRef>
+        </p:style>
+        <p:txBody>
+          <a:bodyPr/>
+          <a:lstStyle/>
+          <a:p>
+            <a:endParaRPr lang="en-IN"/>
+          </a:p>
+        </p:txBody>
+      </p:sp>
+      <p:sp>
+        <p:nvSpPr>
+          <p:cNvPr id="21" name="Rectangle 20">
+            <a:extLst>
+              <a:ext uri="{FF2B5EF4-FFF2-40B4-BE49-F238E27FC236}">
                 <a16:creationId xmlns:a16="http://schemas.microsoft.com/office/drawing/2014/main" id="{4E78424C-6FD0-41F8-9CAA-5DC19C42359F}"/>
               </a:ext>
               <a:ext uri="{C183D7F6-B498-43B3-948B-1728B52AA6E4}">
@@ -20064,7 +22133,7 @@
           <a:p>
             <a:pPr defTabSz="457200"/>
             <a:r>
-              <a:rPr lang="en-US" sz="2400">
+              <a:rPr lang="en-US" sz="2400" dirty="0">
                 <a:solidFill>
                   <a:srgbClr val="F2F2F2"/>
                 </a:solidFill>
@@ -20072,13 +22141,13 @@
               <a:t>Skills Demonstrated</a:t>
             </a:r>
             <a:br>
-              <a:rPr lang="en-US" sz="2400">
+              <a:rPr lang="en-US" sz="2400" dirty="0">
                 <a:solidFill>
                   <a:srgbClr val="F2F2F2"/>
                 </a:solidFill>
               </a:rPr>
             </a:br>
-            <a:endParaRPr lang="en-US" sz="2400">
+            <a:endParaRPr lang="en-US" sz="2400" dirty="0">
               <a:solidFill>
                 <a:srgbClr val="F2F2F2"/>
               </a:solidFill>
@@ -21031,7 +23100,7 @@
 </p:sld>
 </file>
 
-<file path=ppt/slides/slide2.xml><?xml version="1.0" encoding="utf-8"?>
+<file path=ppt/slides/slide21.xml><?xml version="1.0" encoding="utf-8"?>
 <p:sld xmlns:a="http://schemas.openxmlformats.org/drawingml/2006/main" xmlns:r="http://schemas.openxmlformats.org/officeDocument/2006/relationships" xmlns:p="http://schemas.openxmlformats.org/presentationml/2006/main">
   <p:cSld>
     <p:bg>
@@ -21074,7 +23143,7 @@
       </p:grpSpPr>
       <p:pic>
         <p:nvPicPr>
-          <p:cNvPr id="68" name="Picture 67">
+          <p:cNvPr id="76" name="Picture 75">
             <a:extLst>
               <a:ext uri="{FF2B5EF4-FFF2-40B4-BE49-F238E27FC236}">
                 <a16:creationId xmlns:a16="http://schemas.microsoft.com/office/drawing/2014/main" id="{91B28F63-CF00-448F-B141-FE33C33B1891}"/>
@@ -21118,7 +23187,7 @@
       </p:pic>
       <p:pic>
         <p:nvPicPr>
-          <p:cNvPr id="70" name="Picture 69">
+          <p:cNvPr id="77" name="Picture 76">
             <a:extLst>
               <a:ext uri="{FF2B5EF4-FFF2-40B4-BE49-F238E27FC236}">
                 <a16:creationId xmlns:a16="http://schemas.microsoft.com/office/drawing/2014/main" id="{2AE609E2-8522-44E4-9077-980E5BCF3E14}"/>
@@ -21162,7 +23231,7 @@
       </p:pic>
       <p:sp>
         <p:nvSpPr>
-          <p:cNvPr id="72" name="Oval 71">
+          <p:cNvPr id="78" name="Oval 77">
             <a:extLst>
               <a:ext uri="{FF2B5EF4-FFF2-40B4-BE49-F238E27FC236}">
                 <a16:creationId xmlns:a16="http://schemas.microsoft.com/office/drawing/2014/main" id="{4FA533C5-33E3-4611-AF9F-72811D8B26A6}"/>
@@ -21249,7 +23318,7 @@
       </p:sp>
       <p:pic>
         <p:nvPicPr>
-          <p:cNvPr id="74" name="Picture 73">
+          <p:cNvPr id="79" name="Picture 78">
             <a:extLst>
               <a:ext uri="{FF2B5EF4-FFF2-40B4-BE49-F238E27FC236}">
                 <a16:creationId xmlns:a16="http://schemas.microsoft.com/office/drawing/2014/main" id="{8949AD42-25FD-4C3D-9EEE-B7FEC5809988}"/>
@@ -21293,7 +23362,7 @@
       </p:pic>
       <p:pic>
         <p:nvPicPr>
-          <p:cNvPr id="76" name="Picture 75">
+          <p:cNvPr id="80" name="Picture 79">
             <a:extLst>
               <a:ext uri="{FF2B5EF4-FFF2-40B4-BE49-F238E27FC236}">
                 <a16:creationId xmlns:a16="http://schemas.microsoft.com/office/drawing/2014/main" id="{6AC7D913-60B7-4603-881B-831DA5D3A940}"/>
@@ -21337,7 +23406,7 @@
       </p:pic>
       <p:sp>
         <p:nvSpPr>
-          <p:cNvPr id="78" name="Rectangle 77">
+          <p:cNvPr id="81" name="Rectangle 80">
             <a:extLst>
               <a:ext uri="{FF2B5EF4-FFF2-40B4-BE49-F238E27FC236}">
                 <a16:creationId xmlns:a16="http://schemas.microsoft.com/office/drawing/2014/main" id="{87F0FDC4-AD8C-47D9-9131-623C98ADB0AE}"/>
@@ -21397,10 +23466,10 @@
       </p:sp>
       <p:sp useBgFill="1">
         <p:nvSpPr>
-          <p:cNvPr id="80" name="Rectangle 79">
+          <p:cNvPr id="82" name="Rectangle 81">
             <a:extLst>
               <a:ext uri="{FF2B5EF4-FFF2-40B4-BE49-F238E27FC236}">
-                <a16:creationId xmlns:a16="http://schemas.microsoft.com/office/drawing/2014/main" id="{DDBA86CC-34C3-43C1-B328-62490FE69046}"/>
+                <a16:creationId xmlns:a16="http://schemas.microsoft.com/office/drawing/2014/main" id="{E6A222EB-A81E-4238-B08D-AAB1828C8E0B}"/>
               </a:ext>
               <a:ext uri="{C183D7F6-B498-43B3-948B-1728B52AA6E4}">
                 <adec:decorative xmlns:adec="http://schemas.microsoft.com/office/drawing/2017/decorative" val="1"/>
@@ -21436,8 +23505,8 @@
               <a:shade val="50000"/>
             </a:schemeClr>
           </a:lnRef>
-          <a:fillRef idx="1003">
-            <a:schemeClr val="dk2"/>
+          <a:fillRef idx="1">
+            <a:schemeClr val="accent1"/>
           </a:fillRef>
           <a:effectRef idx="0">
             <a:schemeClr val="accent1"/>
@@ -21457,101 +23526,10 @@
       </p:sp>
       <p:sp>
         <p:nvSpPr>
-          <p:cNvPr id="2" name="Title 1">
+          <p:cNvPr id="83" name="Rectangle 82">
             <a:extLst>
               <a:ext uri="{FF2B5EF4-FFF2-40B4-BE49-F238E27FC236}">
-                <a16:creationId xmlns:a16="http://schemas.microsoft.com/office/drawing/2014/main" id="{6DB394B9-4B4A-1347-068A-8026514372ED}"/>
-              </a:ext>
-            </a:extLst>
-          </p:cNvPr>
-          <p:cNvSpPr>
-            <a:spLocks noGrp="1"/>
-          </p:cNvSpPr>
-          <p:nvPr>
-            <p:ph type="ctrTitle"/>
-          </p:nvPr>
-        </p:nvSpPr>
-        <p:spPr>
-          <a:xfrm>
-            <a:off x="489857" y="1645920"/>
-            <a:ext cx="2642159" cy="4470821"/>
-          </a:xfrm>
-        </p:spPr>
-        <p:txBody>
-          <a:bodyPr vert="horz" lIns="91440" tIns="45720" rIns="91440" bIns="45720" rtlCol="0" anchor="t">
-            <a:normAutofit/>
-          </a:bodyPr>
-          <a:lstStyle/>
-          <a:p>
-            <a:pPr algn="r" defTabSz="457200">
-              <a:lnSpc>
-                <a:spcPct val="90000"/>
-              </a:lnSpc>
-            </a:pPr>
-            <a:r>
-              <a:rPr lang="en-US" sz="3600" b="0" i="0" kern="1200" dirty="0">
-                <a:solidFill>
-                  <a:schemeClr val="tx1"/>
-                </a:solidFill>
-                <a:latin typeface="+mj-lt"/>
-                <a:ea typeface="+mj-ea"/>
-                <a:cs typeface="+mj-cs"/>
-              </a:rPr>
-              <a:t>EXECUTIVE OVERVIEW</a:t>
-            </a:r>
-            <a:br>
-              <a:rPr lang="en-US" sz="3600" b="0" i="0" kern="1200" dirty="0">
-                <a:solidFill>
-                  <a:schemeClr val="tx1"/>
-                </a:solidFill>
-                <a:latin typeface="+mj-lt"/>
-                <a:ea typeface="+mj-ea"/>
-                <a:cs typeface="+mj-cs"/>
-              </a:rPr>
-            </a:br>
-            <a:r>
-              <a:rPr lang="en-US" sz="3600" b="0" i="0" kern="1200" dirty="0">
-                <a:solidFill>
-                  <a:schemeClr val="tx1"/>
-                </a:solidFill>
-                <a:latin typeface="+mj-lt"/>
-                <a:ea typeface="+mj-ea"/>
-                <a:cs typeface="+mj-cs"/>
-              </a:rPr>
-              <a:t>🎯 </a:t>
-            </a:r>
-            <a:r>
-              <a:rPr lang="en-US" sz="3600" dirty="0">
-                <a:solidFill>
-                  <a:schemeClr val="tx1"/>
-                </a:solidFill>
-              </a:rPr>
-              <a:t>Business Objective</a:t>
-            </a:r>
-            <a:br>
-              <a:rPr lang="en-US" sz="3600" dirty="0">
-                <a:solidFill>
-                  <a:schemeClr val="tx1"/>
-                </a:solidFill>
-              </a:rPr>
-            </a:br>
-            <a:endParaRPr lang="en-US" sz="3600" b="0" i="0" kern="1200" dirty="0">
-              <a:solidFill>
-                <a:schemeClr val="tx1"/>
-              </a:solidFill>
-              <a:latin typeface="+mj-lt"/>
-              <a:ea typeface="+mj-ea"/>
-              <a:cs typeface="+mj-cs"/>
-            </a:endParaRPr>
-          </a:p>
-        </p:txBody>
-      </p:sp>
-      <p:sp>
-        <p:nvSpPr>
-          <p:cNvPr id="82" name="Rectangle 81">
-            <a:extLst>
-              <a:ext uri="{FF2B5EF4-FFF2-40B4-BE49-F238E27FC236}">
-                <a16:creationId xmlns:a16="http://schemas.microsoft.com/office/drawing/2014/main" id="{9CF4C9D6-90BC-48A0-91E8-0F0373CA11B5}"/>
+                <a16:creationId xmlns:a16="http://schemas.microsoft.com/office/drawing/2014/main" id="{E014676C-074B-475A-8346-9C901C86CB97}"/>
               </a:ext>
               <a:ext uri="{C183D7F6-B498-43B3-948B-1728B52AA6E4}">
                 <adec:decorative xmlns:adec="http://schemas.microsoft.com/office/drawing/2017/decorative" val="1"/>
@@ -21606,129 +23584,100 @@
           </a:p>
         </p:txBody>
       </p:sp>
+      <p:cxnSp>
+        <p:nvCxnSpPr>
+          <p:cNvPr id="84" name="Straight Connector 83">
+            <a:extLst>
+              <a:ext uri="{FF2B5EF4-FFF2-40B4-BE49-F238E27FC236}">
+                <a16:creationId xmlns:a16="http://schemas.microsoft.com/office/drawing/2014/main" id="{179C4C8E-197B-4679-AE96-B5147F971C90}"/>
+              </a:ext>
+              <a:ext uri="{C183D7F6-B498-43B3-948B-1728B52AA6E4}">
+                <adec:decorative xmlns:adec="http://schemas.microsoft.com/office/drawing/2017/decorative" val="1"/>
+              </a:ext>
+            </a:extLst>
+          </p:cNvPr>
+          <p:cNvCxnSpPr>
+            <a:cxnSpLocks noGrp="1" noRot="1" noChangeAspect="1" noMove="1" noResize="1" noEditPoints="1" noAdjustHandles="1" noChangeArrowheads="1" noChangeShapeType="1"/>
+          </p:cNvCxnSpPr>
+          <p:nvPr>
+            <p:extLst>
+              <p:ext uri="{386F3935-93C4-4BCD-93E2-E3B085C9AB24}">
+                <p16:designElem xmlns:p16="http://schemas.microsoft.com/office/powerpoint/2015/main" val="1"/>
+              </p:ext>
+            </p:extLst>
+          </p:nvPr>
+        </p:nvCxnSpPr>
+        <p:spPr>
+          <a:xfrm>
+            <a:off x="3267515" y="1930986"/>
+            <a:ext cx="0" cy="3200400"/>
+          </a:xfrm>
+          <a:prstGeom prst="line">
+            <a:avLst/>
+          </a:prstGeom>
+          <a:ln w="15875" cap="sq">
+            <a:solidFill>
+              <a:schemeClr val="tx2">
+                <a:alpha val="70000"/>
+              </a:schemeClr>
+            </a:solidFill>
+            <a:miter lim="800000"/>
+          </a:ln>
+        </p:spPr>
+        <p:style>
+          <a:lnRef idx="1">
+            <a:schemeClr val="accent1"/>
+          </a:lnRef>
+          <a:fillRef idx="0">
+            <a:schemeClr val="accent1"/>
+          </a:fillRef>
+          <a:effectRef idx="0">
+            <a:schemeClr val="accent1"/>
+          </a:effectRef>
+          <a:fontRef idx="minor">
+            <a:schemeClr val="tx1"/>
+          </a:fontRef>
+        </p:style>
+      </p:cxnSp>
       <p:sp>
         <p:nvSpPr>
-          <p:cNvPr id="4" name="Rectangle 1">
+          <p:cNvPr id="2" name="Title 1">
             <a:extLst>
               <a:ext uri="{FF2B5EF4-FFF2-40B4-BE49-F238E27FC236}">
-                <a16:creationId xmlns:a16="http://schemas.microsoft.com/office/drawing/2014/main" id="{5A4626C8-5C6C-E874-0911-9BF3B4A72619}"/>
+                <a16:creationId xmlns:a16="http://schemas.microsoft.com/office/drawing/2014/main" id="{E0F89DC9-D509-3855-1AEB-257A5B974932}"/>
               </a:ext>
             </a:extLst>
           </p:cNvPr>
           <p:cNvSpPr>
-            <a:spLocks noGrp="1" noChangeArrowheads="1"/>
+            <a:spLocks noGrp="1"/>
           </p:cNvSpPr>
           <p:nvPr>
-            <p:ph type="subTitle" idx="1"/>
+            <p:ph type="title"/>
           </p:nvPr>
         </p:nvSpPr>
-        <p:spPr bwMode="auto">
+        <p:spPr>
           <a:xfrm>
-            <a:off x="3621873" y="1645920"/>
-            <a:ext cx="4720836" cy="4470821"/>
+            <a:off x="3490721" y="1266958"/>
+            <a:ext cx="5106271" cy="4528457"/>
           </a:xfrm>
-          <a:prstGeom prst="rect">
-            <a:avLst/>
-          </a:prstGeom>
-          <a:extLst>
-            <a:ext uri="{909E8E84-426E-40DD-AFC4-6F175D3DCCD1}">
-              <a14:hiddenFill xmlns:a14="http://schemas.microsoft.com/office/drawing/2010/main">
-                <a:solidFill>
-                  <a:schemeClr val="accent1"/>
-                </a:solidFill>
-              </a14:hiddenFill>
-            </a:ext>
-            <a:ext uri="{91240B29-F687-4F45-9708-019B960494DF}">
-              <a14:hiddenLine xmlns:a14="http://schemas.microsoft.com/office/drawing/2010/main" w="9525">
-                <a:solidFill>
-                  <a:schemeClr val="tx1"/>
-                </a:solidFill>
-                <a:miter lim="800000"/>
-                <a:headEnd/>
-                <a:tailEnd/>
-              </a14:hiddenLine>
-            </a:ext>
-            <a:ext uri="{AF507438-7753-43E0-B8FC-AC1667EBCBE1}">
-              <a14:hiddenEffects xmlns:a14="http://schemas.microsoft.com/office/drawing/2010/main">
-                <a:effectLst>
-                  <a:outerShdw dist="35921" dir="2700000" algn="ctr" rotWithShape="0">
-                    <a:schemeClr val="bg2"/>
-                  </a:outerShdw>
-                </a:effectLst>
-              </a14:hiddenEffects>
-            </a:ext>
-          </a:extLst>
         </p:spPr>
         <p:txBody>
-          <a:bodyPr vert="horz" lIns="91440" tIns="45720" rIns="91440" bIns="45720" numCol="1" rtlCol="0" anchorCtr="0" compatLnSpc="1">
-            <a:prstTxWarp prst="textNoShape">
-              <a:avLst/>
-            </a:prstTxWarp>
+          <a:bodyPr vert="horz" lIns="91440" tIns="45720" rIns="91440" bIns="45720" rtlCol="0" anchor="ctr">
             <a:normAutofit/>
           </a:bodyPr>
           <a:lstStyle/>
           <a:p>
-            <a:pPr defTabSz="457200">
-              <a:buFont typeface="Wingdings 3" charset="2"/>
-              <a:buChar char=""/>
-            </a:pPr>
+            <a:pPr defTabSz="457200"/>
             <a:r>
-              <a:rPr lang="en-US" dirty="0">
+              <a:rPr lang="en-US" sz="7200" b="0" i="0" kern="1200" dirty="0">
                 <a:solidFill>
-                  <a:schemeClr val="tx1"/>
+                  <a:schemeClr val="tx2"/>
                 </a:solidFill>
+                <a:latin typeface="+mj-lt"/>
+                <a:ea typeface="+mj-ea"/>
+                <a:cs typeface="+mj-cs"/>
               </a:rPr>
-              <a:t>Understand how sales vary across regions, product categories, and time</a:t>
-            </a:r>
-          </a:p>
-          <a:p>
-            <a:pPr defTabSz="457200">
-              <a:buFont typeface="Wingdings 3" charset="2"/>
-              <a:buChar char=""/>
-            </a:pPr>
-            <a:endParaRPr lang="en-US" dirty="0">
-              <a:solidFill>
-                <a:schemeClr val="tx1"/>
-              </a:solidFill>
-            </a:endParaRPr>
-          </a:p>
-          <a:p>
-            <a:pPr defTabSz="457200">
-              <a:buFont typeface="Wingdings 3" charset="2"/>
-              <a:buChar char=""/>
-            </a:pPr>
-            <a:r>
-              <a:rPr lang="en-US" dirty="0">
-                <a:solidFill>
-                  <a:schemeClr val="tx1"/>
-                </a:solidFill>
-              </a:rPr>
-              <a:t>Identify key revenue drivers (discounts, holidays, store contribution)</a:t>
-            </a:r>
-          </a:p>
-          <a:p>
-            <a:pPr defTabSz="457200">
-              <a:buFont typeface="Wingdings 3" charset="2"/>
-              <a:buChar char=""/>
-            </a:pPr>
-            <a:endParaRPr lang="en-US" dirty="0">
-              <a:solidFill>
-                <a:schemeClr val="tx1"/>
-              </a:solidFill>
-            </a:endParaRPr>
-          </a:p>
-          <a:p>
-            <a:pPr defTabSz="457200">
-              <a:buFont typeface="Wingdings 3" charset="2"/>
-              <a:buChar char=""/>
-            </a:pPr>
-            <a:r>
-              <a:rPr lang="en-US" dirty="0">
-                <a:solidFill>
-                  <a:schemeClr val="tx1"/>
-                </a:solidFill>
-              </a:rPr>
-              <a:t>Forecast future sales for next month/next quarter</a:t>
+              <a:t>THANK YOU</a:t>
             </a:r>
           </a:p>
         </p:txBody>
@@ -21736,7 +23685,7 @@
     </p:spTree>
     <p:extLst>
       <p:ext uri="{BB962C8B-B14F-4D97-AF65-F5344CB8AC3E}">
-        <p14:creationId xmlns:p14="http://schemas.microsoft.com/office/powerpoint/2010/main" val="2125243213"/>
+        <p14:creationId xmlns:p14="http://schemas.microsoft.com/office/powerpoint/2010/main" val="2658942909"/>
       </p:ext>
     </p:extLst>
   </p:cSld>

</xml_diff>